<commit_message>
Added tasks to the project
</commit_message>
<xml_diff>
--- a/Serving Intel.pptx
+++ b/Serving Intel.pptx
@@ -7,6 +7,28 @@
   <p:sldIdLst>
     <p:sldId id="256" r:id="rId2"/>
     <p:sldId id="257" r:id="rId3"/>
+    <p:sldId id="258" r:id="rId4"/>
+    <p:sldId id="259" r:id="rId5"/>
+    <p:sldId id="264" r:id="rId6"/>
+    <p:sldId id="265" r:id="rId7"/>
+    <p:sldId id="266" r:id="rId8"/>
+    <p:sldId id="260" r:id="rId9"/>
+    <p:sldId id="261" r:id="rId10"/>
+    <p:sldId id="267" r:id="rId11"/>
+    <p:sldId id="268" r:id="rId12"/>
+    <p:sldId id="269" r:id="rId13"/>
+    <p:sldId id="270" r:id="rId14"/>
+    <p:sldId id="271" r:id="rId15"/>
+    <p:sldId id="272" r:id="rId16"/>
+    <p:sldId id="273" r:id="rId17"/>
+    <p:sldId id="274" r:id="rId18"/>
+    <p:sldId id="275" r:id="rId19"/>
+    <p:sldId id="276" r:id="rId20"/>
+    <p:sldId id="277" r:id="rId21"/>
+    <p:sldId id="278" r:id="rId22"/>
+    <p:sldId id="279" r:id="rId23"/>
+    <p:sldId id="262" r:id="rId24"/>
+    <p:sldId id="263" r:id="rId25"/>
   </p:sldIdLst>
   <p:sldSz cx="12192000" cy="6858000"/>
   <p:notesSz cx="6858000" cy="9144000"/>
@@ -105,6 +127,11 @@
       </a:defRPr>
     </a:lvl9pPr>
   </p:defaultTextStyle>
+  <p:extLst>
+    <p:ext uri="{EFAFB233-063F-42B5-8137-9DF3F51BA10A}">
+      <p15:sldGuideLst xmlns:p15="http://schemas.microsoft.com/office/powerpoint/2012/main"/>
+    </p:ext>
+  </p:extLst>
 </p:presentation>
 </file>
 
@@ -239,7 +266,7 @@
           <a:p>
             <a:fld id="{DA5E98EB-58EC-4C22-931D-BA4A77B4A258}" type="datetimeFigureOut">
               <a:rPr lang="en-PH" smtClean="0"/>
-              <a:t>13/12/2023</a:t>
+              <a:t>15/12/2023</a:t>
             </a:fld>
             <a:endParaRPr lang="en-PH"/>
           </a:p>
@@ -409,7 +436,7 @@
           <a:p>
             <a:fld id="{DA5E98EB-58EC-4C22-931D-BA4A77B4A258}" type="datetimeFigureOut">
               <a:rPr lang="en-PH" smtClean="0"/>
-              <a:t>13/12/2023</a:t>
+              <a:t>15/12/2023</a:t>
             </a:fld>
             <a:endParaRPr lang="en-PH"/>
           </a:p>
@@ -589,7 +616,7 @@
           <a:p>
             <a:fld id="{DA5E98EB-58EC-4C22-931D-BA4A77B4A258}" type="datetimeFigureOut">
               <a:rPr lang="en-PH" smtClean="0"/>
-              <a:t>13/12/2023</a:t>
+              <a:t>15/12/2023</a:t>
             </a:fld>
             <a:endParaRPr lang="en-PH"/>
           </a:p>
@@ -759,7 +786,7 @@
           <a:p>
             <a:fld id="{DA5E98EB-58EC-4C22-931D-BA4A77B4A258}" type="datetimeFigureOut">
               <a:rPr lang="en-PH" smtClean="0"/>
-              <a:t>13/12/2023</a:t>
+              <a:t>15/12/2023</a:t>
             </a:fld>
             <a:endParaRPr lang="en-PH"/>
           </a:p>
@@ -1005,7 +1032,7 @@
           <a:p>
             <a:fld id="{DA5E98EB-58EC-4C22-931D-BA4A77B4A258}" type="datetimeFigureOut">
               <a:rPr lang="en-PH" smtClean="0"/>
-              <a:t>13/12/2023</a:t>
+              <a:t>15/12/2023</a:t>
             </a:fld>
             <a:endParaRPr lang="en-PH"/>
           </a:p>
@@ -1237,7 +1264,7 @@
           <a:p>
             <a:fld id="{DA5E98EB-58EC-4C22-931D-BA4A77B4A258}" type="datetimeFigureOut">
               <a:rPr lang="en-PH" smtClean="0"/>
-              <a:t>13/12/2023</a:t>
+              <a:t>15/12/2023</a:t>
             </a:fld>
             <a:endParaRPr lang="en-PH"/>
           </a:p>
@@ -1604,7 +1631,7 @@
           <a:p>
             <a:fld id="{DA5E98EB-58EC-4C22-931D-BA4A77B4A258}" type="datetimeFigureOut">
               <a:rPr lang="en-PH" smtClean="0"/>
-              <a:t>13/12/2023</a:t>
+              <a:t>15/12/2023</a:t>
             </a:fld>
             <a:endParaRPr lang="en-PH"/>
           </a:p>
@@ -1722,7 +1749,7 @@
           <a:p>
             <a:fld id="{DA5E98EB-58EC-4C22-931D-BA4A77B4A258}" type="datetimeFigureOut">
               <a:rPr lang="en-PH" smtClean="0"/>
-              <a:t>13/12/2023</a:t>
+              <a:t>15/12/2023</a:t>
             </a:fld>
             <a:endParaRPr lang="en-PH"/>
           </a:p>
@@ -1817,7 +1844,7 @@
           <a:p>
             <a:fld id="{DA5E98EB-58EC-4C22-931D-BA4A77B4A258}" type="datetimeFigureOut">
               <a:rPr lang="en-PH" smtClean="0"/>
-              <a:t>13/12/2023</a:t>
+              <a:t>15/12/2023</a:t>
             </a:fld>
             <a:endParaRPr lang="en-PH"/>
           </a:p>
@@ -2094,7 +2121,7 @@
           <a:p>
             <a:fld id="{DA5E98EB-58EC-4C22-931D-BA4A77B4A258}" type="datetimeFigureOut">
               <a:rPr lang="en-PH" smtClean="0"/>
-              <a:t>13/12/2023</a:t>
+              <a:t>15/12/2023</a:t>
             </a:fld>
             <a:endParaRPr lang="en-PH"/>
           </a:p>
@@ -2347,7 +2374,7 @@
           <a:p>
             <a:fld id="{DA5E98EB-58EC-4C22-931D-BA4A77B4A258}" type="datetimeFigureOut">
               <a:rPr lang="en-PH" smtClean="0"/>
-              <a:t>13/12/2023</a:t>
+              <a:t>15/12/2023</a:t>
             </a:fld>
             <a:endParaRPr lang="en-PH"/>
           </a:p>
@@ -2560,7 +2587,7 @@
           <a:p>
             <a:fld id="{DA5E98EB-58EC-4C22-931D-BA4A77B4A258}" type="datetimeFigureOut">
               <a:rPr lang="en-PH" smtClean="0"/>
-              <a:t>13/12/2023</a:t>
+              <a:t>15/12/2023</a:t>
             </a:fld>
             <a:endParaRPr lang="en-PH"/>
           </a:p>
@@ -3020,6 +3047,796 @@
 </p:sld>
 </file>
 
+<file path=ppt/slides/slide10.xml><?xml version="1.0" encoding="utf-8"?>
+<p:sld xmlns:a="http://schemas.openxmlformats.org/drawingml/2006/main" xmlns:r="http://schemas.openxmlformats.org/officeDocument/2006/relationships" xmlns:p="http://schemas.openxmlformats.org/presentationml/2006/main">
+  <p:cSld>
+    <p:spTree>
+      <p:nvGrpSpPr>
+        <p:cNvPr id="1" name=""/>
+        <p:cNvGrpSpPr/>
+        <p:nvPr/>
+      </p:nvGrpSpPr>
+      <p:grpSpPr>
+        <a:xfrm>
+          <a:off x="0" y="0"/>
+          <a:ext cx="0" cy="0"/>
+          <a:chOff x="0" y="0"/>
+          <a:chExt cx="0" cy="0"/>
+        </a:xfrm>
+      </p:grpSpPr>
+      <p:sp>
+        <p:nvSpPr>
+          <p:cNvPr id="2" name="Title 1"/>
+          <p:cNvSpPr>
+            <a:spLocks noGrp="1"/>
+          </p:cNvSpPr>
+          <p:nvPr>
+            <p:ph type="title"/>
+          </p:nvPr>
+        </p:nvSpPr>
+        <p:spPr/>
+        <p:txBody>
+          <a:bodyPr/>
+          <a:lstStyle/>
+          <a:p>
+            <a:endParaRPr lang="en-PH"/>
+          </a:p>
+        </p:txBody>
+      </p:sp>
+      <p:sp>
+        <p:nvSpPr>
+          <p:cNvPr id="3" name="Content Placeholder 2"/>
+          <p:cNvSpPr>
+            <a:spLocks noGrp="1"/>
+          </p:cNvSpPr>
+          <p:nvPr>
+            <p:ph idx="1"/>
+          </p:nvPr>
+        </p:nvSpPr>
+        <p:spPr/>
+        <p:txBody>
+          <a:bodyPr/>
+          <a:lstStyle/>
+          <a:p>
+            <a:r>
+              <a:rPr lang="en-US" dirty="0" err="1" smtClean="0"/>
+              <a:t>var</a:t>
+            </a:r>
+            <a:r>
+              <a:rPr lang="en-US" dirty="0" smtClean="0"/>
+              <a:t> users = </a:t>
+            </a:r>
+            <a:r>
+              <a:rPr lang="en-US" dirty="0" err="1" smtClean="0"/>
+              <a:t>projectUsersEntities.Users.ToList</a:t>
+            </a:r>
+            <a:r>
+              <a:rPr lang="en-US" dirty="0" smtClean="0"/>
+              <a:t>();</a:t>
+            </a:r>
+          </a:p>
+          <a:p>
+            <a:r>
+              <a:rPr lang="en-US" dirty="0" err="1" smtClean="0"/>
+              <a:t>cb.DisplayMember</a:t>
+            </a:r>
+            <a:r>
+              <a:rPr lang="en-US" dirty="0" smtClean="0"/>
+              <a:t> = “Name”;</a:t>
+            </a:r>
+          </a:p>
+          <a:p>
+            <a:r>
+              <a:rPr lang="en-US" dirty="0" err="1" smtClean="0"/>
+              <a:t>cb.ValueMember</a:t>
+            </a:r>
+            <a:r>
+              <a:rPr lang="en-US" dirty="0" smtClean="0"/>
+              <a:t> = “id”;</a:t>
+            </a:r>
+          </a:p>
+          <a:p>
+            <a:r>
+              <a:rPr lang="en-US" dirty="0" err="1" smtClean="0"/>
+              <a:t>cb.DataSource</a:t>
+            </a:r>
+            <a:r>
+              <a:rPr lang="en-US" dirty="0" smtClean="0"/>
+              <a:t> = users</a:t>
+            </a:r>
+            <a:endParaRPr lang="en-PH" dirty="0"/>
+          </a:p>
+        </p:txBody>
+      </p:sp>
+    </p:spTree>
+    <p:extLst>
+      <p:ext uri="{BB962C8B-B14F-4D97-AF65-F5344CB8AC3E}">
+        <p14:creationId xmlns:p14="http://schemas.microsoft.com/office/powerpoint/2010/main" val="1039840139"/>
+      </p:ext>
+    </p:extLst>
+  </p:cSld>
+  <p:clrMapOvr>
+    <a:masterClrMapping/>
+  </p:clrMapOvr>
+</p:sld>
+</file>
+
+<file path=ppt/slides/slide11.xml><?xml version="1.0" encoding="utf-8"?>
+<p:sld xmlns:a="http://schemas.openxmlformats.org/drawingml/2006/main" xmlns:r="http://schemas.openxmlformats.org/officeDocument/2006/relationships" xmlns:p="http://schemas.openxmlformats.org/presentationml/2006/main">
+  <p:cSld>
+    <p:spTree>
+      <p:nvGrpSpPr>
+        <p:cNvPr id="1" name=""/>
+        <p:cNvGrpSpPr/>
+        <p:nvPr/>
+      </p:nvGrpSpPr>
+      <p:grpSpPr>
+        <a:xfrm>
+          <a:off x="0" y="0"/>
+          <a:ext cx="0" cy="0"/>
+          <a:chOff x="0" y="0"/>
+          <a:chExt cx="0" cy="0"/>
+        </a:xfrm>
+      </p:grpSpPr>
+      <p:sp>
+        <p:nvSpPr>
+          <p:cNvPr id="2" name="Title 1"/>
+          <p:cNvSpPr>
+            <a:spLocks noGrp="1"/>
+          </p:cNvSpPr>
+          <p:nvPr>
+            <p:ph type="title"/>
+          </p:nvPr>
+        </p:nvSpPr>
+        <p:spPr/>
+        <p:txBody>
+          <a:bodyPr/>
+          <a:lstStyle/>
+          <a:p>
+            <a:endParaRPr lang="en-PH"/>
+          </a:p>
+        </p:txBody>
+      </p:sp>
+      <p:sp>
+        <p:nvSpPr>
+          <p:cNvPr id="3" name="Content Placeholder 2"/>
+          <p:cNvSpPr>
+            <a:spLocks noGrp="1"/>
+          </p:cNvSpPr>
+          <p:nvPr>
+            <p:ph idx="1"/>
+          </p:nvPr>
+        </p:nvSpPr>
+        <p:spPr/>
+        <p:txBody>
+          <a:bodyPr/>
+          <a:lstStyle/>
+          <a:p>
+            <a:r>
+              <a:rPr lang="en-US" dirty="0" err="1" smtClean="0"/>
+              <a:t>var</a:t>
+            </a:r>
+            <a:r>
+              <a:rPr lang="en-US" dirty="0" smtClean="0"/>
+              <a:t> </a:t>
+            </a:r>
+            <a:r>
+              <a:rPr lang="en-US" dirty="0" err="1" smtClean="0"/>
+              <a:t>userRecord</a:t>
+            </a:r>
+            <a:r>
+              <a:rPr lang="en-US" dirty="0" smtClean="0"/>
+              <a:t> = new User();</a:t>
+            </a:r>
+          </a:p>
+          <a:p>
+            <a:r>
+              <a:rPr lang="en-US" dirty="0" err="1" smtClean="0"/>
+              <a:t>userRecord.emailAddress</a:t>
+            </a:r>
+            <a:r>
+              <a:rPr lang="en-US" dirty="0" smtClean="0"/>
+              <a:t> = email;</a:t>
+            </a:r>
+          </a:p>
+          <a:p>
+            <a:r>
+              <a:rPr lang="en-US" dirty="0" err="1" smtClean="0"/>
+              <a:t>userRecord.password</a:t>
+            </a:r>
+            <a:r>
+              <a:rPr lang="en-US" dirty="0" smtClean="0"/>
+              <a:t> = password;</a:t>
+            </a:r>
+          </a:p>
+          <a:p>
+            <a:r>
+              <a:rPr lang="en-US" dirty="0" err="1" smtClean="0"/>
+              <a:t>projectUsersEntities.Users.Add</a:t>
+            </a:r>
+            <a:r>
+              <a:rPr lang="en-US" dirty="0" smtClean="0"/>
+              <a:t>(</a:t>
+            </a:r>
+            <a:r>
+              <a:rPr lang="en-US" dirty="0" err="1" smtClean="0"/>
+              <a:t>userRecord</a:t>
+            </a:r>
+            <a:r>
+              <a:rPr lang="en-US" dirty="0" smtClean="0"/>
+              <a:t>);</a:t>
+            </a:r>
+          </a:p>
+          <a:p>
+            <a:r>
+              <a:rPr lang="en-US" dirty="0" err="1" smtClean="0"/>
+              <a:t>projectUsersEntities.SaveChanges</a:t>
+            </a:r>
+            <a:r>
+              <a:rPr lang="en-US" smtClean="0"/>
+              <a:t>();</a:t>
+            </a:r>
+            <a:endParaRPr lang="en-PH" dirty="0"/>
+          </a:p>
+        </p:txBody>
+      </p:sp>
+    </p:spTree>
+    <p:extLst>
+      <p:ext uri="{BB962C8B-B14F-4D97-AF65-F5344CB8AC3E}">
+        <p14:creationId xmlns:p14="http://schemas.microsoft.com/office/powerpoint/2010/main" val="1625909395"/>
+      </p:ext>
+    </p:extLst>
+  </p:cSld>
+  <p:clrMapOvr>
+    <a:masterClrMapping/>
+  </p:clrMapOvr>
+</p:sld>
+</file>
+
+<file path=ppt/slides/slide12.xml><?xml version="1.0" encoding="utf-8"?>
+<p:sld xmlns:a="http://schemas.openxmlformats.org/drawingml/2006/main" xmlns:r="http://schemas.openxmlformats.org/officeDocument/2006/relationships" xmlns:p="http://schemas.openxmlformats.org/presentationml/2006/main">
+  <p:cSld>
+    <p:spTree>
+      <p:nvGrpSpPr>
+        <p:cNvPr id="1" name=""/>
+        <p:cNvGrpSpPr/>
+        <p:nvPr/>
+      </p:nvGrpSpPr>
+      <p:grpSpPr>
+        <a:xfrm>
+          <a:off x="0" y="0"/>
+          <a:ext cx="0" cy="0"/>
+          <a:chOff x="0" y="0"/>
+          <a:chExt cx="0" cy="0"/>
+        </a:xfrm>
+      </p:grpSpPr>
+      <p:sp>
+        <p:nvSpPr>
+          <p:cNvPr id="2" name="Title 1"/>
+          <p:cNvSpPr>
+            <a:spLocks noGrp="1"/>
+          </p:cNvSpPr>
+          <p:nvPr>
+            <p:ph type="title"/>
+          </p:nvPr>
+        </p:nvSpPr>
+        <p:spPr/>
+        <p:txBody>
+          <a:bodyPr/>
+          <a:lstStyle/>
+          <a:p>
+            <a:endParaRPr lang="en-PH"/>
+          </a:p>
+        </p:txBody>
+      </p:sp>
+      <p:sp>
+        <p:nvSpPr>
+          <p:cNvPr id="3" name="Content Placeholder 2"/>
+          <p:cNvSpPr>
+            <a:spLocks noGrp="1"/>
+          </p:cNvSpPr>
+          <p:nvPr>
+            <p:ph idx="1"/>
+          </p:nvPr>
+        </p:nvSpPr>
+        <p:spPr/>
+        <p:txBody>
+          <a:bodyPr/>
+          <a:lstStyle/>
+          <a:p>
+            <a:endParaRPr lang="en-PH"/>
+          </a:p>
+        </p:txBody>
+      </p:sp>
+    </p:spTree>
+    <p:extLst>
+      <p:ext uri="{BB962C8B-B14F-4D97-AF65-F5344CB8AC3E}">
+        <p14:creationId xmlns:p14="http://schemas.microsoft.com/office/powerpoint/2010/main" val="2477088552"/>
+      </p:ext>
+    </p:extLst>
+  </p:cSld>
+  <p:clrMapOvr>
+    <a:masterClrMapping/>
+  </p:clrMapOvr>
+</p:sld>
+</file>
+
+<file path=ppt/slides/slide13.xml><?xml version="1.0" encoding="utf-8"?>
+<p:sld xmlns:a="http://schemas.openxmlformats.org/drawingml/2006/main" xmlns:r="http://schemas.openxmlformats.org/officeDocument/2006/relationships" xmlns:p="http://schemas.openxmlformats.org/presentationml/2006/main">
+  <p:cSld>
+    <p:spTree>
+      <p:nvGrpSpPr>
+        <p:cNvPr id="1" name=""/>
+        <p:cNvGrpSpPr/>
+        <p:nvPr/>
+      </p:nvGrpSpPr>
+      <p:grpSpPr>
+        <a:xfrm>
+          <a:off x="0" y="0"/>
+          <a:ext cx="0" cy="0"/>
+          <a:chOff x="0" y="0"/>
+          <a:chExt cx="0" cy="0"/>
+        </a:xfrm>
+      </p:grpSpPr>
+      <p:sp>
+        <p:nvSpPr>
+          <p:cNvPr id="2" name="Title 1"/>
+          <p:cNvSpPr>
+            <a:spLocks noGrp="1"/>
+          </p:cNvSpPr>
+          <p:nvPr>
+            <p:ph type="title"/>
+          </p:nvPr>
+        </p:nvSpPr>
+        <p:spPr/>
+        <p:txBody>
+          <a:bodyPr/>
+          <a:lstStyle/>
+          <a:p>
+            <a:endParaRPr lang="en-PH"/>
+          </a:p>
+        </p:txBody>
+      </p:sp>
+      <p:sp>
+        <p:nvSpPr>
+          <p:cNvPr id="3" name="Content Placeholder 2"/>
+          <p:cNvSpPr>
+            <a:spLocks noGrp="1"/>
+          </p:cNvSpPr>
+          <p:nvPr>
+            <p:ph idx="1"/>
+          </p:nvPr>
+        </p:nvSpPr>
+        <p:spPr/>
+        <p:txBody>
+          <a:bodyPr/>
+          <a:lstStyle/>
+          <a:p>
+            <a:endParaRPr lang="en-PH"/>
+          </a:p>
+        </p:txBody>
+      </p:sp>
+    </p:spTree>
+    <p:extLst>
+      <p:ext uri="{BB962C8B-B14F-4D97-AF65-F5344CB8AC3E}">
+        <p14:creationId xmlns:p14="http://schemas.microsoft.com/office/powerpoint/2010/main" val="3089301708"/>
+      </p:ext>
+    </p:extLst>
+  </p:cSld>
+  <p:clrMapOvr>
+    <a:masterClrMapping/>
+  </p:clrMapOvr>
+</p:sld>
+</file>
+
+<file path=ppt/slides/slide14.xml><?xml version="1.0" encoding="utf-8"?>
+<p:sld xmlns:a="http://schemas.openxmlformats.org/drawingml/2006/main" xmlns:r="http://schemas.openxmlformats.org/officeDocument/2006/relationships" xmlns:p="http://schemas.openxmlformats.org/presentationml/2006/main">
+  <p:cSld>
+    <p:spTree>
+      <p:nvGrpSpPr>
+        <p:cNvPr id="1" name=""/>
+        <p:cNvGrpSpPr/>
+        <p:nvPr/>
+      </p:nvGrpSpPr>
+      <p:grpSpPr>
+        <a:xfrm>
+          <a:off x="0" y="0"/>
+          <a:ext cx="0" cy="0"/>
+          <a:chOff x="0" y="0"/>
+          <a:chExt cx="0" cy="0"/>
+        </a:xfrm>
+      </p:grpSpPr>
+      <p:sp>
+        <p:nvSpPr>
+          <p:cNvPr id="2" name="Title 1"/>
+          <p:cNvSpPr>
+            <a:spLocks noGrp="1"/>
+          </p:cNvSpPr>
+          <p:nvPr>
+            <p:ph type="title"/>
+          </p:nvPr>
+        </p:nvSpPr>
+        <p:spPr/>
+        <p:txBody>
+          <a:bodyPr/>
+          <a:lstStyle/>
+          <a:p>
+            <a:endParaRPr lang="en-PH"/>
+          </a:p>
+        </p:txBody>
+      </p:sp>
+      <p:sp>
+        <p:nvSpPr>
+          <p:cNvPr id="3" name="Content Placeholder 2"/>
+          <p:cNvSpPr>
+            <a:spLocks noGrp="1"/>
+          </p:cNvSpPr>
+          <p:nvPr>
+            <p:ph idx="1"/>
+          </p:nvPr>
+        </p:nvSpPr>
+        <p:spPr/>
+        <p:txBody>
+          <a:bodyPr/>
+          <a:lstStyle/>
+          <a:p>
+            <a:endParaRPr lang="en-PH"/>
+          </a:p>
+        </p:txBody>
+      </p:sp>
+    </p:spTree>
+    <p:extLst>
+      <p:ext uri="{BB962C8B-B14F-4D97-AF65-F5344CB8AC3E}">
+        <p14:creationId xmlns:p14="http://schemas.microsoft.com/office/powerpoint/2010/main" val="3702918414"/>
+      </p:ext>
+    </p:extLst>
+  </p:cSld>
+  <p:clrMapOvr>
+    <a:masterClrMapping/>
+  </p:clrMapOvr>
+</p:sld>
+</file>
+
+<file path=ppt/slides/slide15.xml><?xml version="1.0" encoding="utf-8"?>
+<p:sld xmlns:a="http://schemas.openxmlformats.org/drawingml/2006/main" xmlns:r="http://schemas.openxmlformats.org/officeDocument/2006/relationships" xmlns:p="http://schemas.openxmlformats.org/presentationml/2006/main">
+  <p:cSld>
+    <p:spTree>
+      <p:nvGrpSpPr>
+        <p:cNvPr id="1" name=""/>
+        <p:cNvGrpSpPr/>
+        <p:nvPr/>
+      </p:nvGrpSpPr>
+      <p:grpSpPr>
+        <a:xfrm>
+          <a:off x="0" y="0"/>
+          <a:ext cx="0" cy="0"/>
+          <a:chOff x="0" y="0"/>
+          <a:chExt cx="0" cy="0"/>
+        </a:xfrm>
+      </p:grpSpPr>
+      <p:sp>
+        <p:nvSpPr>
+          <p:cNvPr id="2" name="Title 1"/>
+          <p:cNvSpPr>
+            <a:spLocks noGrp="1"/>
+          </p:cNvSpPr>
+          <p:nvPr>
+            <p:ph type="title"/>
+          </p:nvPr>
+        </p:nvSpPr>
+        <p:spPr/>
+        <p:txBody>
+          <a:bodyPr/>
+          <a:lstStyle/>
+          <a:p>
+            <a:endParaRPr lang="en-PH"/>
+          </a:p>
+        </p:txBody>
+      </p:sp>
+      <p:sp>
+        <p:nvSpPr>
+          <p:cNvPr id="3" name="Content Placeholder 2"/>
+          <p:cNvSpPr>
+            <a:spLocks noGrp="1"/>
+          </p:cNvSpPr>
+          <p:nvPr>
+            <p:ph idx="1"/>
+          </p:nvPr>
+        </p:nvSpPr>
+        <p:spPr/>
+        <p:txBody>
+          <a:bodyPr/>
+          <a:lstStyle/>
+          <a:p>
+            <a:endParaRPr lang="en-PH"/>
+          </a:p>
+        </p:txBody>
+      </p:sp>
+    </p:spTree>
+    <p:extLst>
+      <p:ext uri="{BB962C8B-B14F-4D97-AF65-F5344CB8AC3E}">
+        <p14:creationId xmlns:p14="http://schemas.microsoft.com/office/powerpoint/2010/main" val="2129992019"/>
+      </p:ext>
+    </p:extLst>
+  </p:cSld>
+  <p:clrMapOvr>
+    <a:masterClrMapping/>
+  </p:clrMapOvr>
+</p:sld>
+</file>
+
+<file path=ppt/slides/slide16.xml><?xml version="1.0" encoding="utf-8"?>
+<p:sld xmlns:a="http://schemas.openxmlformats.org/drawingml/2006/main" xmlns:r="http://schemas.openxmlformats.org/officeDocument/2006/relationships" xmlns:p="http://schemas.openxmlformats.org/presentationml/2006/main">
+  <p:cSld>
+    <p:spTree>
+      <p:nvGrpSpPr>
+        <p:cNvPr id="1" name=""/>
+        <p:cNvGrpSpPr/>
+        <p:nvPr/>
+      </p:nvGrpSpPr>
+      <p:grpSpPr>
+        <a:xfrm>
+          <a:off x="0" y="0"/>
+          <a:ext cx="0" cy="0"/>
+          <a:chOff x="0" y="0"/>
+          <a:chExt cx="0" cy="0"/>
+        </a:xfrm>
+      </p:grpSpPr>
+      <p:sp>
+        <p:nvSpPr>
+          <p:cNvPr id="2" name="Title 1"/>
+          <p:cNvSpPr>
+            <a:spLocks noGrp="1"/>
+          </p:cNvSpPr>
+          <p:nvPr>
+            <p:ph type="title"/>
+          </p:nvPr>
+        </p:nvSpPr>
+        <p:spPr/>
+        <p:txBody>
+          <a:bodyPr/>
+          <a:lstStyle/>
+          <a:p>
+            <a:endParaRPr lang="en-PH"/>
+          </a:p>
+        </p:txBody>
+      </p:sp>
+      <p:sp>
+        <p:nvSpPr>
+          <p:cNvPr id="3" name="Content Placeholder 2"/>
+          <p:cNvSpPr>
+            <a:spLocks noGrp="1"/>
+          </p:cNvSpPr>
+          <p:nvPr>
+            <p:ph idx="1"/>
+          </p:nvPr>
+        </p:nvSpPr>
+        <p:spPr/>
+        <p:txBody>
+          <a:bodyPr/>
+          <a:lstStyle/>
+          <a:p>
+            <a:endParaRPr lang="en-PH"/>
+          </a:p>
+        </p:txBody>
+      </p:sp>
+    </p:spTree>
+    <p:extLst>
+      <p:ext uri="{BB962C8B-B14F-4D97-AF65-F5344CB8AC3E}">
+        <p14:creationId xmlns:p14="http://schemas.microsoft.com/office/powerpoint/2010/main" val="1421899780"/>
+      </p:ext>
+    </p:extLst>
+  </p:cSld>
+  <p:clrMapOvr>
+    <a:masterClrMapping/>
+  </p:clrMapOvr>
+</p:sld>
+</file>
+
+<file path=ppt/slides/slide17.xml><?xml version="1.0" encoding="utf-8"?>
+<p:sld xmlns:a="http://schemas.openxmlformats.org/drawingml/2006/main" xmlns:r="http://schemas.openxmlformats.org/officeDocument/2006/relationships" xmlns:p="http://schemas.openxmlformats.org/presentationml/2006/main">
+  <p:cSld>
+    <p:spTree>
+      <p:nvGrpSpPr>
+        <p:cNvPr id="1" name=""/>
+        <p:cNvGrpSpPr/>
+        <p:nvPr/>
+      </p:nvGrpSpPr>
+      <p:grpSpPr>
+        <a:xfrm>
+          <a:off x="0" y="0"/>
+          <a:ext cx="0" cy="0"/>
+          <a:chOff x="0" y="0"/>
+          <a:chExt cx="0" cy="0"/>
+        </a:xfrm>
+      </p:grpSpPr>
+      <p:sp>
+        <p:nvSpPr>
+          <p:cNvPr id="2" name="Title 1"/>
+          <p:cNvSpPr>
+            <a:spLocks noGrp="1"/>
+          </p:cNvSpPr>
+          <p:nvPr>
+            <p:ph type="title"/>
+          </p:nvPr>
+        </p:nvSpPr>
+        <p:spPr/>
+        <p:txBody>
+          <a:bodyPr/>
+          <a:lstStyle/>
+          <a:p>
+            <a:endParaRPr lang="en-PH"/>
+          </a:p>
+        </p:txBody>
+      </p:sp>
+      <p:sp>
+        <p:nvSpPr>
+          <p:cNvPr id="3" name="Content Placeholder 2"/>
+          <p:cNvSpPr>
+            <a:spLocks noGrp="1"/>
+          </p:cNvSpPr>
+          <p:nvPr>
+            <p:ph idx="1"/>
+          </p:nvPr>
+        </p:nvSpPr>
+        <p:spPr/>
+        <p:txBody>
+          <a:bodyPr/>
+          <a:lstStyle/>
+          <a:p>
+            <a:endParaRPr lang="en-PH"/>
+          </a:p>
+        </p:txBody>
+      </p:sp>
+    </p:spTree>
+    <p:extLst>
+      <p:ext uri="{BB962C8B-B14F-4D97-AF65-F5344CB8AC3E}">
+        <p14:creationId xmlns:p14="http://schemas.microsoft.com/office/powerpoint/2010/main" val="2144434806"/>
+      </p:ext>
+    </p:extLst>
+  </p:cSld>
+  <p:clrMapOvr>
+    <a:masterClrMapping/>
+  </p:clrMapOvr>
+</p:sld>
+</file>
+
+<file path=ppt/slides/slide18.xml><?xml version="1.0" encoding="utf-8"?>
+<p:sld xmlns:a="http://schemas.openxmlformats.org/drawingml/2006/main" xmlns:r="http://schemas.openxmlformats.org/officeDocument/2006/relationships" xmlns:p="http://schemas.openxmlformats.org/presentationml/2006/main">
+  <p:cSld>
+    <p:spTree>
+      <p:nvGrpSpPr>
+        <p:cNvPr id="1" name=""/>
+        <p:cNvGrpSpPr/>
+        <p:nvPr/>
+      </p:nvGrpSpPr>
+      <p:grpSpPr>
+        <a:xfrm>
+          <a:off x="0" y="0"/>
+          <a:ext cx="0" cy="0"/>
+          <a:chOff x="0" y="0"/>
+          <a:chExt cx="0" cy="0"/>
+        </a:xfrm>
+      </p:grpSpPr>
+      <p:sp>
+        <p:nvSpPr>
+          <p:cNvPr id="2" name="Title 1"/>
+          <p:cNvSpPr>
+            <a:spLocks noGrp="1"/>
+          </p:cNvSpPr>
+          <p:nvPr>
+            <p:ph type="title"/>
+          </p:nvPr>
+        </p:nvSpPr>
+        <p:spPr/>
+        <p:txBody>
+          <a:bodyPr/>
+          <a:lstStyle/>
+          <a:p>
+            <a:endParaRPr lang="en-PH"/>
+          </a:p>
+        </p:txBody>
+      </p:sp>
+      <p:sp>
+        <p:nvSpPr>
+          <p:cNvPr id="3" name="Content Placeholder 2"/>
+          <p:cNvSpPr>
+            <a:spLocks noGrp="1"/>
+          </p:cNvSpPr>
+          <p:nvPr>
+            <p:ph idx="1"/>
+          </p:nvPr>
+        </p:nvSpPr>
+        <p:spPr/>
+        <p:txBody>
+          <a:bodyPr/>
+          <a:lstStyle/>
+          <a:p>
+            <a:endParaRPr lang="en-PH"/>
+          </a:p>
+        </p:txBody>
+      </p:sp>
+    </p:spTree>
+    <p:extLst>
+      <p:ext uri="{BB962C8B-B14F-4D97-AF65-F5344CB8AC3E}">
+        <p14:creationId xmlns:p14="http://schemas.microsoft.com/office/powerpoint/2010/main" val="3220003544"/>
+      </p:ext>
+    </p:extLst>
+  </p:cSld>
+  <p:clrMapOvr>
+    <a:masterClrMapping/>
+  </p:clrMapOvr>
+</p:sld>
+</file>
+
+<file path=ppt/slides/slide19.xml><?xml version="1.0" encoding="utf-8"?>
+<p:sld xmlns:a="http://schemas.openxmlformats.org/drawingml/2006/main" xmlns:r="http://schemas.openxmlformats.org/officeDocument/2006/relationships" xmlns:p="http://schemas.openxmlformats.org/presentationml/2006/main">
+  <p:cSld>
+    <p:spTree>
+      <p:nvGrpSpPr>
+        <p:cNvPr id="1" name=""/>
+        <p:cNvGrpSpPr/>
+        <p:nvPr/>
+      </p:nvGrpSpPr>
+      <p:grpSpPr>
+        <a:xfrm>
+          <a:off x="0" y="0"/>
+          <a:ext cx="0" cy="0"/>
+          <a:chOff x="0" y="0"/>
+          <a:chExt cx="0" cy="0"/>
+        </a:xfrm>
+      </p:grpSpPr>
+      <p:sp>
+        <p:nvSpPr>
+          <p:cNvPr id="2" name="Title 1"/>
+          <p:cNvSpPr>
+            <a:spLocks noGrp="1"/>
+          </p:cNvSpPr>
+          <p:nvPr>
+            <p:ph type="title"/>
+          </p:nvPr>
+        </p:nvSpPr>
+        <p:spPr/>
+        <p:txBody>
+          <a:bodyPr/>
+          <a:lstStyle/>
+          <a:p>
+            <a:endParaRPr lang="en-PH"/>
+          </a:p>
+        </p:txBody>
+      </p:sp>
+      <p:sp>
+        <p:nvSpPr>
+          <p:cNvPr id="3" name="Content Placeholder 2"/>
+          <p:cNvSpPr>
+            <a:spLocks noGrp="1"/>
+          </p:cNvSpPr>
+          <p:nvPr>
+            <p:ph idx="1"/>
+          </p:nvPr>
+        </p:nvSpPr>
+        <p:spPr/>
+        <p:txBody>
+          <a:bodyPr/>
+          <a:lstStyle/>
+          <a:p>
+            <a:endParaRPr lang="en-PH"/>
+          </a:p>
+        </p:txBody>
+      </p:sp>
+    </p:spTree>
+    <p:extLst>
+      <p:ext uri="{BB962C8B-B14F-4D97-AF65-F5344CB8AC3E}">
+        <p14:creationId xmlns:p14="http://schemas.microsoft.com/office/powerpoint/2010/main" val="2910129002"/>
+      </p:ext>
+    </p:extLst>
+  </p:cSld>
+  <p:clrMapOvr>
+    <a:masterClrMapping/>
+  </p:clrMapOvr>
+</p:sld>
+</file>
+
 <file path=ppt/slides/slide2.xml><?xml version="1.0" encoding="utf-8"?>
 <p:sld xmlns:a="http://schemas.openxmlformats.org/drawingml/2006/main" xmlns:r="http://schemas.openxmlformats.org/officeDocument/2006/relationships" xmlns:p="http://schemas.openxmlformats.org/presentationml/2006/main">
   <p:cSld>
@@ -3090,6 +3907,9 @@
             <a:endParaRPr lang="en-US" dirty="0" smtClean="0"/>
           </a:p>
           <a:p>
+            <a:endParaRPr lang="en-US" dirty="0" smtClean="0"/>
+          </a:p>
+          <a:p>
             <a:endParaRPr lang="en-PH" dirty="0"/>
           </a:p>
         </p:txBody>
@@ -3098,6 +3918,3223 @@
     <p:extLst>
       <p:ext uri="{BB962C8B-B14F-4D97-AF65-F5344CB8AC3E}">
         <p14:creationId xmlns:p14="http://schemas.microsoft.com/office/powerpoint/2010/main" val="742641693"/>
+      </p:ext>
+    </p:extLst>
+  </p:cSld>
+  <p:clrMapOvr>
+    <a:masterClrMapping/>
+  </p:clrMapOvr>
+</p:sld>
+</file>
+
+<file path=ppt/slides/slide20.xml><?xml version="1.0" encoding="utf-8"?>
+<p:sld xmlns:a="http://schemas.openxmlformats.org/drawingml/2006/main" xmlns:r="http://schemas.openxmlformats.org/officeDocument/2006/relationships" xmlns:p="http://schemas.openxmlformats.org/presentationml/2006/main">
+  <p:cSld>
+    <p:spTree>
+      <p:nvGrpSpPr>
+        <p:cNvPr id="1" name=""/>
+        <p:cNvGrpSpPr/>
+        <p:nvPr/>
+      </p:nvGrpSpPr>
+      <p:grpSpPr>
+        <a:xfrm>
+          <a:off x="0" y="0"/>
+          <a:ext cx="0" cy="0"/>
+          <a:chOff x="0" y="0"/>
+          <a:chExt cx="0" cy="0"/>
+        </a:xfrm>
+      </p:grpSpPr>
+      <p:sp>
+        <p:nvSpPr>
+          <p:cNvPr id="2" name="Title 1"/>
+          <p:cNvSpPr>
+            <a:spLocks noGrp="1"/>
+          </p:cNvSpPr>
+          <p:nvPr>
+            <p:ph type="title"/>
+          </p:nvPr>
+        </p:nvSpPr>
+        <p:spPr/>
+        <p:txBody>
+          <a:bodyPr/>
+          <a:lstStyle/>
+          <a:p>
+            <a:endParaRPr lang="en-PH"/>
+          </a:p>
+        </p:txBody>
+      </p:sp>
+      <p:sp>
+        <p:nvSpPr>
+          <p:cNvPr id="3" name="Content Placeholder 2"/>
+          <p:cNvSpPr>
+            <a:spLocks noGrp="1"/>
+          </p:cNvSpPr>
+          <p:nvPr>
+            <p:ph idx="1"/>
+          </p:nvPr>
+        </p:nvSpPr>
+        <p:spPr/>
+        <p:txBody>
+          <a:bodyPr/>
+          <a:lstStyle/>
+          <a:p>
+            <a:endParaRPr lang="en-PH"/>
+          </a:p>
+        </p:txBody>
+      </p:sp>
+    </p:spTree>
+    <p:extLst>
+      <p:ext uri="{BB962C8B-B14F-4D97-AF65-F5344CB8AC3E}">
+        <p14:creationId xmlns:p14="http://schemas.microsoft.com/office/powerpoint/2010/main" val="3742499737"/>
+      </p:ext>
+    </p:extLst>
+  </p:cSld>
+  <p:clrMapOvr>
+    <a:masterClrMapping/>
+  </p:clrMapOvr>
+</p:sld>
+</file>
+
+<file path=ppt/slides/slide21.xml><?xml version="1.0" encoding="utf-8"?>
+<p:sld xmlns:a="http://schemas.openxmlformats.org/drawingml/2006/main" xmlns:r="http://schemas.openxmlformats.org/officeDocument/2006/relationships" xmlns:p="http://schemas.openxmlformats.org/presentationml/2006/main">
+  <p:cSld>
+    <p:spTree>
+      <p:nvGrpSpPr>
+        <p:cNvPr id="1" name=""/>
+        <p:cNvGrpSpPr/>
+        <p:nvPr/>
+      </p:nvGrpSpPr>
+      <p:grpSpPr>
+        <a:xfrm>
+          <a:off x="0" y="0"/>
+          <a:ext cx="0" cy="0"/>
+          <a:chOff x="0" y="0"/>
+          <a:chExt cx="0" cy="0"/>
+        </a:xfrm>
+      </p:grpSpPr>
+      <p:sp>
+        <p:nvSpPr>
+          <p:cNvPr id="2" name="Title 1"/>
+          <p:cNvSpPr>
+            <a:spLocks noGrp="1"/>
+          </p:cNvSpPr>
+          <p:nvPr>
+            <p:ph type="title"/>
+          </p:nvPr>
+        </p:nvSpPr>
+        <p:spPr/>
+        <p:txBody>
+          <a:bodyPr/>
+          <a:lstStyle/>
+          <a:p>
+            <a:endParaRPr lang="en-PH"/>
+          </a:p>
+        </p:txBody>
+      </p:sp>
+      <p:sp>
+        <p:nvSpPr>
+          <p:cNvPr id="3" name="Content Placeholder 2"/>
+          <p:cNvSpPr>
+            <a:spLocks noGrp="1"/>
+          </p:cNvSpPr>
+          <p:nvPr>
+            <p:ph idx="1"/>
+          </p:nvPr>
+        </p:nvSpPr>
+        <p:spPr/>
+        <p:txBody>
+          <a:bodyPr/>
+          <a:lstStyle/>
+          <a:p>
+            <a:endParaRPr lang="en-PH"/>
+          </a:p>
+        </p:txBody>
+      </p:sp>
+    </p:spTree>
+    <p:extLst>
+      <p:ext uri="{BB962C8B-B14F-4D97-AF65-F5344CB8AC3E}">
+        <p14:creationId xmlns:p14="http://schemas.microsoft.com/office/powerpoint/2010/main" val="2831893525"/>
+      </p:ext>
+    </p:extLst>
+  </p:cSld>
+  <p:clrMapOvr>
+    <a:masterClrMapping/>
+  </p:clrMapOvr>
+</p:sld>
+</file>
+
+<file path=ppt/slides/slide22.xml><?xml version="1.0" encoding="utf-8"?>
+<p:sld xmlns:a="http://schemas.openxmlformats.org/drawingml/2006/main" xmlns:r="http://schemas.openxmlformats.org/officeDocument/2006/relationships" xmlns:p="http://schemas.openxmlformats.org/presentationml/2006/main">
+  <p:cSld>
+    <p:spTree>
+      <p:nvGrpSpPr>
+        <p:cNvPr id="1" name=""/>
+        <p:cNvGrpSpPr/>
+        <p:nvPr/>
+      </p:nvGrpSpPr>
+      <p:grpSpPr>
+        <a:xfrm>
+          <a:off x="0" y="0"/>
+          <a:ext cx="0" cy="0"/>
+          <a:chOff x="0" y="0"/>
+          <a:chExt cx="0" cy="0"/>
+        </a:xfrm>
+      </p:grpSpPr>
+      <p:sp>
+        <p:nvSpPr>
+          <p:cNvPr id="2" name="Title 1"/>
+          <p:cNvSpPr>
+            <a:spLocks noGrp="1"/>
+          </p:cNvSpPr>
+          <p:nvPr>
+            <p:ph type="title"/>
+          </p:nvPr>
+        </p:nvSpPr>
+        <p:spPr/>
+        <p:txBody>
+          <a:bodyPr/>
+          <a:lstStyle/>
+          <a:p>
+            <a:endParaRPr lang="en-PH"/>
+          </a:p>
+        </p:txBody>
+      </p:sp>
+      <p:sp>
+        <p:nvSpPr>
+          <p:cNvPr id="3" name="Content Placeholder 2"/>
+          <p:cNvSpPr>
+            <a:spLocks noGrp="1"/>
+          </p:cNvSpPr>
+          <p:nvPr>
+            <p:ph idx="1"/>
+          </p:nvPr>
+        </p:nvSpPr>
+        <p:spPr/>
+        <p:txBody>
+          <a:bodyPr/>
+          <a:lstStyle/>
+          <a:p>
+            <a:endParaRPr lang="en-PH"/>
+          </a:p>
+        </p:txBody>
+      </p:sp>
+    </p:spTree>
+    <p:extLst>
+      <p:ext uri="{BB962C8B-B14F-4D97-AF65-F5344CB8AC3E}">
+        <p14:creationId xmlns:p14="http://schemas.microsoft.com/office/powerpoint/2010/main" val="2194585876"/>
+      </p:ext>
+    </p:extLst>
+  </p:cSld>
+  <p:clrMapOvr>
+    <a:masterClrMapping/>
+  </p:clrMapOvr>
+</p:sld>
+</file>
+
+<file path=ppt/slides/slide23.xml><?xml version="1.0" encoding="utf-8"?>
+<p:sld xmlns:a="http://schemas.openxmlformats.org/drawingml/2006/main" xmlns:r="http://schemas.openxmlformats.org/officeDocument/2006/relationships" xmlns:p="http://schemas.openxmlformats.org/presentationml/2006/main">
+  <p:cSld>
+    <p:spTree>
+      <p:nvGrpSpPr>
+        <p:cNvPr id="1" name=""/>
+        <p:cNvGrpSpPr/>
+        <p:nvPr/>
+      </p:nvGrpSpPr>
+      <p:grpSpPr>
+        <a:xfrm>
+          <a:off x="0" y="0"/>
+          <a:ext cx="0" cy="0"/>
+          <a:chOff x="0" y="0"/>
+          <a:chExt cx="0" cy="0"/>
+        </a:xfrm>
+      </p:grpSpPr>
+      <p:sp>
+        <p:nvSpPr>
+          <p:cNvPr id="2" name="Title 1"/>
+          <p:cNvSpPr>
+            <a:spLocks noGrp="1"/>
+          </p:cNvSpPr>
+          <p:nvPr>
+            <p:ph type="title"/>
+          </p:nvPr>
+        </p:nvSpPr>
+        <p:spPr/>
+        <p:txBody>
+          <a:bodyPr/>
+          <a:lstStyle/>
+          <a:p>
+            <a:endParaRPr lang="en-PH"/>
+          </a:p>
+        </p:txBody>
+      </p:sp>
+      <p:sp>
+        <p:nvSpPr>
+          <p:cNvPr id="3" name="Content Placeholder 2"/>
+          <p:cNvSpPr>
+            <a:spLocks noGrp="1"/>
+          </p:cNvSpPr>
+          <p:nvPr>
+            <p:ph idx="1"/>
+          </p:nvPr>
+        </p:nvSpPr>
+        <p:spPr/>
+        <p:txBody>
+          <a:bodyPr/>
+          <a:lstStyle/>
+          <a:p>
+            <a:endParaRPr lang="en-PH"/>
+          </a:p>
+        </p:txBody>
+      </p:sp>
+    </p:spTree>
+    <p:extLst>
+      <p:ext uri="{BB962C8B-B14F-4D97-AF65-F5344CB8AC3E}">
+        <p14:creationId xmlns:p14="http://schemas.microsoft.com/office/powerpoint/2010/main" val="1134798117"/>
+      </p:ext>
+    </p:extLst>
+  </p:cSld>
+  <p:clrMapOvr>
+    <a:masterClrMapping/>
+  </p:clrMapOvr>
+</p:sld>
+</file>
+
+<file path=ppt/slides/slide24.xml><?xml version="1.0" encoding="utf-8"?>
+<p:sld xmlns:a="http://schemas.openxmlformats.org/drawingml/2006/main" xmlns:r="http://schemas.openxmlformats.org/officeDocument/2006/relationships" xmlns:p="http://schemas.openxmlformats.org/presentationml/2006/main">
+  <p:cSld>
+    <p:spTree>
+      <p:nvGrpSpPr>
+        <p:cNvPr id="1" name=""/>
+        <p:cNvGrpSpPr/>
+        <p:nvPr/>
+      </p:nvGrpSpPr>
+      <p:grpSpPr>
+        <a:xfrm>
+          <a:off x="0" y="0"/>
+          <a:ext cx="0" cy="0"/>
+          <a:chOff x="0" y="0"/>
+          <a:chExt cx="0" cy="0"/>
+        </a:xfrm>
+      </p:grpSpPr>
+      <p:sp>
+        <p:nvSpPr>
+          <p:cNvPr id="2" name="Title 1"/>
+          <p:cNvSpPr>
+            <a:spLocks noGrp="1"/>
+          </p:cNvSpPr>
+          <p:nvPr>
+            <p:ph type="title"/>
+          </p:nvPr>
+        </p:nvSpPr>
+        <p:spPr/>
+        <p:txBody>
+          <a:bodyPr/>
+          <a:lstStyle/>
+          <a:p>
+            <a:endParaRPr lang="en-PH"/>
+          </a:p>
+        </p:txBody>
+      </p:sp>
+      <p:sp>
+        <p:nvSpPr>
+          <p:cNvPr id="3" name="Content Placeholder 2"/>
+          <p:cNvSpPr>
+            <a:spLocks noGrp="1"/>
+          </p:cNvSpPr>
+          <p:nvPr>
+            <p:ph idx="1"/>
+          </p:nvPr>
+        </p:nvSpPr>
+        <p:spPr/>
+        <p:txBody>
+          <a:bodyPr/>
+          <a:lstStyle/>
+          <a:p>
+            <a:endParaRPr lang="en-PH"/>
+          </a:p>
+        </p:txBody>
+      </p:sp>
+    </p:spTree>
+    <p:extLst>
+      <p:ext uri="{BB962C8B-B14F-4D97-AF65-F5344CB8AC3E}">
+        <p14:creationId xmlns:p14="http://schemas.microsoft.com/office/powerpoint/2010/main" val="2549147324"/>
+      </p:ext>
+    </p:extLst>
+  </p:cSld>
+  <p:clrMapOvr>
+    <a:masterClrMapping/>
+  </p:clrMapOvr>
+</p:sld>
+</file>
+
+<file path=ppt/slides/slide3.xml><?xml version="1.0" encoding="utf-8"?>
+<p:sld xmlns:a="http://schemas.openxmlformats.org/drawingml/2006/main" xmlns:r="http://schemas.openxmlformats.org/officeDocument/2006/relationships" xmlns:p="http://schemas.openxmlformats.org/presentationml/2006/main">
+  <p:cSld>
+    <p:spTree>
+      <p:nvGrpSpPr>
+        <p:cNvPr id="1" name=""/>
+        <p:cNvGrpSpPr/>
+        <p:nvPr/>
+      </p:nvGrpSpPr>
+      <p:grpSpPr>
+        <a:xfrm>
+          <a:off x="0" y="0"/>
+          <a:ext cx="0" cy="0"/>
+          <a:chOff x="0" y="0"/>
+          <a:chExt cx="0" cy="0"/>
+        </a:xfrm>
+      </p:grpSpPr>
+      <p:sp>
+        <p:nvSpPr>
+          <p:cNvPr id="2" name="Title 1"/>
+          <p:cNvSpPr>
+            <a:spLocks noGrp="1"/>
+          </p:cNvSpPr>
+          <p:nvPr>
+            <p:ph type="title"/>
+          </p:nvPr>
+        </p:nvSpPr>
+        <p:spPr/>
+        <p:txBody>
+          <a:bodyPr/>
+          <a:lstStyle/>
+          <a:p>
+            <a:endParaRPr lang="en-PH"/>
+          </a:p>
+        </p:txBody>
+      </p:sp>
+      <p:sp>
+        <p:nvSpPr>
+          <p:cNvPr id="3" name="Content Placeholder 2"/>
+          <p:cNvSpPr>
+            <a:spLocks noGrp="1"/>
+          </p:cNvSpPr>
+          <p:nvPr>
+            <p:ph idx="1"/>
+          </p:nvPr>
+        </p:nvSpPr>
+        <p:spPr/>
+        <p:txBody>
+          <a:bodyPr/>
+          <a:lstStyle/>
+          <a:p>
+            <a:r>
+              <a:rPr lang="en-US" dirty="0" smtClean="0"/>
+              <a:t>Name elements/objects</a:t>
+            </a:r>
+          </a:p>
+          <a:p>
+            <a:r>
+              <a:rPr lang="en-US" dirty="0" smtClean="0"/>
+              <a:t>Events</a:t>
+            </a:r>
+          </a:p>
+          <a:p>
+            <a:r>
+              <a:rPr lang="en-US" dirty="0" err="1" smtClean="0"/>
+              <a:t>MessageBox.Show</a:t>
+            </a:r>
+            <a:r>
+              <a:rPr lang="en-US" dirty="0" smtClean="0"/>
+              <a:t>()</a:t>
+            </a:r>
+          </a:p>
+          <a:p>
+            <a:r>
+              <a:rPr lang="en-US" dirty="0" smtClean="0"/>
+              <a:t>tb1.Text</a:t>
+            </a:r>
+          </a:p>
+          <a:p>
+            <a:r>
+              <a:rPr lang="en-US" dirty="0" smtClean="0"/>
+              <a:t>dt1.Value.ToString()</a:t>
+            </a:r>
+          </a:p>
+          <a:p>
+            <a:r>
+              <a:rPr lang="en-US" dirty="0" err="1" smtClean="0"/>
+              <a:t>cb.SelectedItem.ToString</a:t>
+            </a:r>
+            <a:r>
+              <a:rPr lang="en-US" dirty="0" smtClean="0"/>
+              <a:t>()</a:t>
+            </a:r>
+          </a:p>
+          <a:p>
+            <a:r>
+              <a:rPr lang="en-US" dirty="0" err="1" smtClean="0"/>
+              <a:t>var</a:t>
+            </a:r>
+            <a:endParaRPr lang="en-PH" dirty="0"/>
+          </a:p>
+        </p:txBody>
+      </p:sp>
+    </p:spTree>
+    <p:extLst>
+      <p:ext uri="{BB962C8B-B14F-4D97-AF65-F5344CB8AC3E}">
+        <p14:creationId xmlns:p14="http://schemas.microsoft.com/office/powerpoint/2010/main" val="3866616424"/>
+      </p:ext>
+    </p:extLst>
+  </p:cSld>
+  <p:clrMapOvr>
+    <a:masterClrMapping/>
+  </p:clrMapOvr>
+</p:sld>
+</file>
+
+<file path=ppt/slides/slide4.xml><?xml version="1.0" encoding="utf-8"?>
+<p:sld xmlns:a="http://schemas.openxmlformats.org/drawingml/2006/main" xmlns:r="http://schemas.openxmlformats.org/officeDocument/2006/relationships" xmlns:p="http://schemas.openxmlformats.org/presentationml/2006/main">
+  <p:cSld>
+    <p:spTree>
+      <p:nvGrpSpPr>
+        <p:cNvPr id="1" name=""/>
+        <p:cNvGrpSpPr/>
+        <p:nvPr/>
+      </p:nvGrpSpPr>
+      <p:grpSpPr>
+        <a:xfrm>
+          <a:off x="0" y="0"/>
+          <a:ext cx="0" cy="0"/>
+          <a:chOff x="0" y="0"/>
+          <a:chExt cx="0" cy="0"/>
+        </a:xfrm>
+      </p:grpSpPr>
+      <p:sp>
+        <p:nvSpPr>
+          <p:cNvPr id="3" name="Content Placeholder 2"/>
+          <p:cNvSpPr>
+            <a:spLocks noGrp="1"/>
+          </p:cNvSpPr>
+          <p:nvPr>
+            <p:ph idx="1"/>
+          </p:nvPr>
+        </p:nvSpPr>
+        <p:spPr>
+          <a:xfrm>
+            <a:off x="0" y="0"/>
+            <a:ext cx="11353800" cy="6176963"/>
+          </a:xfrm>
+        </p:spPr>
+        <p:txBody>
+          <a:bodyPr>
+            <a:noAutofit/>
+          </a:bodyPr>
+          <a:lstStyle/>
+          <a:p>
+            <a:pPr marL="0">
+              <a:lnSpc>
+                <a:spcPct val="100000"/>
+              </a:lnSpc>
+              <a:spcBef>
+                <a:spcPts val="0"/>
+              </a:spcBef>
+            </a:pPr>
+            <a:r>
+              <a:rPr lang="en-PH" sz="900" dirty="0"/>
+              <a:t>using System;</a:t>
+            </a:r>
+          </a:p>
+          <a:p>
+            <a:pPr marL="0">
+              <a:lnSpc>
+                <a:spcPct val="100000"/>
+              </a:lnSpc>
+              <a:spcBef>
+                <a:spcPts val="0"/>
+              </a:spcBef>
+            </a:pPr>
+            <a:endParaRPr lang="en-PH" sz="900" dirty="0"/>
+          </a:p>
+          <a:p>
+            <a:pPr marL="0">
+              <a:lnSpc>
+                <a:spcPct val="100000"/>
+              </a:lnSpc>
+              <a:spcBef>
+                <a:spcPts val="0"/>
+              </a:spcBef>
+            </a:pPr>
+            <a:r>
+              <a:rPr lang="en-PH" sz="900" dirty="0"/>
+              <a:t>class Program</a:t>
+            </a:r>
+          </a:p>
+          <a:p>
+            <a:pPr marL="0">
+              <a:lnSpc>
+                <a:spcPct val="100000"/>
+              </a:lnSpc>
+              <a:spcBef>
+                <a:spcPts val="0"/>
+              </a:spcBef>
+            </a:pPr>
+            <a:r>
+              <a:rPr lang="en-PH" sz="900" dirty="0"/>
+              <a:t>{</a:t>
+            </a:r>
+          </a:p>
+          <a:p>
+            <a:pPr marL="0">
+              <a:lnSpc>
+                <a:spcPct val="100000"/>
+              </a:lnSpc>
+              <a:spcBef>
+                <a:spcPts val="0"/>
+              </a:spcBef>
+            </a:pPr>
+            <a:r>
+              <a:rPr lang="en-PH" sz="900" dirty="0"/>
+              <a:t>	static void Main(string[] </a:t>
+            </a:r>
+            <a:r>
+              <a:rPr lang="en-PH" sz="900" dirty="0" err="1"/>
+              <a:t>args</a:t>
+            </a:r>
+            <a:r>
+              <a:rPr lang="en-PH" sz="900" dirty="0"/>
+              <a:t>)</a:t>
+            </a:r>
+          </a:p>
+          <a:p>
+            <a:pPr marL="0">
+              <a:lnSpc>
+                <a:spcPct val="100000"/>
+              </a:lnSpc>
+              <a:spcBef>
+                <a:spcPts val="0"/>
+              </a:spcBef>
+            </a:pPr>
+            <a:r>
+              <a:rPr lang="en-PH" sz="900" dirty="0"/>
+              <a:t>	{</a:t>
+            </a:r>
+          </a:p>
+          <a:p>
+            <a:pPr marL="0">
+              <a:lnSpc>
+                <a:spcPct val="100000"/>
+              </a:lnSpc>
+              <a:spcBef>
+                <a:spcPts val="0"/>
+              </a:spcBef>
+            </a:pPr>
+            <a:r>
+              <a:rPr lang="en-PH" sz="900" dirty="0"/>
+              <a:t>		string email = "myemail@email.com";</a:t>
+            </a:r>
+          </a:p>
+          <a:p>
+            <a:pPr marL="0">
+              <a:lnSpc>
+                <a:spcPct val="100000"/>
+              </a:lnSpc>
+              <a:spcBef>
+                <a:spcPts val="0"/>
+              </a:spcBef>
+            </a:pPr>
+            <a:r>
+              <a:rPr lang="en-PH" sz="900" dirty="0"/>
+              <a:t>		bool </a:t>
+            </a:r>
+            <a:r>
+              <a:rPr lang="en-PH" sz="900" dirty="0" err="1"/>
+              <a:t>isValid</a:t>
+            </a:r>
+            <a:r>
+              <a:rPr lang="en-PH" sz="900" dirty="0"/>
+              <a:t> = </a:t>
+            </a:r>
+            <a:r>
+              <a:rPr lang="en-PH" sz="900" dirty="0" err="1"/>
+              <a:t>ValidateEmail</a:t>
+            </a:r>
+            <a:r>
+              <a:rPr lang="en-PH" sz="900" dirty="0"/>
+              <a:t>(email);</a:t>
+            </a:r>
+          </a:p>
+          <a:p>
+            <a:pPr marL="0">
+              <a:lnSpc>
+                <a:spcPct val="100000"/>
+              </a:lnSpc>
+              <a:spcBef>
+                <a:spcPts val="0"/>
+              </a:spcBef>
+            </a:pPr>
+            <a:r>
+              <a:rPr lang="en-PH" sz="900" dirty="0"/>
+              <a:t>		</a:t>
+            </a:r>
+          </a:p>
+          <a:p>
+            <a:pPr marL="0">
+              <a:lnSpc>
+                <a:spcPct val="100000"/>
+              </a:lnSpc>
+              <a:spcBef>
+                <a:spcPts val="0"/>
+              </a:spcBef>
+            </a:pPr>
+            <a:r>
+              <a:rPr lang="en-PH" sz="900" dirty="0"/>
+              <a:t>		</a:t>
+            </a:r>
+            <a:r>
+              <a:rPr lang="en-PH" sz="900" dirty="0" err="1"/>
+              <a:t>Console.WriteLine</a:t>
+            </a:r>
+            <a:r>
+              <a:rPr lang="en-PH" sz="900" dirty="0"/>
+              <a:t>($"Is {email} a valid email? {</a:t>
+            </a:r>
+            <a:r>
+              <a:rPr lang="en-PH" sz="900" dirty="0" err="1"/>
+              <a:t>isValid</a:t>
+            </a:r>
+            <a:r>
+              <a:rPr lang="en-PH" sz="900" dirty="0"/>
+              <a:t>}");</a:t>
+            </a:r>
+          </a:p>
+          <a:p>
+            <a:pPr marL="0">
+              <a:lnSpc>
+                <a:spcPct val="100000"/>
+              </a:lnSpc>
+              <a:spcBef>
+                <a:spcPts val="0"/>
+              </a:spcBef>
+            </a:pPr>
+            <a:r>
+              <a:rPr lang="en-PH" sz="900" dirty="0"/>
+              <a:t>	}</a:t>
+            </a:r>
+          </a:p>
+          <a:p>
+            <a:pPr marL="0">
+              <a:lnSpc>
+                <a:spcPct val="100000"/>
+              </a:lnSpc>
+              <a:spcBef>
+                <a:spcPts val="0"/>
+              </a:spcBef>
+            </a:pPr>
+            <a:endParaRPr lang="en-PH" sz="900" dirty="0"/>
+          </a:p>
+          <a:p>
+            <a:pPr marL="0">
+              <a:lnSpc>
+                <a:spcPct val="100000"/>
+              </a:lnSpc>
+              <a:spcBef>
+                <a:spcPts val="0"/>
+              </a:spcBef>
+            </a:pPr>
+            <a:r>
+              <a:rPr lang="en-PH" sz="900" dirty="0"/>
+              <a:t>	static bool </a:t>
+            </a:r>
+            <a:r>
+              <a:rPr lang="en-PH" sz="900" dirty="0" err="1"/>
+              <a:t>ValidateEmail</a:t>
+            </a:r>
+            <a:r>
+              <a:rPr lang="en-PH" sz="900" dirty="0"/>
+              <a:t>(string email)</a:t>
+            </a:r>
+          </a:p>
+          <a:p>
+            <a:pPr marL="0">
+              <a:lnSpc>
+                <a:spcPct val="100000"/>
+              </a:lnSpc>
+              <a:spcBef>
+                <a:spcPts val="0"/>
+              </a:spcBef>
+            </a:pPr>
+            <a:r>
+              <a:rPr lang="en-PH" sz="900" dirty="0"/>
+              <a:t>	{</a:t>
+            </a:r>
+          </a:p>
+          <a:p>
+            <a:pPr marL="0">
+              <a:lnSpc>
+                <a:spcPct val="100000"/>
+              </a:lnSpc>
+              <a:spcBef>
+                <a:spcPts val="0"/>
+              </a:spcBef>
+            </a:pPr>
+            <a:r>
+              <a:rPr lang="en-PH" sz="900" dirty="0"/>
+              <a:t>		if (</a:t>
+            </a:r>
+            <a:r>
+              <a:rPr lang="en-PH" sz="900" dirty="0" err="1"/>
+              <a:t>string.IsNullOrWhiteSpace</a:t>
+            </a:r>
+            <a:r>
+              <a:rPr lang="en-PH" sz="900" dirty="0"/>
+              <a:t>(email))</a:t>
+            </a:r>
+          </a:p>
+          <a:p>
+            <a:pPr marL="0">
+              <a:lnSpc>
+                <a:spcPct val="100000"/>
+              </a:lnSpc>
+              <a:spcBef>
+                <a:spcPts val="0"/>
+              </a:spcBef>
+            </a:pPr>
+            <a:r>
+              <a:rPr lang="en-PH" sz="900" dirty="0"/>
+              <a:t>		{</a:t>
+            </a:r>
+          </a:p>
+          <a:p>
+            <a:pPr marL="0">
+              <a:lnSpc>
+                <a:spcPct val="100000"/>
+              </a:lnSpc>
+              <a:spcBef>
+                <a:spcPts val="0"/>
+              </a:spcBef>
+            </a:pPr>
+            <a:r>
+              <a:rPr lang="en-PH" sz="900" dirty="0"/>
+              <a:t>			return false;</a:t>
+            </a:r>
+          </a:p>
+          <a:p>
+            <a:pPr marL="0">
+              <a:lnSpc>
+                <a:spcPct val="100000"/>
+              </a:lnSpc>
+              <a:spcBef>
+                <a:spcPts val="0"/>
+              </a:spcBef>
+            </a:pPr>
+            <a:r>
+              <a:rPr lang="en-PH" sz="900" dirty="0"/>
+              <a:t>		}</a:t>
+            </a:r>
+          </a:p>
+          <a:p>
+            <a:pPr marL="0">
+              <a:lnSpc>
+                <a:spcPct val="100000"/>
+              </a:lnSpc>
+              <a:spcBef>
+                <a:spcPts val="0"/>
+              </a:spcBef>
+            </a:pPr>
+            <a:endParaRPr lang="en-PH" sz="900" dirty="0"/>
+          </a:p>
+          <a:p>
+            <a:pPr marL="0">
+              <a:lnSpc>
+                <a:spcPct val="100000"/>
+              </a:lnSpc>
+              <a:spcBef>
+                <a:spcPts val="0"/>
+              </a:spcBef>
+            </a:pPr>
+            <a:r>
+              <a:rPr lang="en-PH" sz="900" dirty="0"/>
+              <a:t>		string[] parts = </a:t>
+            </a:r>
+            <a:r>
+              <a:rPr lang="en-PH" sz="900" dirty="0" err="1"/>
+              <a:t>email.Split</a:t>
+            </a:r>
+            <a:r>
+              <a:rPr lang="en-PH" sz="900" dirty="0"/>
+              <a:t>('@');</a:t>
+            </a:r>
+          </a:p>
+          <a:p>
+            <a:pPr marL="0">
+              <a:lnSpc>
+                <a:spcPct val="100000"/>
+              </a:lnSpc>
+              <a:spcBef>
+                <a:spcPts val="0"/>
+              </a:spcBef>
+            </a:pPr>
+            <a:r>
+              <a:rPr lang="en-PH" sz="900" dirty="0"/>
+              <a:t>		if (</a:t>
+            </a:r>
+            <a:r>
+              <a:rPr lang="en-PH" sz="900" dirty="0" err="1"/>
+              <a:t>parts.Length</a:t>
+            </a:r>
+            <a:r>
+              <a:rPr lang="en-PH" sz="900" dirty="0"/>
+              <a:t> != 2)</a:t>
+            </a:r>
+          </a:p>
+          <a:p>
+            <a:pPr marL="0">
+              <a:lnSpc>
+                <a:spcPct val="100000"/>
+              </a:lnSpc>
+              <a:spcBef>
+                <a:spcPts val="0"/>
+              </a:spcBef>
+            </a:pPr>
+            <a:r>
+              <a:rPr lang="en-PH" sz="900" dirty="0"/>
+              <a:t>		{</a:t>
+            </a:r>
+          </a:p>
+          <a:p>
+            <a:pPr marL="0">
+              <a:lnSpc>
+                <a:spcPct val="100000"/>
+              </a:lnSpc>
+              <a:spcBef>
+                <a:spcPts val="0"/>
+              </a:spcBef>
+            </a:pPr>
+            <a:r>
+              <a:rPr lang="en-PH" sz="900" dirty="0"/>
+              <a:t>			return false; // email must have exactly one @ symbol</a:t>
+            </a:r>
+          </a:p>
+          <a:p>
+            <a:pPr marL="0">
+              <a:lnSpc>
+                <a:spcPct val="100000"/>
+              </a:lnSpc>
+              <a:spcBef>
+                <a:spcPts val="0"/>
+              </a:spcBef>
+            </a:pPr>
+            <a:r>
+              <a:rPr lang="en-PH" sz="900" dirty="0"/>
+              <a:t>		}</a:t>
+            </a:r>
+          </a:p>
+          <a:p>
+            <a:pPr marL="0">
+              <a:lnSpc>
+                <a:spcPct val="100000"/>
+              </a:lnSpc>
+              <a:spcBef>
+                <a:spcPts val="0"/>
+              </a:spcBef>
+            </a:pPr>
+            <a:endParaRPr lang="en-PH" sz="900" dirty="0"/>
+          </a:p>
+          <a:p>
+            <a:pPr marL="0">
+              <a:lnSpc>
+                <a:spcPct val="100000"/>
+              </a:lnSpc>
+              <a:spcBef>
+                <a:spcPts val="0"/>
+              </a:spcBef>
+            </a:pPr>
+            <a:r>
+              <a:rPr lang="en-PH" sz="900" dirty="0"/>
+              <a:t>		string </a:t>
+            </a:r>
+            <a:r>
+              <a:rPr lang="en-PH" sz="900" dirty="0" err="1"/>
+              <a:t>localPart</a:t>
+            </a:r>
+            <a:r>
+              <a:rPr lang="en-PH" sz="900" dirty="0"/>
+              <a:t> = parts[0];</a:t>
+            </a:r>
+          </a:p>
+          <a:p>
+            <a:pPr marL="0">
+              <a:lnSpc>
+                <a:spcPct val="100000"/>
+              </a:lnSpc>
+              <a:spcBef>
+                <a:spcPts val="0"/>
+              </a:spcBef>
+            </a:pPr>
+            <a:r>
+              <a:rPr lang="en-PH" sz="900" dirty="0"/>
+              <a:t>		string </a:t>
+            </a:r>
+            <a:r>
+              <a:rPr lang="en-PH" sz="900" dirty="0" err="1"/>
+              <a:t>domainPart</a:t>
+            </a:r>
+            <a:r>
+              <a:rPr lang="en-PH" sz="900" dirty="0"/>
+              <a:t> = parts[1];</a:t>
+            </a:r>
+          </a:p>
+          <a:p>
+            <a:pPr marL="0">
+              <a:lnSpc>
+                <a:spcPct val="100000"/>
+              </a:lnSpc>
+              <a:spcBef>
+                <a:spcPts val="0"/>
+              </a:spcBef>
+            </a:pPr>
+            <a:r>
+              <a:rPr lang="en-PH" sz="900" dirty="0"/>
+              <a:t>		if (</a:t>
+            </a:r>
+            <a:r>
+              <a:rPr lang="en-PH" sz="900" dirty="0" err="1"/>
+              <a:t>string.IsNullOrWhiteSpace</a:t>
+            </a:r>
+            <a:r>
+              <a:rPr lang="en-PH" sz="900" dirty="0"/>
+              <a:t>(</a:t>
+            </a:r>
+            <a:r>
+              <a:rPr lang="en-PH" sz="900" dirty="0" err="1"/>
+              <a:t>localPart</a:t>
+            </a:r>
+            <a:r>
+              <a:rPr lang="en-PH" sz="900" dirty="0"/>
+              <a:t>) || </a:t>
+            </a:r>
+            <a:r>
+              <a:rPr lang="en-PH" sz="900" dirty="0" err="1"/>
+              <a:t>string.IsNullOrWhiteSpace</a:t>
+            </a:r>
+            <a:r>
+              <a:rPr lang="en-PH" sz="900" dirty="0"/>
+              <a:t>(</a:t>
+            </a:r>
+            <a:r>
+              <a:rPr lang="en-PH" sz="900" dirty="0" err="1"/>
+              <a:t>domainPart</a:t>
+            </a:r>
+            <a:r>
+              <a:rPr lang="en-PH" sz="900" dirty="0"/>
+              <a:t>))</a:t>
+            </a:r>
+          </a:p>
+          <a:p>
+            <a:pPr marL="0">
+              <a:lnSpc>
+                <a:spcPct val="100000"/>
+              </a:lnSpc>
+              <a:spcBef>
+                <a:spcPts val="0"/>
+              </a:spcBef>
+            </a:pPr>
+            <a:r>
+              <a:rPr lang="en-PH" sz="900" dirty="0"/>
+              <a:t>		{</a:t>
+            </a:r>
+          </a:p>
+          <a:p>
+            <a:pPr marL="0">
+              <a:lnSpc>
+                <a:spcPct val="100000"/>
+              </a:lnSpc>
+              <a:spcBef>
+                <a:spcPts val="0"/>
+              </a:spcBef>
+            </a:pPr>
+            <a:r>
+              <a:rPr lang="en-PH" sz="900" dirty="0"/>
+              <a:t>			return false; // local and domain parts cannot be empty</a:t>
+            </a:r>
+          </a:p>
+          <a:p>
+            <a:pPr marL="0">
+              <a:lnSpc>
+                <a:spcPct val="100000"/>
+              </a:lnSpc>
+              <a:spcBef>
+                <a:spcPts val="0"/>
+              </a:spcBef>
+            </a:pPr>
+            <a:r>
+              <a:rPr lang="en-PH" sz="900" dirty="0"/>
+              <a:t>		}</a:t>
+            </a:r>
+          </a:p>
+          <a:p>
+            <a:pPr marL="0">
+              <a:lnSpc>
+                <a:spcPct val="100000"/>
+              </a:lnSpc>
+              <a:spcBef>
+                <a:spcPts val="0"/>
+              </a:spcBef>
+            </a:pPr>
+            <a:endParaRPr lang="en-PH" sz="900" dirty="0"/>
+          </a:p>
+          <a:p>
+            <a:pPr marL="0">
+              <a:lnSpc>
+                <a:spcPct val="100000"/>
+              </a:lnSpc>
+              <a:spcBef>
+                <a:spcPts val="0"/>
+              </a:spcBef>
+            </a:pPr>
+            <a:r>
+              <a:rPr lang="en-PH" sz="900" dirty="0"/>
+              <a:t>		// check local part for valid characters</a:t>
+            </a:r>
+          </a:p>
+          <a:p>
+            <a:pPr marL="0">
+              <a:lnSpc>
+                <a:spcPct val="100000"/>
+              </a:lnSpc>
+              <a:spcBef>
+                <a:spcPts val="0"/>
+              </a:spcBef>
+            </a:pPr>
+            <a:r>
+              <a:rPr lang="en-PH" sz="900" dirty="0"/>
+              <a:t>		</a:t>
+            </a:r>
+            <a:r>
+              <a:rPr lang="en-PH" sz="900" dirty="0" err="1"/>
+              <a:t>foreach</a:t>
+            </a:r>
+            <a:r>
+              <a:rPr lang="en-PH" sz="900" dirty="0"/>
+              <a:t> (char c in </a:t>
+            </a:r>
+            <a:r>
+              <a:rPr lang="en-PH" sz="900" dirty="0" err="1"/>
+              <a:t>localPart</a:t>
+            </a:r>
+            <a:r>
+              <a:rPr lang="en-PH" sz="900" dirty="0"/>
+              <a:t>)</a:t>
+            </a:r>
+          </a:p>
+          <a:p>
+            <a:pPr marL="0">
+              <a:lnSpc>
+                <a:spcPct val="100000"/>
+              </a:lnSpc>
+              <a:spcBef>
+                <a:spcPts val="0"/>
+              </a:spcBef>
+            </a:pPr>
+            <a:r>
+              <a:rPr lang="en-PH" sz="900" dirty="0"/>
+              <a:t>		{</a:t>
+            </a:r>
+          </a:p>
+          <a:p>
+            <a:pPr marL="0">
+              <a:lnSpc>
+                <a:spcPct val="100000"/>
+              </a:lnSpc>
+              <a:spcBef>
+                <a:spcPts val="0"/>
+              </a:spcBef>
+            </a:pPr>
+            <a:r>
+              <a:rPr lang="en-PH" sz="900" dirty="0"/>
+              <a:t>			if (!</a:t>
+            </a:r>
+            <a:r>
+              <a:rPr lang="en-PH" sz="900" dirty="0" err="1"/>
+              <a:t>char.IsLetterOrDigit</a:t>
+            </a:r>
+            <a:r>
+              <a:rPr lang="en-PH" sz="900" dirty="0"/>
+              <a:t>(c) &amp;&amp; c != '.' &amp;&amp; c != '_' &amp;&amp; c != '-')</a:t>
+            </a:r>
+          </a:p>
+          <a:p>
+            <a:pPr marL="0">
+              <a:lnSpc>
+                <a:spcPct val="100000"/>
+              </a:lnSpc>
+              <a:spcBef>
+                <a:spcPts val="0"/>
+              </a:spcBef>
+            </a:pPr>
+            <a:r>
+              <a:rPr lang="en-PH" sz="900" dirty="0"/>
+              <a:t>			{</a:t>
+            </a:r>
+          </a:p>
+          <a:p>
+            <a:pPr marL="0">
+              <a:lnSpc>
+                <a:spcPct val="100000"/>
+              </a:lnSpc>
+              <a:spcBef>
+                <a:spcPts val="0"/>
+              </a:spcBef>
+            </a:pPr>
+            <a:r>
+              <a:rPr lang="en-PH" sz="900" dirty="0"/>
+              <a:t>				return false; // local part contains invalid character</a:t>
+            </a:r>
+          </a:p>
+          <a:p>
+            <a:pPr marL="0">
+              <a:lnSpc>
+                <a:spcPct val="100000"/>
+              </a:lnSpc>
+              <a:spcBef>
+                <a:spcPts val="0"/>
+              </a:spcBef>
+            </a:pPr>
+            <a:r>
+              <a:rPr lang="en-PH" sz="900" dirty="0"/>
+              <a:t>			}</a:t>
+            </a:r>
+          </a:p>
+          <a:p>
+            <a:pPr marL="0">
+              <a:lnSpc>
+                <a:spcPct val="100000"/>
+              </a:lnSpc>
+              <a:spcBef>
+                <a:spcPts val="0"/>
+              </a:spcBef>
+            </a:pPr>
+            <a:r>
+              <a:rPr lang="en-PH" sz="900" dirty="0"/>
+              <a:t>		}</a:t>
+            </a:r>
+          </a:p>
+          <a:p>
+            <a:pPr marL="0">
+              <a:lnSpc>
+                <a:spcPct val="100000"/>
+              </a:lnSpc>
+              <a:spcBef>
+                <a:spcPts val="0"/>
+              </a:spcBef>
+            </a:pPr>
+            <a:endParaRPr lang="en-PH" sz="900" dirty="0"/>
+          </a:p>
+          <a:p>
+            <a:pPr marL="0">
+              <a:lnSpc>
+                <a:spcPct val="100000"/>
+              </a:lnSpc>
+              <a:spcBef>
+                <a:spcPts val="0"/>
+              </a:spcBef>
+            </a:pPr>
+            <a:r>
+              <a:rPr lang="en-PH" sz="900" dirty="0"/>
+              <a:t>		// check domain part for valid format</a:t>
+            </a:r>
+          </a:p>
+          <a:p>
+            <a:pPr marL="0">
+              <a:lnSpc>
+                <a:spcPct val="100000"/>
+              </a:lnSpc>
+              <a:spcBef>
+                <a:spcPts val="0"/>
+              </a:spcBef>
+            </a:pPr>
+            <a:r>
+              <a:rPr lang="en-PH" sz="900" dirty="0"/>
+              <a:t>		if (</a:t>
+            </a:r>
+            <a:r>
+              <a:rPr lang="en-PH" sz="900" dirty="0" err="1"/>
+              <a:t>domainPart.Length</a:t>
+            </a:r>
+            <a:r>
+              <a:rPr lang="en-PH" sz="900" dirty="0"/>
+              <a:t> &lt; 2 || !</a:t>
+            </a:r>
+            <a:r>
+              <a:rPr lang="en-PH" sz="900" dirty="0" err="1"/>
+              <a:t>domainPart.Contains</a:t>
+            </a:r>
+            <a:r>
+              <a:rPr lang="en-PH" sz="900" dirty="0"/>
+              <a:t>(".") || </a:t>
+            </a:r>
+            <a:r>
+              <a:rPr lang="en-PH" sz="900" dirty="0" err="1"/>
+              <a:t>domainPart.Split</a:t>
+            </a:r>
+            <a:r>
+              <a:rPr lang="en-PH" sz="900" dirty="0"/>
+              <a:t>(".").Length !=2 ||  </a:t>
+            </a:r>
+            <a:r>
+              <a:rPr lang="en-PH" sz="900" dirty="0" err="1"/>
+              <a:t>domainPart.EndsWith</a:t>
+            </a:r>
+            <a:r>
+              <a:rPr lang="en-PH" sz="900" dirty="0"/>
+              <a:t>(".") || </a:t>
+            </a:r>
+            <a:r>
+              <a:rPr lang="en-PH" sz="900" dirty="0" err="1"/>
+              <a:t>domainPart.StartsWith</a:t>
+            </a:r>
+            <a:r>
+              <a:rPr lang="en-PH" sz="900" dirty="0"/>
+              <a:t>("."))</a:t>
+            </a:r>
+          </a:p>
+          <a:p>
+            <a:pPr marL="0">
+              <a:lnSpc>
+                <a:spcPct val="100000"/>
+              </a:lnSpc>
+              <a:spcBef>
+                <a:spcPts val="0"/>
+              </a:spcBef>
+            </a:pPr>
+            <a:r>
+              <a:rPr lang="en-PH" sz="900" dirty="0"/>
+              <a:t>		{</a:t>
+            </a:r>
+          </a:p>
+          <a:p>
+            <a:pPr marL="0">
+              <a:lnSpc>
+                <a:spcPct val="100000"/>
+              </a:lnSpc>
+              <a:spcBef>
+                <a:spcPts val="0"/>
+              </a:spcBef>
+            </a:pPr>
+            <a:r>
+              <a:rPr lang="en-PH" sz="900" dirty="0"/>
+              <a:t>			return false; // domain part is not a valid format</a:t>
+            </a:r>
+          </a:p>
+          <a:p>
+            <a:pPr marL="0">
+              <a:lnSpc>
+                <a:spcPct val="100000"/>
+              </a:lnSpc>
+              <a:spcBef>
+                <a:spcPts val="0"/>
+              </a:spcBef>
+            </a:pPr>
+            <a:r>
+              <a:rPr lang="en-PH" sz="900" dirty="0"/>
+              <a:t>		}</a:t>
+            </a:r>
+          </a:p>
+          <a:p>
+            <a:pPr marL="0">
+              <a:lnSpc>
+                <a:spcPct val="100000"/>
+              </a:lnSpc>
+              <a:spcBef>
+                <a:spcPts val="0"/>
+              </a:spcBef>
+            </a:pPr>
+            <a:endParaRPr lang="en-PH" sz="900" dirty="0"/>
+          </a:p>
+          <a:p>
+            <a:pPr marL="0">
+              <a:lnSpc>
+                <a:spcPct val="100000"/>
+              </a:lnSpc>
+              <a:spcBef>
+                <a:spcPts val="0"/>
+              </a:spcBef>
+            </a:pPr>
+            <a:r>
+              <a:rPr lang="en-PH" sz="900" dirty="0"/>
+              <a:t>		return true;</a:t>
+            </a:r>
+          </a:p>
+          <a:p>
+            <a:pPr marL="0">
+              <a:lnSpc>
+                <a:spcPct val="100000"/>
+              </a:lnSpc>
+              <a:spcBef>
+                <a:spcPts val="0"/>
+              </a:spcBef>
+            </a:pPr>
+            <a:r>
+              <a:rPr lang="en-PH" sz="900" dirty="0"/>
+              <a:t>	}</a:t>
+            </a:r>
+          </a:p>
+          <a:p>
+            <a:pPr marL="0">
+              <a:lnSpc>
+                <a:spcPct val="100000"/>
+              </a:lnSpc>
+              <a:spcBef>
+                <a:spcPts val="0"/>
+              </a:spcBef>
+            </a:pPr>
+            <a:r>
+              <a:rPr lang="en-PH" sz="900" dirty="0"/>
+              <a:t>}</a:t>
+            </a:r>
+          </a:p>
+        </p:txBody>
+      </p:sp>
+    </p:spTree>
+    <p:extLst>
+      <p:ext uri="{BB962C8B-B14F-4D97-AF65-F5344CB8AC3E}">
+        <p14:creationId xmlns:p14="http://schemas.microsoft.com/office/powerpoint/2010/main" val="3661293380"/>
+      </p:ext>
+    </p:extLst>
+  </p:cSld>
+  <p:clrMapOvr>
+    <a:masterClrMapping/>
+  </p:clrMapOvr>
+</p:sld>
+</file>
+
+<file path=ppt/slides/slide5.xml><?xml version="1.0" encoding="utf-8"?>
+<p:sld xmlns:a="http://schemas.openxmlformats.org/drawingml/2006/main" xmlns:r="http://schemas.openxmlformats.org/officeDocument/2006/relationships" xmlns:p="http://schemas.openxmlformats.org/presentationml/2006/main">
+  <p:cSld>
+    <p:spTree>
+      <p:nvGrpSpPr>
+        <p:cNvPr id="1" name=""/>
+        <p:cNvGrpSpPr/>
+        <p:nvPr/>
+      </p:nvGrpSpPr>
+      <p:grpSpPr>
+        <a:xfrm>
+          <a:off x="0" y="0"/>
+          <a:ext cx="0" cy="0"/>
+          <a:chOff x="0" y="0"/>
+          <a:chExt cx="0" cy="0"/>
+        </a:xfrm>
+      </p:grpSpPr>
+      <p:sp>
+        <p:nvSpPr>
+          <p:cNvPr id="3" name="Content Placeholder 2"/>
+          <p:cNvSpPr>
+            <a:spLocks noGrp="1"/>
+          </p:cNvSpPr>
+          <p:nvPr>
+            <p:ph idx="1"/>
+          </p:nvPr>
+        </p:nvSpPr>
+        <p:spPr>
+          <a:xfrm>
+            <a:off x="0" y="0"/>
+            <a:ext cx="11353800" cy="6176963"/>
+          </a:xfrm>
+        </p:spPr>
+        <p:txBody>
+          <a:bodyPr>
+            <a:noAutofit/>
+          </a:bodyPr>
+          <a:lstStyle/>
+          <a:p>
+            <a:pPr marL="0">
+              <a:lnSpc>
+                <a:spcPct val="100000"/>
+              </a:lnSpc>
+              <a:spcBef>
+                <a:spcPts val="0"/>
+              </a:spcBef>
+            </a:pPr>
+            <a:r>
+              <a:rPr lang="en-PH" sz="900" dirty="0"/>
+              <a:t>using System;</a:t>
+            </a:r>
+          </a:p>
+          <a:p>
+            <a:pPr marL="0">
+              <a:lnSpc>
+                <a:spcPct val="100000"/>
+              </a:lnSpc>
+              <a:spcBef>
+                <a:spcPts val="0"/>
+              </a:spcBef>
+            </a:pPr>
+            <a:r>
+              <a:rPr lang="en-PH" sz="900" dirty="0"/>
+              <a:t>using </a:t>
+            </a:r>
+            <a:r>
+              <a:rPr lang="en-PH" sz="900" dirty="0" err="1"/>
+              <a:t>System.Text.RegularExpressions</a:t>
+            </a:r>
+            <a:r>
+              <a:rPr lang="en-PH" sz="900" dirty="0"/>
+              <a:t>;</a:t>
+            </a:r>
+          </a:p>
+          <a:p>
+            <a:pPr marL="0">
+              <a:lnSpc>
+                <a:spcPct val="100000"/>
+              </a:lnSpc>
+              <a:spcBef>
+                <a:spcPts val="0"/>
+              </a:spcBef>
+            </a:pPr>
+            <a:endParaRPr lang="en-PH" sz="900" dirty="0"/>
+          </a:p>
+          <a:p>
+            <a:pPr marL="0">
+              <a:lnSpc>
+                <a:spcPct val="100000"/>
+              </a:lnSpc>
+              <a:spcBef>
+                <a:spcPts val="0"/>
+              </a:spcBef>
+            </a:pPr>
+            <a:r>
+              <a:rPr lang="en-PH" sz="900" dirty="0"/>
+              <a:t>public class Program</a:t>
+            </a:r>
+          </a:p>
+          <a:p>
+            <a:pPr marL="0">
+              <a:lnSpc>
+                <a:spcPct val="100000"/>
+              </a:lnSpc>
+              <a:spcBef>
+                <a:spcPts val="0"/>
+              </a:spcBef>
+            </a:pPr>
+            <a:r>
+              <a:rPr lang="en-PH" sz="900" dirty="0"/>
+              <a:t>{</a:t>
+            </a:r>
+          </a:p>
+          <a:p>
+            <a:pPr marL="0">
+              <a:lnSpc>
+                <a:spcPct val="100000"/>
+              </a:lnSpc>
+              <a:spcBef>
+                <a:spcPts val="0"/>
+              </a:spcBef>
+            </a:pPr>
+            <a:r>
+              <a:rPr lang="en-PH" sz="900" dirty="0"/>
+              <a:t>	public static void Main()</a:t>
+            </a:r>
+          </a:p>
+          <a:p>
+            <a:pPr marL="0">
+              <a:lnSpc>
+                <a:spcPct val="100000"/>
+              </a:lnSpc>
+              <a:spcBef>
+                <a:spcPts val="0"/>
+              </a:spcBef>
+            </a:pPr>
+            <a:r>
+              <a:rPr lang="en-PH" sz="900" dirty="0"/>
+              <a:t>	{</a:t>
+            </a:r>
+          </a:p>
+          <a:p>
+            <a:pPr marL="0">
+              <a:lnSpc>
+                <a:spcPct val="100000"/>
+              </a:lnSpc>
+              <a:spcBef>
+                <a:spcPts val="0"/>
+              </a:spcBef>
+            </a:pPr>
+            <a:r>
+              <a:rPr lang="en-PH" sz="900" dirty="0"/>
+              <a:t>		string email = "myemail@email.com";</a:t>
+            </a:r>
+          </a:p>
+          <a:p>
+            <a:pPr marL="0">
+              <a:lnSpc>
+                <a:spcPct val="100000"/>
+              </a:lnSpc>
+              <a:spcBef>
+                <a:spcPts val="0"/>
+              </a:spcBef>
+            </a:pPr>
+            <a:r>
+              <a:rPr lang="en-PH" sz="900" dirty="0"/>
+              <a:t>		bool </a:t>
+            </a:r>
+            <a:r>
+              <a:rPr lang="en-PH" sz="900" dirty="0" err="1"/>
+              <a:t>isValid</a:t>
+            </a:r>
+            <a:r>
+              <a:rPr lang="en-PH" sz="900" dirty="0"/>
+              <a:t> = </a:t>
+            </a:r>
+            <a:r>
+              <a:rPr lang="en-PH" sz="900" dirty="0" err="1"/>
+              <a:t>IsValidEmail</a:t>
+            </a:r>
+            <a:r>
+              <a:rPr lang="en-PH" sz="900" dirty="0"/>
+              <a:t>(email);</a:t>
+            </a:r>
+          </a:p>
+          <a:p>
+            <a:pPr marL="0">
+              <a:lnSpc>
+                <a:spcPct val="100000"/>
+              </a:lnSpc>
+              <a:spcBef>
+                <a:spcPts val="0"/>
+              </a:spcBef>
+            </a:pPr>
+            <a:r>
+              <a:rPr lang="en-PH" sz="900" dirty="0"/>
+              <a:t>		</a:t>
+            </a:r>
+          </a:p>
+          <a:p>
+            <a:pPr marL="0">
+              <a:lnSpc>
+                <a:spcPct val="100000"/>
+              </a:lnSpc>
+              <a:spcBef>
+                <a:spcPts val="0"/>
+              </a:spcBef>
+            </a:pPr>
+            <a:r>
+              <a:rPr lang="en-PH" sz="900" dirty="0"/>
+              <a:t>		</a:t>
+            </a:r>
+            <a:r>
+              <a:rPr lang="en-PH" sz="900" dirty="0" err="1"/>
+              <a:t>Console.WriteLine</a:t>
+            </a:r>
+            <a:r>
+              <a:rPr lang="en-PH" sz="900" dirty="0"/>
+              <a:t>($"Is {email} a valid email? {</a:t>
+            </a:r>
+            <a:r>
+              <a:rPr lang="en-PH" sz="900" dirty="0" err="1"/>
+              <a:t>isValid</a:t>
+            </a:r>
+            <a:r>
+              <a:rPr lang="en-PH" sz="900" dirty="0"/>
+              <a:t>}");</a:t>
+            </a:r>
+          </a:p>
+          <a:p>
+            <a:pPr marL="0">
+              <a:lnSpc>
+                <a:spcPct val="100000"/>
+              </a:lnSpc>
+              <a:spcBef>
+                <a:spcPts val="0"/>
+              </a:spcBef>
+            </a:pPr>
+            <a:endParaRPr lang="en-PH" sz="900" dirty="0"/>
+          </a:p>
+          <a:p>
+            <a:pPr marL="0">
+              <a:lnSpc>
+                <a:spcPct val="100000"/>
+              </a:lnSpc>
+              <a:spcBef>
+                <a:spcPts val="0"/>
+              </a:spcBef>
+            </a:pPr>
+            <a:r>
+              <a:rPr lang="en-PH" sz="900" dirty="0"/>
+              <a:t>	}</a:t>
+            </a:r>
+          </a:p>
+          <a:p>
+            <a:pPr marL="0">
+              <a:lnSpc>
+                <a:spcPct val="100000"/>
+              </a:lnSpc>
+              <a:spcBef>
+                <a:spcPts val="0"/>
+              </a:spcBef>
+            </a:pPr>
+            <a:endParaRPr lang="en-PH" sz="900" dirty="0"/>
+          </a:p>
+          <a:p>
+            <a:pPr marL="0">
+              <a:lnSpc>
+                <a:spcPct val="100000"/>
+              </a:lnSpc>
+              <a:spcBef>
+                <a:spcPts val="0"/>
+              </a:spcBef>
+            </a:pPr>
+            <a:r>
+              <a:rPr lang="en-PH" sz="900" dirty="0"/>
+              <a:t>	public static bool </a:t>
+            </a:r>
+            <a:r>
+              <a:rPr lang="en-PH" sz="900" dirty="0" err="1"/>
+              <a:t>IsValidEmail</a:t>
+            </a:r>
+            <a:r>
+              <a:rPr lang="en-PH" sz="900" dirty="0"/>
+              <a:t>(string email)</a:t>
+            </a:r>
+          </a:p>
+          <a:p>
+            <a:pPr marL="0">
+              <a:lnSpc>
+                <a:spcPct val="100000"/>
+              </a:lnSpc>
+              <a:spcBef>
+                <a:spcPts val="0"/>
+              </a:spcBef>
+            </a:pPr>
+            <a:r>
+              <a:rPr lang="en-PH" sz="900" dirty="0"/>
+              <a:t>	{</a:t>
+            </a:r>
+          </a:p>
+          <a:p>
+            <a:pPr marL="0">
+              <a:lnSpc>
+                <a:spcPct val="100000"/>
+              </a:lnSpc>
+              <a:spcBef>
+                <a:spcPts val="0"/>
+              </a:spcBef>
+            </a:pPr>
+            <a:r>
+              <a:rPr lang="en-PH" sz="900" dirty="0"/>
+              <a:t>		string </a:t>
+            </a:r>
+            <a:r>
+              <a:rPr lang="en-PH" sz="900" dirty="0" err="1"/>
+              <a:t>emailPattern</a:t>
+            </a:r>
+            <a:r>
+              <a:rPr lang="en-PH" sz="900" dirty="0"/>
+              <a:t> = @"^[a-zA-Z0-9._%+-]+@[a-zA-Z0-9.-]+\.[a-</a:t>
+            </a:r>
+            <a:r>
+              <a:rPr lang="en-PH" sz="900" dirty="0" err="1"/>
+              <a:t>zA</a:t>
+            </a:r>
+            <a:r>
+              <a:rPr lang="en-PH" sz="900" dirty="0"/>
+              <a:t>-Z]{2,}$";</a:t>
+            </a:r>
+          </a:p>
+          <a:p>
+            <a:pPr marL="0">
+              <a:lnSpc>
+                <a:spcPct val="100000"/>
+              </a:lnSpc>
+              <a:spcBef>
+                <a:spcPts val="0"/>
+              </a:spcBef>
+            </a:pPr>
+            <a:r>
+              <a:rPr lang="en-PH" sz="900" dirty="0"/>
+              <a:t>		</a:t>
+            </a:r>
+          </a:p>
+          <a:p>
+            <a:pPr marL="0">
+              <a:lnSpc>
+                <a:spcPct val="100000"/>
+              </a:lnSpc>
+              <a:spcBef>
+                <a:spcPts val="0"/>
+              </a:spcBef>
+            </a:pPr>
+            <a:r>
+              <a:rPr lang="en-PH" sz="900" dirty="0"/>
+              <a:t>		if (</a:t>
+            </a:r>
+            <a:r>
+              <a:rPr lang="en-PH" sz="900" dirty="0" err="1"/>
+              <a:t>string.IsNullOrEmpty</a:t>
+            </a:r>
+            <a:r>
+              <a:rPr lang="en-PH" sz="900" dirty="0"/>
+              <a:t>(email))</a:t>
+            </a:r>
+          </a:p>
+          <a:p>
+            <a:pPr marL="0">
+              <a:lnSpc>
+                <a:spcPct val="100000"/>
+              </a:lnSpc>
+              <a:spcBef>
+                <a:spcPts val="0"/>
+              </a:spcBef>
+            </a:pPr>
+            <a:r>
+              <a:rPr lang="en-PH" sz="900" dirty="0"/>
+              <a:t>			return false;</a:t>
+            </a:r>
+          </a:p>
+          <a:p>
+            <a:pPr marL="0">
+              <a:lnSpc>
+                <a:spcPct val="100000"/>
+              </a:lnSpc>
+              <a:spcBef>
+                <a:spcPts val="0"/>
+              </a:spcBef>
+            </a:pPr>
+            <a:r>
+              <a:rPr lang="en-PH" sz="900" dirty="0"/>
+              <a:t>		</a:t>
+            </a:r>
+          </a:p>
+          <a:p>
+            <a:pPr marL="0">
+              <a:lnSpc>
+                <a:spcPct val="100000"/>
+              </a:lnSpc>
+              <a:spcBef>
+                <a:spcPts val="0"/>
+              </a:spcBef>
+            </a:pPr>
+            <a:r>
+              <a:rPr lang="en-PH" sz="900" dirty="0"/>
+              <a:t>		Regex </a:t>
+            </a:r>
+            <a:r>
+              <a:rPr lang="en-PH" sz="900" dirty="0" err="1"/>
+              <a:t>regex</a:t>
+            </a:r>
+            <a:r>
+              <a:rPr lang="en-PH" sz="900" dirty="0"/>
+              <a:t> = new Regex(</a:t>
+            </a:r>
+            <a:r>
+              <a:rPr lang="en-PH" sz="900" dirty="0" err="1"/>
+              <a:t>emailPattern</a:t>
+            </a:r>
+            <a:r>
+              <a:rPr lang="en-PH" sz="900" dirty="0"/>
+              <a:t>);</a:t>
+            </a:r>
+          </a:p>
+          <a:p>
+            <a:pPr marL="0">
+              <a:lnSpc>
+                <a:spcPct val="100000"/>
+              </a:lnSpc>
+              <a:spcBef>
+                <a:spcPts val="0"/>
+              </a:spcBef>
+            </a:pPr>
+            <a:r>
+              <a:rPr lang="en-PH" sz="900" dirty="0"/>
+              <a:t>		return </a:t>
+            </a:r>
+            <a:r>
+              <a:rPr lang="en-PH" sz="900" dirty="0" err="1"/>
+              <a:t>regex.IsMatch</a:t>
+            </a:r>
+            <a:r>
+              <a:rPr lang="en-PH" sz="900" dirty="0"/>
+              <a:t>(email);</a:t>
+            </a:r>
+          </a:p>
+          <a:p>
+            <a:pPr marL="0">
+              <a:lnSpc>
+                <a:spcPct val="100000"/>
+              </a:lnSpc>
+              <a:spcBef>
+                <a:spcPts val="0"/>
+              </a:spcBef>
+            </a:pPr>
+            <a:r>
+              <a:rPr lang="en-PH" sz="900" dirty="0"/>
+              <a:t>	}</a:t>
+            </a:r>
+          </a:p>
+          <a:p>
+            <a:pPr marL="0">
+              <a:lnSpc>
+                <a:spcPct val="100000"/>
+              </a:lnSpc>
+              <a:spcBef>
+                <a:spcPts val="0"/>
+              </a:spcBef>
+            </a:pPr>
+            <a:r>
+              <a:rPr lang="en-PH" sz="900" dirty="0"/>
+              <a:t>}</a:t>
+            </a:r>
+          </a:p>
+        </p:txBody>
+      </p:sp>
+    </p:spTree>
+    <p:extLst>
+      <p:ext uri="{BB962C8B-B14F-4D97-AF65-F5344CB8AC3E}">
+        <p14:creationId xmlns:p14="http://schemas.microsoft.com/office/powerpoint/2010/main" val="3536399974"/>
+      </p:ext>
+    </p:extLst>
+  </p:cSld>
+  <p:clrMapOvr>
+    <a:masterClrMapping/>
+  </p:clrMapOvr>
+</p:sld>
+</file>
+
+<file path=ppt/slides/slide6.xml><?xml version="1.0" encoding="utf-8"?>
+<p:sld xmlns:a="http://schemas.openxmlformats.org/drawingml/2006/main" xmlns:r="http://schemas.openxmlformats.org/officeDocument/2006/relationships" xmlns:p="http://schemas.openxmlformats.org/presentationml/2006/main">
+  <p:cSld>
+    <p:spTree>
+      <p:nvGrpSpPr>
+        <p:cNvPr id="1" name=""/>
+        <p:cNvGrpSpPr/>
+        <p:nvPr/>
+      </p:nvGrpSpPr>
+      <p:grpSpPr>
+        <a:xfrm>
+          <a:off x="0" y="0"/>
+          <a:ext cx="0" cy="0"/>
+          <a:chOff x="0" y="0"/>
+          <a:chExt cx="0" cy="0"/>
+        </a:xfrm>
+      </p:grpSpPr>
+      <p:sp>
+        <p:nvSpPr>
+          <p:cNvPr id="3" name="Content Placeholder 2"/>
+          <p:cNvSpPr>
+            <a:spLocks noGrp="1"/>
+          </p:cNvSpPr>
+          <p:nvPr>
+            <p:ph idx="1"/>
+          </p:nvPr>
+        </p:nvSpPr>
+        <p:spPr>
+          <a:xfrm>
+            <a:off x="0" y="0"/>
+            <a:ext cx="11353800" cy="6176963"/>
+          </a:xfrm>
+        </p:spPr>
+        <p:txBody>
+          <a:bodyPr>
+            <a:noAutofit/>
+          </a:bodyPr>
+          <a:lstStyle/>
+          <a:p>
+            <a:pPr marL="0">
+              <a:lnSpc>
+                <a:spcPct val="100000"/>
+              </a:lnSpc>
+              <a:spcBef>
+                <a:spcPts val="0"/>
+              </a:spcBef>
+            </a:pPr>
+            <a:r>
+              <a:rPr lang="en-PH" sz="900" dirty="0"/>
+              <a:t>using System;</a:t>
+            </a:r>
+          </a:p>
+          <a:p>
+            <a:pPr marL="0">
+              <a:lnSpc>
+                <a:spcPct val="100000"/>
+              </a:lnSpc>
+              <a:spcBef>
+                <a:spcPts val="0"/>
+              </a:spcBef>
+            </a:pPr>
+            <a:r>
+              <a:rPr lang="en-PH" sz="900" dirty="0"/>
+              <a:t>using </a:t>
+            </a:r>
+            <a:r>
+              <a:rPr lang="en-PH" sz="900" dirty="0" err="1"/>
+              <a:t>System.Net.Mail</a:t>
+            </a:r>
+            <a:r>
+              <a:rPr lang="en-PH" sz="900" dirty="0"/>
+              <a:t>;</a:t>
+            </a:r>
+          </a:p>
+          <a:p>
+            <a:pPr marL="0">
+              <a:lnSpc>
+                <a:spcPct val="100000"/>
+              </a:lnSpc>
+              <a:spcBef>
+                <a:spcPts val="0"/>
+              </a:spcBef>
+            </a:pPr>
+            <a:r>
+              <a:rPr lang="en-PH" sz="900" dirty="0"/>
+              <a:t> </a:t>
+            </a:r>
+          </a:p>
+          <a:p>
+            <a:pPr marL="0">
+              <a:lnSpc>
+                <a:spcPct val="100000"/>
+              </a:lnSpc>
+              <a:spcBef>
+                <a:spcPts val="0"/>
+              </a:spcBef>
+            </a:pPr>
+            <a:r>
+              <a:rPr lang="en-PH" sz="900" dirty="0"/>
+              <a:t>class Program {</a:t>
+            </a:r>
+          </a:p>
+          <a:p>
+            <a:pPr marL="0">
+              <a:lnSpc>
+                <a:spcPct val="100000"/>
+              </a:lnSpc>
+              <a:spcBef>
+                <a:spcPts val="0"/>
+              </a:spcBef>
+            </a:pPr>
+            <a:r>
+              <a:rPr lang="en-PH" sz="900" dirty="0"/>
+              <a:t>    static void Main(string[] </a:t>
+            </a:r>
+            <a:r>
+              <a:rPr lang="en-PH" sz="900" dirty="0" err="1"/>
+              <a:t>args</a:t>
+            </a:r>
+            <a:r>
+              <a:rPr lang="en-PH" sz="900" dirty="0"/>
+              <a:t>) {</a:t>
+            </a:r>
+          </a:p>
+          <a:p>
+            <a:pPr marL="0">
+              <a:lnSpc>
+                <a:spcPct val="100000"/>
+              </a:lnSpc>
+              <a:spcBef>
+                <a:spcPts val="0"/>
+              </a:spcBef>
+            </a:pPr>
+            <a:r>
+              <a:rPr lang="en-PH" sz="900" dirty="0"/>
+              <a:t>        string email = "myemail@email.com";</a:t>
+            </a:r>
+          </a:p>
+          <a:p>
+            <a:pPr marL="0">
+              <a:lnSpc>
+                <a:spcPct val="100000"/>
+              </a:lnSpc>
+              <a:spcBef>
+                <a:spcPts val="0"/>
+              </a:spcBef>
+            </a:pPr>
+            <a:r>
+              <a:rPr lang="en-PH" sz="900" dirty="0"/>
+              <a:t>        bool </a:t>
+            </a:r>
+            <a:r>
+              <a:rPr lang="en-PH" sz="900" dirty="0" err="1"/>
+              <a:t>isValid</a:t>
+            </a:r>
+            <a:r>
+              <a:rPr lang="en-PH" sz="900" dirty="0"/>
+              <a:t> = </a:t>
+            </a:r>
+            <a:r>
+              <a:rPr lang="en-PH" sz="900" dirty="0" err="1"/>
+              <a:t>isValidEmail</a:t>
+            </a:r>
+            <a:r>
+              <a:rPr lang="en-PH" sz="900" dirty="0"/>
+              <a:t>(email);</a:t>
+            </a:r>
+          </a:p>
+          <a:p>
+            <a:pPr marL="0">
+              <a:lnSpc>
+                <a:spcPct val="100000"/>
+              </a:lnSpc>
+              <a:spcBef>
+                <a:spcPts val="0"/>
+              </a:spcBef>
+            </a:pPr>
+            <a:r>
+              <a:rPr lang="en-PH" sz="900" dirty="0"/>
+              <a:t>        </a:t>
+            </a:r>
+            <a:r>
+              <a:rPr lang="en-PH" sz="900" dirty="0" err="1"/>
+              <a:t>Console.WriteLine</a:t>
+            </a:r>
+            <a:r>
+              <a:rPr lang="en-PH" sz="900" dirty="0"/>
+              <a:t>($"Is {email} a valid email? {</a:t>
+            </a:r>
+            <a:r>
+              <a:rPr lang="en-PH" sz="900" dirty="0" err="1"/>
+              <a:t>isValid</a:t>
+            </a:r>
+            <a:r>
+              <a:rPr lang="en-PH" sz="900" dirty="0"/>
+              <a:t>}");</a:t>
+            </a:r>
+          </a:p>
+          <a:p>
+            <a:pPr marL="0">
+              <a:lnSpc>
+                <a:spcPct val="100000"/>
+              </a:lnSpc>
+              <a:spcBef>
+                <a:spcPts val="0"/>
+              </a:spcBef>
+            </a:pPr>
+            <a:r>
+              <a:rPr lang="en-PH" sz="900" dirty="0"/>
+              <a:t>    }</a:t>
+            </a:r>
+          </a:p>
+          <a:p>
+            <a:pPr marL="0">
+              <a:lnSpc>
+                <a:spcPct val="100000"/>
+              </a:lnSpc>
+              <a:spcBef>
+                <a:spcPts val="0"/>
+              </a:spcBef>
+            </a:pPr>
+            <a:r>
+              <a:rPr lang="en-PH" sz="900" dirty="0"/>
+              <a:t> </a:t>
+            </a:r>
+          </a:p>
+          <a:p>
+            <a:pPr marL="0">
+              <a:lnSpc>
+                <a:spcPct val="100000"/>
+              </a:lnSpc>
+              <a:spcBef>
+                <a:spcPts val="0"/>
+              </a:spcBef>
+            </a:pPr>
+            <a:r>
+              <a:rPr lang="en-PH" sz="900" dirty="0"/>
+              <a:t>    static bool </a:t>
+            </a:r>
+            <a:r>
+              <a:rPr lang="en-PH" sz="900" dirty="0" err="1"/>
+              <a:t>isValidEmail</a:t>
+            </a:r>
+            <a:r>
+              <a:rPr lang="en-PH" sz="900" dirty="0"/>
+              <a:t>(string email) {</a:t>
+            </a:r>
+          </a:p>
+          <a:p>
+            <a:pPr marL="0">
+              <a:lnSpc>
+                <a:spcPct val="100000"/>
+              </a:lnSpc>
+              <a:spcBef>
+                <a:spcPts val="0"/>
+              </a:spcBef>
+            </a:pPr>
+            <a:r>
+              <a:rPr lang="en-PH" sz="900" dirty="0"/>
+              <a:t>        if (</a:t>
+            </a:r>
+            <a:r>
+              <a:rPr lang="en-PH" sz="900" dirty="0" err="1"/>
+              <a:t>string.IsNullOrWhiteSpace</a:t>
+            </a:r>
+            <a:r>
+              <a:rPr lang="en-PH" sz="900" dirty="0"/>
+              <a:t>(email)) {</a:t>
+            </a:r>
+          </a:p>
+          <a:p>
+            <a:pPr marL="0">
+              <a:lnSpc>
+                <a:spcPct val="100000"/>
+              </a:lnSpc>
+              <a:spcBef>
+                <a:spcPts val="0"/>
+              </a:spcBef>
+            </a:pPr>
+            <a:r>
+              <a:rPr lang="en-PH" sz="900" dirty="0"/>
+              <a:t>            return false;</a:t>
+            </a:r>
+          </a:p>
+          <a:p>
+            <a:pPr marL="0">
+              <a:lnSpc>
+                <a:spcPct val="100000"/>
+              </a:lnSpc>
+              <a:spcBef>
+                <a:spcPts val="0"/>
+              </a:spcBef>
+            </a:pPr>
+            <a:r>
+              <a:rPr lang="en-PH" sz="900" dirty="0"/>
+              <a:t>        }</a:t>
+            </a:r>
+          </a:p>
+          <a:p>
+            <a:pPr marL="0">
+              <a:lnSpc>
+                <a:spcPct val="100000"/>
+              </a:lnSpc>
+              <a:spcBef>
+                <a:spcPts val="0"/>
+              </a:spcBef>
+            </a:pPr>
+            <a:r>
+              <a:rPr lang="en-PH" sz="900" dirty="0"/>
+              <a:t> </a:t>
+            </a:r>
+          </a:p>
+          <a:p>
+            <a:pPr marL="0">
+              <a:lnSpc>
+                <a:spcPct val="100000"/>
+              </a:lnSpc>
+              <a:spcBef>
+                <a:spcPts val="0"/>
+              </a:spcBef>
+            </a:pPr>
+            <a:r>
+              <a:rPr lang="en-PH" sz="900" dirty="0"/>
+              <a:t>        try {</a:t>
+            </a:r>
+          </a:p>
+          <a:p>
+            <a:pPr marL="0">
+              <a:lnSpc>
+                <a:spcPct val="100000"/>
+              </a:lnSpc>
+              <a:spcBef>
+                <a:spcPts val="0"/>
+              </a:spcBef>
+            </a:pPr>
+            <a:r>
+              <a:rPr lang="en-PH" sz="900" dirty="0"/>
+              <a:t>            // Use </a:t>
+            </a:r>
+            <a:r>
+              <a:rPr lang="en-PH" sz="900" dirty="0" err="1"/>
+              <a:t>MailAddress</a:t>
+            </a:r>
+            <a:r>
+              <a:rPr lang="en-PH" sz="900" dirty="0"/>
+              <a:t> class to validate email format</a:t>
+            </a:r>
+          </a:p>
+          <a:p>
+            <a:pPr marL="0">
+              <a:lnSpc>
+                <a:spcPct val="100000"/>
+              </a:lnSpc>
+              <a:spcBef>
+                <a:spcPts val="0"/>
+              </a:spcBef>
+            </a:pPr>
+            <a:r>
+              <a:rPr lang="en-PH" sz="900" dirty="0"/>
+              <a:t>            </a:t>
+            </a:r>
+            <a:r>
+              <a:rPr lang="en-PH" sz="900" dirty="0" err="1"/>
+              <a:t>var</a:t>
+            </a:r>
+            <a:r>
+              <a:rPr lang="en-PH" sz="900" dirty="0"/>
+              <a:t> </a:t>
+            </a:r>
+            <a:r>
+              <a:rPr lang="en-PH" sz="900" dirty="0" err="1"/>
+              <a:t>addr</a:t>
+            </a:r>
+            <a:r>
+              <a:rPr lang="en-PH" sz="900" dirty="0"/>
+              <a:t> = new </a:t>
+            </a:r>
+            <a:r>
+              <a:rPr lang="en-PH" sz="900" dirty="0" err="1"/>
+              <a:t>MailAddress</a:t>
+            </a:r>
+            <a:r>
+              <a:rPr lang="en-PH" sz="900" dirty="0"/>
+              <a:t>(email);</a:t>
+            </a:r>
+          </a:p>
+          <a:p>
+            <a:pPr marL="0">
+              <a:lnSpc>
+                <a:spcPct val="100000"/>
+              </a:lnSpc>
+              <a:spcBef>
+                <a:spcPts val="0"/>
+              </a:spcBef>
+            </a:pPr>
+            <a:r>
+              <a:rPr lang="en-PH" sz="900" dirty="0"/>
+              <a:t>            return true;</a:t>
+            </a:r>
+          </a:p>
+          <a:p>
+            <a:pPr marL="0">
+              <a:lnSpc>
+                <a:spcPct val="100000"/>
+              </a:lnSpc>
+              <a:spcBef>
+                <a:spcPts val="0"/>
+              </a:spcBef>
+            </a:pPr>
+            <a:r>
+              <a:rPr lang="en-PH" sz="900" dirty="0"/>
+              <a:t>        }</a:t>
+            </a:r>
+          </a:p>
+          <a:p>
+            <a:pPr marL="0">
+              <a:lnSpc>
+                <a:spcPct val="100000"/>
+              </a:lnSpc>
+              <a:spcBef>
+                <a:spcPts val="0"/>
+              </a:spcBef>
+            </a:pPr>
+            <a:r>
+              <a:rPr lang="en-PH" sz="900" dirty="0"/>
+              <a:t>        catch {</a:t>
+            </a:r>
+          </a:p>
+          <a:p>
+            <a:pPr marL="0">
+              <a:lnSpc>
+                <a:spcPct val="100000"/>
+              </a:lnSpc>
+              <a:spcBef>
+                <a:spcPts val="0"/>
+              </a:spcBef>
+            </a:pPr>
+            <a:r>
+              <a:rPr lang="en-PH" sz="900" dirty="0"/>
+              <a:t>            return false;</a:t>
+            </a:r>
+          </a:p>
+          <a:p>
+            <a:pPr marL="0">
+              <a:lnSpc>
+                <a:spcPct val="100000"/>
+              </a:lnSpc>
+              <a:spcBef>
+                <a:spcPts val="0"/>
+              </a:spcBef>
+            </a:pPr>
+            <a:r>
+              <a:rPr lang="en-PH" sz="900" dirty="0"/>
+              <a:t>        }</a:t>
+            </a:r>
+          </a:p>
+          <a:p>
+            <a:pPr marL="0">
+              <a:lnSpc>
+                <a:spcPct val="100000"/>
+              </a:lnSpc>
+              <a:spcBef>
+                <a:spcPts val="0"/>
+              </a:spcBef>
+            </a:pPr>
+            <a:r>
+              <a:rPr lang="en-PH" sz="900" dirty="0"/>
+              <a:t>    }</a:t>
+            </a:r>
+          </a:p>
+          <a:p>
+            <a:pPr marL="0">
+              <a:lnSpc>
+                <a:spcPct val="100000"/>
+              </a:lnSpc>
+              <a:spcBef>
+                <a:spcPts val="0"/>
+              </a:spcBef>
+            </a:pPr>
+            <a:r>
+              <a:rPr lang="en-PH" sz="900" dirty="0"/>
+              <a:t>}</a:t>
+            </a:r>
+          </a:p>
+        </p:txBody>
+      </p:sp>
+    </p:spTree>
+    <p:extLst>
+      <p:ext uri="{BB962C8B-B14F-4D97-AF65-F5344CB8AC3E}">
+        <p14:creationId xmlns:p14="http://schemas.microsoft.com/office/powerpoint/2010/main" val="3240529287"/>
+      </p:ext>
+    </p:extLst>
+  </p:cSld>
+  <p:clrMapOvr>
+    <a:masterClrMapping/>
+  </p:clrMapOvr>
+</p:sld>
+</file>
+
+<file path=ppt/slides/slide7.xml><?xml version="1.0" encoding="utf-8"?>
+<p:sld xmlns:a="http://schemas.openxmlformats.org/drawingml/2006/main" xmlns:r="http://schemas.openxmlformats.org/officeDocument/2006/relationships" xmlns:p="http://schemas.openxmlformats.org/presentationml/2006/main">
+  <p:cSld>
+    <p:spTree>
+      <p:nvGrpSpPr>
+        <p:cNvPr id="1" name=""/>
+        <p:cNvGrpSpPr/>
+        <p:nvPr/>
+      </p:nvGrpSpPr>
+      <p:grpSpPr>
+        <a:xfrm>
+          <a:off x="0" y="0"/>
+          <a:ext cx="0" cy="0"/>
+          <a:chOff x="0" y="0"/>
+          <a:chExt cx="0" cy="0"/>
+        </a:xfrm>
+      </p:grpSpPr>
+      <p:sp>
+        <p:nvSpPr>
+          <p:cNvPr id="3" name="Content Placeholder 2"/>
+          <p:cNvSpPr>
+            <a:spLocks noGrp="1"/>
+          </p:cNvSpPr>
+          <p:nvPr>
+            <p:ph idx="1"/>
+          </p:nvPr>
+        </p:nvSpPr>
+        <p:spPr>
+          <a:xfrm>
+            <a:off x="0" y="0"/>
+            <a:ext cx="11353800" cy="6176963"/>
+          </a:xfrm>
+        </p:spPr>
+        <p:txBody>
+          <a:bodyPr>
+            <a:noAutofit/>
+          </a:bodyPr>
+          <a:lstStyle/>
+          <a:p>
+            <a:pPr marL="0">
+              <a:lnSpc>
+                <a:spcPct val="100000"/>
+              </a:lnSpc>
+              <a:spcBef>
+                <a:spcPts val="0"/>
+              </a:spcBef>
+            </a:pPr>
+            <a:r>
+              <a:rPr lang="en-PH" sz="900" dirty="0"/>
+              <a:t>using System;</a:t>
+            </a:r>
+          </a:p>
+          <a:p>
+            <a:pPr marL="0">
+              <a:lnSpc>
+                <a:spcPct val="100000"/>
+              </a:lnSpc>
+              <a:spcBef>
+                <a:spcPts val="0"/>
+              </a:spcBef>
+            </a:pPr>
+            <a:r>
+              <a:rPr lang="en-PH" sz="900" dirty="0"/>
+              <a:t>using </a:t>
+            </a:r>
+            <a:r>
+              <a:rPr lang="en-PH" sz="900" dirty="0" err="1"/>
+              <a:t>System.Net</a:t>
+            </a:r>
+            <a:r>
+              <a:rPr lang="en-PH" sz="900" dirty="0"/>
+              <a:t>;</a:t>
+            </a:r>
+          </a:p>
+          <a:p>
+            <a:pPr marL="0">
+              <a:lnSpc>
+                <a:spcPct val="100000"/>
+              </a:lnSpc>
+              <a:spcBef>
+                <a:spcPts val="0"/>
+              </a:spcBef>
+            </a:pPr>
+            <a:r>
+              <a:rPr lang="en-PH" sz="900" dirty="0"/>
+              <a:t> </a:t>
+            </a:r>
+          </a:p>
+          <a:p>
+            <a:pPr marL="0">
+              <a:lnSpc>
+                <a:spcPct val="100000"/>
+              </a:lnSpc>
+              <a:spcBef>
+                <a:spcPts val="0"/>
+              </a:spcBef>
+            </a:pPr>
+            <a:r>
+              <a:rPr lang="en-PH" sz="900" dirty="0"/>
+              <a:t>class Program {</a:t>
+            </a:r>
+          </a:p>
+          <a:p>
+            <a:pPr marL="0">
+              <a:lnSpc>
+                <a:spcPct val="100000"/>
+              </a:lnSpc>
+              <a:spcBef>
+                <a:spcPts val="0"/>
+              </a:spcBef>
+            </a:pPr>
+            <a:r>
+              <a:rPr lang="en-PH" sz="900" dirty="0"/>
+              <a:t>    static void Main(string[] </a:t>
+            </a:r>
+            <a:r>
+              <a:rPr lang="en-PH" sz="900" dirty="0" err="1"/>
+              <a:t>args</a:t>
+            </a:r>
+            <a:r>
+              <a:rPr lang="en-PH" sz="900" dirty="0"/>
+              <a:t>) {</a:t>
+            </a:r>
+          </a:p>
+          <a:p>
+            <a:pPr marL="0">
+              <a:lnSpc>
+                <a:spcPct val="100000"/>
+              </a:lnSpc>
+              <a:spcBef>
+                <a:spcPts val="0"/>
+              </a:spcBef>
+            </a:pPr>
+            <a:r>
+              <a:rPr lang="en-PH" sz="900" dirty="0"/>
+              <a:t>        string email = "myemail@email.com";</a:t>
+            </a:r>
+          </a:p>
+          <a:p>
+            <a:pPr marL="0">
+              <a:lnSpc>
+                <a:spcPct val="100000"/>
+              </a:lnSpc>
+              <a:spcBef>
+                <a:spcPts val="0"/>
+              </a:spcBef>
+            </a:pPr>
+            <a:r>
+              <a:rPr lang="en-PH" sz="900" dirty="0"/>
+              <a:t>        bool </a:t>
+            </a:r>
+            <a:r>
+              <a:rPr lang="en-PH" sz="900" dirty="0" err="1"/>
+              <a:t>isValid</a:t>
+            </a:r>
+            <a:r>
+              <a:rPr lang="en-PH" sz="900" dirty="0"/>
+              <a:t> = </a:t>
+            </a:r>
+            <a:r>
+              <a:rPr lang="en-PH" sz="900" dirty="0" err="1"/>
+              <a:t>isValidEmailDomain</a:t>
+            </a:r>
+            <a:r>
+              <a:rPr lang="en-PH" sz="900" dirty="0"/>
+              <a:t>(email);</a:t>
+            </a:r>
+          </a:p>
+          <a:p>
+            <a:pPr marL="0">
+              <a:lnSpc>
+                <a:spcPct val="100000"/>
+              </a:lnSpc>
+              <a:spcBef>
+                <a:spcPts val="0"/>
+              </a:spcBef>
+            </a:pPr>
+            <a:r>
+              <a:rPr lang="en-PH" sz="900" dirty="0"/>
+              <a:t>        </a:t>
+            </a:r>
+            <a:r>
+              <a:rPr lang="en-PH" sz="900" dirty="0" err="1"/>
+              <a:t>Console.WriteLine</a:t>
+            </a:r>
+            <a:r>
+              <a:rPr lang="en-PH" sz="900" dirty="0"/>
+              <a:t>($"Is {email} a valid email? {</a:t>
+            </a:r>
+            <a:r>
+              <a:rPr lang="en-PH" sz="900" dirty="0" err="1"/>
+              <a:t>isValid</a:t>
+            </a:r>
+            <a:r>
+              <a:rPr lang="en-PH" sz="900" dirty="0"/>
+              <a:t>}");</a:t>
+            </a:r>
+          </a:p>
+          <a:p>
+            <a:pPr marL="0">
+              <a:lnSpc>
+                <a:spcPct val="100000"/>
+              </a:lnSpc>
+              <a:spcBef>
+                <a:spcPts val="0"/>
+              </a:spcBef>
+            </a:pPr>
+            <a:r>
+              <a:rPr lang="en-PH" sz="900" dirty="0"/>
+              <a:t>    }</a:t>
+            </a:r>
+          </a:p>
+          <a:p>
+            <a:pPr marL="0">
+              <a:lnSpc>
+                <a:spcPct val="100000"/>
+              </a:lnSpc>
+              <a:spcBef>
+                <a:spcPts val="0"/>
+              </a:spcBef>
+            </a:pPr>
+            <a:r>
+              <a:rPr lang="en-PH" sz="900" dirty="0"/>
+              <a:t> </a:t>
+            </a:r>
+          </a:p>
+          <a:p>
+            <a:pPr marL="0">
+              <a:lnSpc>
+                <a:spcPct val="100000"/>
+              </a:lnSpc>
+              <a:spcBef>
+                <a:spcPts val="0"/>
+              </a:spcBef>
+            </a:pPr>
+            <a:r>
+              <a:rPr lang="en-PH" sz="900" dirty="0"/>
+              <a:t>    static bool </a:t>
+            </a:r>
+            <a:r>
+              <a:rPr lang="en-PH" sz="900" dirty="0" err="1"/>
+              <a:t>isValidEmailDomain</a:t>
+            </a:r>
+            <a:r>
+              <a:rPr lang="en-PH" sz="900" dirty="0"/>
+              <a:t>(string email) {</a:t>
+            </a:r>
+          </a:p>
+          <a:p>
+            <a:pPr marL="0">
+              <a:lnSpc>
+                <a:spcPct val="100000"/>
+              </a:lnSpc>
+              <a:spcBef>
+                <a:spcPts val="0"/>
+              </a:spcBef>
+            </a:pPr>
+            <a:r>
+              <a:rPr lang="en-PH" sz="900" dirty="0"/>
+              <a:t>        if (</a:t>
+            </a:r>
+            <a:r>
+              <a:rPr lang="en-PH" sz="900" dirty="0" err="1"/>
+              <a:t>string.IsNullOrWhiteSpace</a:t>
+            </a:r>
+            <a:r>
+              <a:rPr lang="en-PH" sz="900" dirty="0"/>
+              <a:t>(email)) {</a:t>
+            </a:r>
+          </a:p>
+          <a:p>
+            <a:pPr marL="0">
+              <a:lnSpc>
+                <a:spcPct val="100000"/>
+              </a:lnSpc>
+              <a:spcBef>
+                <a:spcPts val="0"/>
+              </a:spcBef>
+            </a:pPr>
+            <a:r>
+              <a:rPr lang="en-PH" sz="900" dirty="0"/>
+              <a:t>            return false;</a:t>
+            </a:r>
+          </a:p>
+          <a:p>
+            <a:pPr marL="0">
+              <a:lnSpc>
+                <a:spcPct val="100000"/>
+              </a:lnSpc>
+              <a:spcBef>
+                <a:spcPts val="0"/>
+              </a:spcBef>
+            </a:pPr>
+            <a:r>
+              <a:rPr lang="en-PH" sz="900" dirty="0"/>
+              <a:t>        }</a:t>
+            </a:r>
+          </a:p>
+          <a:p>
+            <a:pPr marL="0">
+              <a:lnSpc>
+                <a:spcPct val="100000"/>
+              </a:lnSpc>
+              <a:spcBef>
+                <a:spcPts val="0"/>
+              </a:spcBef>
+            </a:pPr>
+            <a:r>
+              <a:rPr lang="en-PH" sz="900" dirty="0"/>
+              <a:t> </a:t>
+            </a:r>
+          </a:p>
+          <a:p>
+            <a:pPr marL="0">
+              <a:lnSpc>
+                <a:spcPct val="100000"/>
+              </a:lnSpc>
+              <a:spcBef>
+                <a:spcPts val="0"/>
+              </a:spcBef>
+            </a:pPr>
+            <a:r>
+              <a:rPr lang="en-PH" sz="900" dirty="0"/>
+              <a:t>        string[] parts = </a:t>
+            </a:r>
+            <a:r>
+              <a:rPr lang="en-PH" sz="900" dirty="0" err="1"/>
+              <a:t>email.Split</a:t>
+            </a:r>
+            <a:r>
+              <a:rPr lang="en-PH" sz="900" dirty="0"/>
+              <a:t>('@');</a:t>
+            </a:r>
+          </a:p>
+          <a:p>
+            <a:pPr marL="0">
+              <a:lnSpc>
+                <a:spcPct val="100000"/>
+              </a:lnSpc>
+              <a:spcBef>
+                <a:spcPts val="0"/>
+              </a:spcBef>
+            </a:pPr>
+            <a:r>
+              <a:rPr lang="en-PH" sz="900" dirty="0"/>
+              <a:t>        if (</a:t>
+            </a:r>
+            <a:r>
+              <a:rPr lang="en-PH" sz="900" dirty="0" err="1"/>
+              <a:t>parts.Length</a:t>
+            </a:r>
+            <a:r>
+              <a:rPr lang="en-PH" sz="900" dirty="0"/>
+              <a:t> != 2) {</a:t>
+            </a:r>
+          </a:p>
+          <a:p>
+            <a:pPr marL="0">
+              <a:lnSpc>
+                <a:spcPct val="100000"/>
+              </a:lnSpc>
+              <a:spcBef>
+                <a:spcPts val="0"/>
+              </a:spcBef>
+            </a:pPr>
+            <a:r>
+              <a:rPr lang="en-PH" sz="900" dirty="0"/>
+              <a:t>            return false; // email must have exactly one @ symbol</a:t>
+            </a:r>
+          </a:p>
+          <a:p>
+            <a:pPr marL="0">
+              <a:lnSpc>
+                <a:spcPct val="100000"/>
+              </a:lnSpc>
+              <a:spcBef>
+                <a:spcPts val="0"/>
+              </a:spcBef>
+            </a:pPr>
+            <a:r>
+              <a:rPr lang="en-PH" sz="900" dirty="0"/>
+              <a:t>        }</a:t>
+            </a:r>
+          </a:p>
+          <a:p>
+            <a:pPr marL="0">
+              <a:lnSpc>
+                <a:spcPct val="100000"/>
+              </a:lnSpc>
+              <a:spcBef>
+                <a:spcPts val="0"/>
+              </a:spcBef>
+            </a:pPr>
+            <a:r>
+              <a:rPr lang="en-PH" sz="900" dirty="0"/>
+              <a:t> </a:t>
+            </a:r>
+          </a:p>
+          <a:p>
+            <a:pPr marL="0">
+              <a:lnSpc>
+                <a:spcPct val="100000"/>
+              </a:lnSpc>
+              <a:spcBef>
+                <a:spcPts val="0"/>
+              </a:spcBef>
+            </a:pPr>
+            <a:r>
+              <a:rPr lang="en-PH" sz="900" dirty="0"/>
+              <a:t>        string </a:t>
+            </a:r>
+            <a:r>
+              <a:rPr lang="en-PH" sz="900" dirty="0" err="1"/>
+              <a:t>localPart</a:t>
+            </a:r>
+            <a:r>
+              <a:rPr lang="en-PH" sz="900" dirty="0"/>
+              <a:t> = parts[0];</a:t>
+            </a:r>
+          </a:p>
+          <a:p>
+            <a:pPr marL="0">
+              <a:lnSpc>
+                <a:spcPct val="100000"/>
+              </a:lnSpc>
+              <a:spcBef>
+                <a:spcPts val="0"/>
+              </a:spcBef>
+            </a:pPr>
+            <a:r>
+              <a:rPr lang="en-PH" sz="900" dirty="0"/>
+              <a:t>        string </a:t>
+            </a:r>
+            <a:r>
+              <a:rPr lang="en-PH" sz="900" dirty="0" err="1"/>
+              <a:t>domainPart</a:t>
+            </a:r>
+            <a:r>
+              <a:rPr lang="en-PH" sz="900" dirty="0"/>
+              <a:t> = parts[1];</a:t>
+            </a:r>
+          </a:p>
+          <a:p>
+            <a:pPr marL="0">
+              <a:lnSpc>
+                <a:spcPct val="100000"/>
+              </a:lnSpc>
+              <a:spcBef>
+                <a:spcPts val="0"/>
+              </a:spcBef>
+            </a:pPr>
+            <a:r>
+              <a:rPr lang="en-PH" sz="900" dirty="0"/>
+              <a:t> </a:t>
+            </a:r>
+          </a:p>
+          <a:p>
+            <a:pPr marL="0">
+              <a:lnSpc>
+                <a:spcPct val="100000"/>
+              </a:lnSpc>
+              <a:spcBef>
+                <a:spcPts val="0"/>
+              </a:spcBef>
+            </a:pPr>
+            <a:r>
+              <a:rPr lang="en-PH" sz="900" dirty="0"/>
+              <a:t>        try {</a:t>
+            </a:r>
+          </a:p>
+          <a:p>
+            <a:pPr marL="0">
+              <a:lnSpc>
+                <a:spcPct val="100000"/>
+              </a:lnSpc>
+              <a:spcBef>
+                <a:spcPts val="0"/>
+              </a:spcBef>
+            </a:pPr>
+            <a:r>
+              <a:rPr lang="en-PH" sz="900" dirty="0"/>
+              <a:t>            // check if domain name has a valid MX record</a:t>
+            </a:r>
+          </a:p>
+          <a:p>
+            <a:pPr marL="0">
+              <a:lnSpc>
+                <a:spcPct val="100000"/>
+              </a:lnSpc>
+              <a:spcBef>
+                <a:spcPts val="0"/>
+              </a:spcBef>
+            </a:pPr>
+            <a:r>
+              <a:rPr lang="en-PH" sz="900" dirty="0"/>
+              <a:t>            </a:t>
+            </a:r>
+            <a:r>
+              <a:rPr lang="en-PH" sz="900" dirty="0" err="1"/>
+              <a:t>var</a:t>
+            </a:r>
+            <a:r>
+              <a:rPr lang="en-PH" sz="900" dirty="0"/>
+              <a:t> </a:t>
+            </a:r>
+            <a:r>
+              <a:rPr lang="en-PH" sz="900" dirty="0" err="1"/>
+              <a:t>hostEntry</a:t>
+            </a:r>
+            <a:r>
+              <a:rPr lang="en-PH" sz="900" dirty="0"/>
+              <a:t> = </a:t>
+            </a:r>
+            <a:r>
+              <a:rPr lang="en-PH" sz="900" dirty="0" err="1"/>
+              <a:t>Dns.GetHostEntry</a:t>
+            </a:r>
+            <a:r>
+              <a:rPr lang="en-PH" sz="900" dirty="0"/>
+              <a:t>(</a:t>
+            </a:r>
+            <a:r>
+              <a:rPr lang="en-PH" sz="900" dirty="0" err="1"/>
+              <a:t>domainPart</a:t>
+            </a:r>
+            <a:r>
+              <a:rPr lang="en-PH" sz="900" dirty="0"/>
+              <a:t>);</a:t>
+            </a:r>
+          </a:p>
+          <a:p>
+            <a:pPr marL="0">
+              <a:lnSpc>
+                <a:spcPct val="100000"/>
+              </a:lnSpc>
+              <a:spcBef>
+                <a:spcPts val="0"/>
+              </a:spcBef>
+            </a:pPr>
+            <a:r>
+              <a:rPr lang="en-PH" sz="900" dirty="0"/>
+              <a:t>            return </a:t>
+            </a:r>
+            <a:r>
+              <a:rPr lang="en-PH" sz="900" dirty="0" err="1"/>
+              <a:t>hostEntry.HostName.Length</a:t>
+            </a:r>
+            <a:r>
+              <a:rPr lang="en-PH" sz="900" dirty="0"/>
+              <a:t> &gt; 0;</a:t>
+            </a:r>
+          </a:p>
+          <a:p>
+            <a:pPr marL="0">
+              <a:lnSpc>
+                <a:spcPct val="100000"/>
+              </a:lnSpc>
+              <a:spcBef>
+                <a:spcPts val="0"/>
+              </a:spcBef>
+            </a:pPr>
+            <a:r>
+              <a:rPr lang="en-PH" sz="900" dirty="0"/>
+              <a:t>        }</a:t>
+            </a:r>
+          </a:p>
+          <a:p>
+            <a:pPr marL="0">
+              <a:lnSpc>
+                <a:spcPct val="100000"/>
+              </a:lnSpc>
+              <a:spcBef>
+                <a:spcPts val="0"/>
+              </a:spcBef>
+            </a:pPr>
+            <a:r>
+              <a:rPr lang="en-PH" sz="900" dirty="0"/>
+              <a:t>        catch {</a:t>
+            </a:r>
+          </a:p>
+          <a:p>
+            <a:pPr marL="0">
+              <a:lnSpc>
+                <a:spcPct val="100000"/>
+              </a:lnSpc>
+              <a:spcBef>
+                <a:spcPts val="0"/>
+              </a:spcBef>
+            </a:pPr>
+            <a:r>
+              <a:rPr lang="en-PH" sz="900" dirty="0"/>
+              <a:t>            return false; // domain name is invalid or does not have a valid MX record</a:t>
+            </a:r>
+          </a:p>
+          <a:p>
+            <a:pPr marL="0">
+              <a:lnSpc>
+                <a:spcPct val="100000"/>
+              </a:lnSpc>
+              <a:spcBef>
+                <a:spcPts val="0"/>
+              </a:spcBef>
+            </a:pPr>
+            <a:r>
+              <a:rPr lang="en-PH" sz="900" dirty="0"/>
+              <a:t>        }</a:t>
+            </a:r>
+          </a:p>
+          <a:p>
+            <a:pPr marL="0">
+              <a:lnSpc>
+                <a:spcPct val="100000"/>
+              </a:lnSpc>
+              <a:spcBef>
+                <a:spcPts val="0"/>
+              </a:spcBef>
+            </a:pPr>
+            <a:r>
+              <a:rPr lang="en-PH" sz="900" dirty="0"/>
+              <a:t>    }</a:t>
+            </a:r>
+          </a:p>
+          <a:p>
+            <a:pPr marL="0">
+              <a:lnSpc>
+                <a:spcPct val="100000"/>
+              </a:lnSpc>
+              <a:spcBef>
+                <a:spcPts val="0"/>
+              </a:spcBef>
+            </a:pPr>
+            <a:r>
+              <a:rPr lang="en-PH" sz="900" dirty="0"/>
+              <a:t>}</a:t>
+            </a:r>
+          </a:p>
+        </p:txBody>
+      </p:sp>
+    </p:spTree>
+    <p:extLst>
+      <p:ext uri="{BB962C8B-B14F-4D97-AF65-F5344CB8AC3E}">
+        <p14:creationId xmlns:p14="http://schemas.microsoft.com/office/powerpoint/2010/main" val="3515693820"/>
+      </p:ext>
+    </p:extLst>
+  </p:cSld>
+  <p:clrMapOvr>
+    <a:masterClrMapping/>
+  </p:clrMapOvr>
+</p:sld>
+</file>
+
+<file path=ppt/slides/slide8.xml><?xml version="1.0" encoding="utf-8"?>
+<p:sld xmlns:a="http://schemas.openxmlformats.org/drawingml/2006/main" xmlns:r="http://schemas.openxmlformats.org/officeDocument/2006/relationships" xmlns:p="http://schemas.openxmlformats.org/presentationml/2006/main">
+  <p:cSld>
+    <p:spTree>
+      <p:nvGrpSpPr>
+        <p:cNvPr id="1" name=""/>
+        <p:cNvGrpSpPr/>
+        <p:nvPr/>
+      </p:nvGrpSpPr>
+      <p:grpSpPr>
+        <a:xfrm>
+          <a:off x="0" y="0"/>
+          <a:ext cx="0" cy="0"/>
+          <a:chOff x="0" y="0"/>
+          <a:chExt cx="0" cy="0"/>
+        </a:xfrm>
+      </p:grpSpPr>
+      <p:sp>
+        <p:nvSpPr>
+          <p:cNvPr id="2" name="Title 1"/>
+          <p:cNvSpPr>
+            <a:spLocks noGrp="1"/>
+          </p:cNvSpPr>
+          <p:nvPr>
+            <p:ph type="title"/>
+          </p:nvPr>
+        </p:nvSpPr>
+        <p:spPr/>
+        <p:txBody>
+          <a:bodyPr/>
+          <a:lstStyle/>
+          <a:p>
+            <a:endParaRPr lang="en-PH"/>
+          </a:p>
+        </p:txBody>
+      </p:sp>
+      <p:sp>
+        <p:nvSpPr>
+          <p:cNvPr id="3" name="Content Placeholder 2"/>
+          <p:cNvSpPr>
+            <a:spLocks noGrp="1"/>
+          </p:cNvSpPr>
+          <p:nvPr>
+            <p:ph idx="1"/>
+          </p:nvPr>
+        </p:nvSpPr>
+        <p:spPr/>
+        <p:txBody>
+          <a:bodyPr/>
+          <a:lstStyle/>
+          <a:p>
+            <a:r>
+              <a:rPr lang="en-US" dirty="0" err="1" smtClean="0"/>
+              <a:t>Convert.ToDouble</a:t>
+            </a:r>
+            <a:r>
+              <a:rPr lang="en-US" dirty="0" smtClean="0"/>
+              <a:t>(</a:t>
+            </a:r>
+            <a:r>
+              <a:rPr lang="en-US" dirty="0" err="1" smtClean="0"/>
+              <a:t>tb.Text</a:t>
+            </a:r>
+            <a:r>
+              <a:rPr lang="en-US" dirty="0" smtClean="0"/>
+              <a:t>)</a:t>
+            </a:r>
+          </a:p>
+          <a:p>
+            <a:r>
+              <a:rPr lang="en-US" dirty="0" smtClean="0"/>
+              <a:t>||</a:t>
+            </a:r>
+          </a:p>
+          <a:p>
+            <a:r>
+              <a:rPr lang="en-US" dirty="0" smtClean="0"/>
+              <a:t>try:</a:t>
+            </a:r>
+          </a:p>
+          <a:p>
+            <a:r>
+              <a:rPr lang="en-US" dirty="0" smtClean="0"/>
+              <a:t>catch(Exception ex)</a:t>
+            </a:r>
+          </a:p>
+          <a:p>
+            <a:r>
+              <a:rPr lang="en-US" dirty="0" err="1" smtClean="0"/>
+              <a:t>ex.Message</a:t>
+            </a:r>
+            <a:endParaRPr lang="en-US" dirty="0" smtClean="0"/>
+          </a:p>
+          <a:p>
+            <a:r>
+              <a:rPr lang="en-US" dirty="0" smtClean="0"/>
+              <a:t>throw – ends the program</a:t>
+            </a:r>
+            <a:endParaRPr lang="en-PH" dirty="0"/>
+          </a:p>
+        </p:txBody>
+      </p:sp>
+    </p:spTree>
+    <p:extLst>
+      <p:ext uri="{BB962C8B-B14F-4D97-AF65-F5344CB8AC3E}">
+        <p14:creationId xmlns:p14="http://schemas.microsoft.com/office/powerpoint/2010/main" val="91548495"/>
+      </p:ext>
+    </p:extLst>
+  </p:cSld>
+  <p:clrMapOvr>
+    <a:masterClrMapping/>
+  </p:clrMapOvr>
+</p:sld>
+</file>
+
+<file path=ppt/slides/slide9.xml><?xml version="1.0" encoding="utf-8"?>
+<p:sld xmlns:a="http://schemas.openxmlformats.org/drawingml/2006/main" xmlns:r="http://schemas.openxmlformats.org/officeDocument/2006/relationships" xmlns:p="http://schemas.openxmlformats.org/presentationml/2006/main">
+  <p:cSld>
+    <p:spTree>
+      <p:nvGrpSpPr>
+        <p:cNvPr id="1" name=""/>
+        <p:cNvGrpSpPr/>
+        <p:nvPr/>
+      </p:nvGrpSpPr>
+      <p:grpSpPr>
+        <a:xfrm>
+          <a:off x="0" y="0"/>
+          <a:ext cx="0" cy="0"/>
+          <a:chOff x="0" y="0"/>
+          <a:chExt cx="0" cy="0"/>
+        </a:xfrm>
+      </p:grpSpPr>
+      <p:sp>
+        <p:nvSpPr>
+          <p:cNvPr id="2" name="Title 1"/>
+          <p:cNvSpPr>
+            <a:spLocks noGrp="1"/>
+          </p:cNvSpPr>
+          <p:nvPr>
+            <p:ph type="title"/>
+          </p:nvPr>
+        </p:nvSpPr>
+        <p:spPr/>
+        <p:txBody>
+          <a:bodyPr/>
+          <a:lstStyle/>
+          <a:p>
+            <a:endParaRPr lang="en-PH"/>
+          </a:p>
+        </p:txBody>
+      </p:sp>
+      <p:sp>
+        <p:nvSpPr>
+          <p:cNvPr id="3" name="Content Placeholder 2"/>
+          <p:cNvSpPr>
+            <a:spLocks noGrp="1"/>
+          </p:cNvSpPr>
+          <p:nvPr>
+            <p:ph idx="1"/>
+          </p:nvPr>
+        </p:nvSpPr>
+        <p:spPr/>
+        <p:txBody>
+          <a:bodyPr/>
+          <a:lstStyle/>
+          <a:p>
+            <a:r>
+              <a:rPr lang="en-US" dirty="0" smtClean="0"/>
+              <a:t>SQL Server Express Edition</a:t>
+            </a:r>
+          </a:p>
+          <a:p>
+            <a:r>
+              <a:rPr lang="en-US" dirty="0" smtClean="0"/>
+              <a:t>Create Database Model with ADO.NET</a:t>
+            </a:r>
+          </a:p>
+          <a:p>
+            <a:r>
+              <a:rPr lang="en-US" dirty="0" smtClean="0"/>
+              <a:t>Select Data from Database using LINQ</a:t>
+            </a:r>
+          </a:p>
+          <a:p>
+            <a:r>
+              <a:rPr lang="en-US" dirty="0" smtClean="0"/>
+              <a:t>Submit to Database from Form</a:t>
+            </a:r>
+            <a:endParaRPr lang="en-PH" dirty="0"/>
+          </a:p>
+        </p:txBody>
+      </p:sp>
+    </p:spTree>
+    <p:extLst>
+      <p:ext uri="{BB962C8B-B14F-4D97-AF65-F5344CB8AC3E}">
+        <p14:creationId xmlns:p14="http://schemas.microsoft.com/office/powerpoint/2010/main" val="4133176615"/>
       </p:ext>
     </p:extLst>
   </p:cSld>

</xml_diff>

<commit_message>
Added notes on LINQ
</commit_message>
<xml_diff>
--- a/Serving Intel.pptx
+++ b/Serving Intel.pptx
@@ -266,7 +266,7 @@
           <a:p>
             <a:fld id="{DA5E98EB-58EC-4C22-931D-BA4A77B4A258}" type="datetimeFigureOut">
               <a:rPr lang="en-PH" smtClean="0"/>
-              <a:t>15/12/2023</a:t>
+              <a:t>18/12/2023</a:t>
             </a:fld>
             <a:endParaRPr lang="en-PH"/>
           </a:p>
@@ -436,7 +436,7 @@
           <a:p>
             <a:fld id="{DA5E98EB-58EC-4C22-931D-BA4A77B4A258}" type="datetimeFigureOut">
               <a:rPr lang="en-PH" smtClean="0"/>
-              <a:t>15/12/2023</a:t>
+              <a:t>18/12/2023</a:t>
             </a:fld>
             <a:endParaRPr lang="en-PH"/>
           </a:p>
@@ -616,7 +616,7 @@
           <a:p>
             <a:fld id="{DA5E98EB-58EC-4C22-931D-BA4A77B4A258}" type="datetimeFigureOut">
               <a:rPr lang="en-PH" smtClean="0"/>
-              <a:t>15/12/2023</a:t>
+              <a:t>18/12/2023</a:t>
             </a:fld>
             <a:endParaRPr lang="en-PH"/>
           </a:p>
@@ -786,7 +786,7 @@
           <a:p>
             <a:fld id="{DA5E98EB-58EC-4C22-931D-BA4A77B4A258}" type="datetimeFigureOut">
               <a:rPr lang="en-PH" smtClean="0"/>
-              <a:t>15/12/2023</a:t>
+              <a:t>18/12/2023</a:t>
             </a:fld>
             <a:endParaRPr lang="en-PH"/>
           </a:p>
@@ -1032,7 +1032,7 @@
           <a:p>
             <a:fld id="{DA5E98EB-58EC-4C22-931D-BA4A77B4A258}" type="datetimeFigureOut">
               <a:rPr lang="en-PH" smtClean="0"/>
-              <a:t>15/12/2023</a:t>
+              <a:t>18/12/2023</a:t>
             </a:fld>
             <a:endParaRPr lang="en-PH"/>
           </a:p>
@@ -1264,7 +1264,7 @@
           <a:p>
             <a:fld id="{DA5E98EB-58EC-4C22-931D-BA4A77B4A258}" type="datetimeFigureOut">
               <a:rPr lang="en-PH" smtClean="0"/>
-              <a:t>15/12/2023</a:t>
+              <a:t>18/12/2023</a:t>
             </a:fld>
             <a:endParaRPr lang="en-PH"/>
           </a:p>
@@ -1631,7 +1631,7 @@
           <a:p>
             <a:fld id="{DA5E98EB-58EC-4C22-931D-BA4A77B4A258}" type="datetimeFigureOut">
               <a:rPr lang="en-PH" smtClean="0"/>
-              <a:t>15/12/2023</a:t>
+              <a:t>18/12/2023</a:t>
             </a:fld>
             <a:endParaRPr lang="en-PH"/>
           </a:p>
@@ -1749,7 +1749,7 @@
           <a:p>
             <a:fld id="{DA5E98EB-58EC-4C22-931D-BA4A77B4A258}" type="datetimeFigureOut">
               <a:rPr lang="en-PH" smtClean="0"/>
-              <a:t>15/12/2023</a:t>
+              <a:t>18/12/2023</a:t>
             </a:fld>
             <a:endParaRPr lang="en-PH"/>
           </a:p>
@@ -1844,7 +1844,7 @@
           <a:p>
             <a:fld id="{DA5E98EB-58EC-4C22-931D-BA4A77B4A258}" type="datetimeFigureOut">
               <a:rPr lang="en-PH" smtClean="0"/>
-              <a:t>15/12/2023</a:t>
+              <a:t>18/12/2023</a:t>
             </a:fld>
             <a:endParaRPr lang="en-PH"/>
           </a:p>
@@ -2121,7 +2121,7 @@
           <a:p>
             <a:fld id="{DA5E98EB-58EC-4C22-931D-BA4A77B4A258}" type="datetimeFigureOut">
               <a:rPr lang="en-PH" smtClean="0"/>
-              <a:t>15/12/2023</a:t>
+              <a:t>18/12/2023</a:t>
             </a:fld>
             <a:endParaRPr lang="en-PH"/>
           </a:p>
@@ -2374,7 +2374,7 @@
           <a:p>
             <a:fld id="{DA5E98EB-58EC-4C22-931D-BA4A77B4A258}" type="datetimeFigureOut">
               <a:rPr lang="en-PH" smtClean="0"/>
-              <a:t>15/12/2023</a:t>
+              <a:t>18/12/2023</a:t>
             </a:fld>
             <a:endParaRPr lang="en-PH"/>
           </a:p>
@@ -2587,7 +2587,7 @@
           <a:p>
             <a:fld id="{DA5E98EB-58EC-4C22-931D-BA4A77B4A258}" type="datetimeFigureOut">
               <a:rPr lang="en-PH" smtClean="0"/>
-              <a:t>15/12/2023</a:t>
+              <a:t>18/12/2023</a:t>
             </a:fld>
             <a:endParaRPr lang="en-PH"/>
           </a:p>
@@ -3344,7 +3344,25 @@
           <a:bodyPr/>
           <a:lstStyle/>
           <a:p>
-            <a:endParaRPr lang="en-PH"/>
+            <a:r>
+              <a:rPr lang="en-US" dirty="0" smtClean="0"/>
+              <a:t>Test = </a:t>
+            </a:r>
+            <a:r>
+              <a:rPr lang="en-US" dirty="0" err="1" smtClean="0"/>
+              <a:t>q.TypesOfCar.Make</a:t>
+            </a:r>
+            <a:r>
+              <a:rPr lang="en-US" dirty="0" smtClean="0"/>
+              <a:t> + “ “ + </a:t>
+            </a:r>
+            <a:r>
+              <a:rPr lang="en-US" smtClean="0"/>
+              <a:t>q.TypesOfCar.Model</a:t>
+            </a:r>
+          </a:p>
+          <a:p>
+            <a:endParaRPr lang="en-PH" dirty="0"/>
           </a:p>
         </p:txBody>
       </p:sp>

</xml_diff>

<commit_message>
Added pointers for the pet project presentation
</commit_message>
<xml_diff>
--- a/Serving Intel.pptx
+++ b/Serving Intel.pptx
@@ -21,14 +21,15 @@
     <p:sldId id="271" r:id="rId15"/>
     <p:sldId id="272" r:id="rId16"/>
     <p:sldId id="273" r:id="rId17"/>
-    <p:sldId id="274" r:id="rId18"/>
-    <p:sldId id="275" r:id="rId19"/>
-    <p:sldId id="276" r:id="rId20"/>
-    <p:sldId id="277" r:id="rId21"/>
-    <p:sldId id="278" r:id="rId22"/>
-    <p:sldId id="279" r:id="rId23"/>
-    <p:sldId id="262" r:id="rId24"/>
-    <p:sldId id="263" r:id="rId25"/>
+    <p:sldId id="280" r:id="rId18"/>
+    <p:sldId id="274" r:id="rId19"/>
+    <p:sldId id="275" r:id="rId20"/>
+    <p:sldId id="276" r:id="rId21"/>
+    <p:sldId id="277" r:id="rId22"/>
+    <p:sldId id="278" r:id="rId23"/>
+    <p:sldId id="279" r:id="rId24"/>
+    <p:sldId id="262" r:id="rId25"/>
+    <p:sldId id="263" r:id="rId26"/>
   </p:sldIdLst>
   <p:sldSz cx="12192000" cy="6858000"/>
   <p:notesSz cx="6858000" cy="9144000"/>
@@ -266,7 +267,7 @@
           <a:p>
             <a:fld id="{DA5E98EB-58EC-4C22-931D-BA4A77B4A258}" type="datetimeFigureOut">
               <a:rPr lang="en-PH" smtClean="0"/>
-              <a:t>18/12/2023</a:t>
+              <a:t>19/12/2023</a:t>
             </a:fld>
             <a:endParaRPr lang="en-PH"/>
           </a:p>
@@ -436,7 +437,7 @@
           <a:p>
             <a:fld id="{DA5E98EB-58EC-4C22-931D-BA4A77B4A258}" type="datetimeFigureOut">
               <a:rPr lang="en-PH" smtClean="0"/>
-              <a:t>18/12/2023</a:t>
+              <a:t>19/12/2023</a:t>
             </a:fld>
             <a:endParaRPr lang="en-PH"/>
           </a:p>
@@ -616,7 +617,7 @@
           <a:p>
             <a:fld id="{DA5E98EB-58EC-4C22-931D-BA4A77B4A258}" type="datetimeFigureOut">
               <a:rPr lang="en-PH" smtClean="0"/>
-              <a:t>18/12/2023</a:t>
+              <a:t>19/12/2023</a:t>
             </a:fld>
             <a:endParaRPr lang="en-PH"/>
           </a:p>
@@ -786,7 +787,7 @@
           <a:p>
             <a:fld id="{DA5E98EB-58EC-4C22-931D-BA4A77B4A258}" type="datetimeFigureOut">
               <a:rPr lang="en-PH" smtClean="0"/>
-              <a:t>18/12/2023</a:t>
+              <a:t>19/12/2023</a:t>
             </a:fld>
             <a:endParaRPr lang="en-PH"/>
           </a:p>
@@ -1032,7 +1033,7 @@
           <a:p>
             <a:fld id="{DA5E98EB-58EC-4C22-931D-BA4A77B4A258}" type="datetimeFigureOut">
               <a:rPr lang="en-PH" smtClean="0"/>
-              <a:t>18/12/2023</a:t>
+              <a:t>19/12/2023</a:t>
             </a:fld>
             <a:endParaRPr lang="en-PH"/>
           </a:p>
@@ -1264,7 +1265,7 @@
           <a:p>
             <a:fld id="{DA5E98EB-58EC-4C22-931D-BA4A77B4A258}" type="datetimeFigureOut">
               <a:rPr lang="en-PH" smtClean="0"/>
-              <a:t>18/12/2023</a:t>
+              <a:t>19/12/2023</a:t>
             </a:fld>
             <a:endParaRPr lang="en-PH"/>
           </a:p>
@@ -1631,7 +1632,7 @@
           <a:p>
             <a:fld id="{DA5E98EB-58EC-4C22-931D-BA4A77B4A258}" type="datetimeFigureOut">
               <a:rPr lang="en-PH" smtClean="0"/>
-              <a:t>18/12/2023</a:t>
+              <a:t>19/12/2023</a:t>
             </a:fld>
             <a:endParaRPr lang="en-PH"/>
           </a:p>
@@ -1749,7 +1750,7 @@
           <a:p>
             <a:fld id="{DA5E98EB-58EC-4C22-931D-BA4A77B4A258}" type="datetimeFigureOut">
               <a:rPr lang="en-PH" smtClean="0"/>
-              <a:t>18/12/2023</a:t>
+              <a:t>19/12/2023</a:t>
             </a:fld>
             <a:endParaRPr lang="en-PH"/>
           </a:p>
@@ -1844,7 +1845,7 @@
           <a:p>
             <a:fld id="{DA5E98EB-58EC-4C22-931D-BA4A77B4A258}" type="datetimeFigureOut">
               <a:rPr lang="en-PH" smtClean="0"/>
-              <a:t>18/12/2023</a:t>
+              <a:t>19/12/2023</a:t>
             </a:fld>
             <a:endParaRPr lang="en-PH"/>
           </a:p>
@@ -2121,7 +2122,7 @@
           <a:p>
             <a:fld id="{DA5E98EB-58EC-4C22-931D-BA4A77B4A258}" type="datetimeFigureOut">
               <a:rPr lang="en-PH" smtClean="0"/>
-              <a:t>18/12/2023</a:t>
+              <a:t>19/12/2023</a:t>
             </a:fld>
             <a:endParaRPr lang="en-PH"/>
           </a:p>
@@ -2374,7 +2375,7 @@
           <a:p>
             <a:fld id="{DA5E98EB-58EC-4C22-931D-BA4A77B4A258}" type="datetimeFigureOut">
               <a:rPr lang="en-PH" smtClean="0"/>
-              <a:t>18/12/2023</a:t>
+              <a:t>19/12/2023</a:t>
             </a:fld>
             <a:endParaRPr lang="en-PH"/>
           </a:p>
@@ -2587,7 +2588,7 @@
           <a:p>
             <a:fld id="{DA5E98EB-58EC-4C22-931D-BA4A77B4A258}" type="datetimeFigureOut">
               <a:rPr lang="en-PH" smtClean="0"/>
-              <a:t>18/12/2023</a:t>
+              <a:t>19/12/2023</a:t>
             </a:fld>
             <a:endParaRPr lang="en-PH"/>
           </a:p>
@@ -3397,44 +3398,127 @@
           <a:chExt cx="0" cy="0"/>
         </a:xfrm>
       </p:grpSpPr>
-      <p:sp>
-        <p:nvSpPr>
-          <p:cNvPr id="2" name="Title 1"/>
-          <p:cNvSpPr>
-            <a:spLocks noGrp="1"/>
-          </p:cNvSpPr>
-          <p:nvPr>
-            <p:ph type="title"/>
-          </p:nvPr>
-        </p:nvSpPr>
-        <p:spPr/>
-        <p:txBody>
-          <a:bodyPr/>
-          <a:lstStyle/>
-          <a:p>
-            <a:endParaRPr lang="en-PH"/>
-          </a:p>
-        </p:txBody>
-      </p:sp>
-      <p:sp>
-        <p:nvSpPr>
-          <p:cNvPr id="3" name="Content Placeholder 2"/>
-          <p:cNvSpPr>
-            <a:spLocks noGrp="1"/>
-          </p:cNvSpPr>
-          <p:nvPr>
-            <p:ph idx="1"/>
-          </p:nvPr>
-        </p:nvSpPr>
-        <p:spPr/>
-        <p:txBody>
-          <a:bodyPr/>
-          <a:lstStyle/>
-          <a:p>
-            <a:endParaRPr lang="en-PH"/>
-          </a:p>
-        </p:txBody>
-      </p:sp>
+      <p:grpSp>
+        <p:nvGrpSpPr>
+          <p:cNvPr id="8" name="Group 7"/>
+          <p:cNvGrpSpPr/>
+          <p:nvPr/>
+        </p:nvGrpSpPr>
+        <p:grpSpPr>
+          <a:xfrm>
+            <a:off x="0" y="0"/>
+            <a:ext cx="12192000" cy="6858000"/>
+            <a:chOff x="0" y="0"/>
+            <a:chExt cx="12192000" cy="6858000"/>
+          </a:xfrm>
+        </p:grpSpPr>
+        <p:sp>
+          <p:nvSpPr>
+            <p:cNvPr id="6" name="TextBox 5"/>
+            <p:cNvSpPr txBox="1"/>
+            <p:nvPr/>
+          </p:nvSpPr>
+          <p:spPr>
+            <a:xfrm>
+              <a:off x="0" y="0"/>
+              <a:ext cx="12192000" cy="6858000"/>
+            </a:xfrm>
+            <a:prstGeom prst="rect">
+              <a:avLst/>
+            </a:prstGeom>
+            <a:solidFill>
+              <a:srgbClr val="7CA8D0"/>
+            </a:solidFill>
+            <a:ln>
+              <a:solidFill>
+                <a:srgbClr val="7CA8D0"/>
+              </a:solidFill>
+            </a:ln>
+          </p:spPr>
+          <p:txBody>
+            <a:bodyPr wrap="square" rtlCol="0">
+              <a:spAutoFit/>
+            </a:bodyPr>
+            <a:lstStyle/>
+            <a:p>
+              <a:endParaRPr lang="en-PH" dirty="0"/>
+            </a:p>
+          </p:txBody>
+        </p:sp>
+        <p:pic>
+          <p:nvPicPr>
+            <p:cNvPr id="4" name="Picture 3"/>
+            <p:cNvPicPr>
+              <a:picLocks noChangeAspect="1"/>
+            </p:cNvPicPr>
+            <p:nvPr/>
+          </p:nvPicPr>
+          <p:blipFill>
+            <a:blip r:embed="rId2">
+              <a:extLst>
+                <a:ext uri="{28A0092B-C50C-407E-A947-70E740481C1C}">
+                  <a14:useLocalDpi xmlns:a14="http://schemas.microsoft.com/office/drawing/2010/main" val="0"/>
+                </a:ext>
+              </a:extLst>
+            </a:blip>
+            <a:stretch>
+              <a:fillRect/>
+            </a:stretch>
+          </p:blipFill>
+          <p:spPr>
+            <a:xfrm>
+              <a:off x="638442" y="699115"/>
+              <a:ext cx="10744200" cy="1819275"/>
+            </a:xfrm>
+            <a:prstGeom prst="roundRect">
+              <a:avLst>
+                <a:gd name="adj" fmla="val 8594"/>
+              </a:avLst>
+            </a:prstGeom>
+            <a:solidFill>
+              <a:srgbClr val="FFFFFF">
+                <a:shade val="85000"/>
+              </a:srgbClr>
+            </a:solidFill>
+            <a:ln>
+              <a:noFill/>
+            </a:ln>
+            <a:effectLst>
+              <a:reflection blurRad="12700" stA="38000" endPos="28000" dist="5000" dir="5400000" sy="-100000" algn="bl" rotWithShape="0"/>
+            </a:effectLst>
+          </p:spPr>
+        </p:pic>
+        <p:pic>
+          <p:nvPicPr>
+            <p:cNvPr id="5" name="Picture 4"/>
+            <p:cNvPicPr>
+              <a:picLocks noChangeAspect="1"/>
+            </p:cNvPicPr>
+            <p:nvPr/>
+          </p:nvPicPr>
+          <p:blipFill>
+            <a:blip r:embed="rId3"/>
+            <a:stretch>
+              <a:fillRect/>
+            </a:stretch>
+          </p:blipFill>
+          <p:spPr>
+            <a:xfrm>
+              <a:off x="2750018" y="4016799"/>
+              <a:ext cx="6521049" cy="2225644"/>
+            </a:xfrm>
+            <a:prstGeom prst="rect">
+              <a:avLst/>
+            </a:prstGeom>
+            <a:ln>
+              <a:noFill/>
+            </a:ln>
+            <a:effectLst>
+              <a:softEdge rad="112500"/>
+            </a:effectLst>
+          </p:spPr>
+        </p:pic>
+      </p:grpSp>
     </p:spTree>
     <p:extLst>
       <p:ext uri="{BB962C8B-B14F-4D97-AF65-F5344CB8AC3E}">
@@ -3467,39 +3551,36 @@
       </p:grpSpPr>
       <p:sp>
         <p:nvSpPr>
-          <p:cNvPr id="2" name="Title 1"/>
-          <p:cNvSpPr>
-            <a:spLocks noGrp="1"/>
-          </p:cNvSpPr>
-          <p:nvPr>
-            <p:ph type="title"/>
-          </p:nvPr>
-        </p:nvSpPr>
-        <p:spPr/>
-        <p:txBody>
-          <a:bodyPr/>
-          <a:lstStyle/>
-          <a:p>
-            <a:endParaRPr lang="en-PH"/>
-          </a:p>
-        </p:txBody>
-      </p:sp>
-      <p:sp>
-        <p:nvSpPr>
-          <p:cNvPr id="3" name="Content Placeholder 2"/>
-          <p:cNvSpPr>
-            <a:spLocks noGrp="1"/>
-          </p:cNvSpPr>
-          <p:nvPr>
-            <p:ph idx="1"/>
-          </p:nvPr>
-        </p:nvSpPr>
-        <p:spPr/>
-        <p:txBody>
-          <a:bodyPr/>
-          <a:lstStyle/>
-          <a:p>
-            <a:endParaRPr lang="en-PH"/>
+          <p:cNvPr id="4" name="TextBox 3"/>
+          <p:cNvSpPr txBox="1"/>
+          <p:nvPr/>
+        </p:nvSpPr>
+        <p:spPr>
+          <a:xfrm>
+            <a:off x="0" y="0"/>
+            <a:ext cx="12192000" cy="6858000"/>
+          </a:xfrm>
+          <a:prstGeom prst="rect">
+            <a:avLst/>
+          </a:prstGeom>
+          <a:solidFill>
+            <a:srgbClr val="7CA8D0">
+              <a:alpha val="30196"/>
+            </a:srgbClr>
+          </a:solidFill>
+          <a:ln>
+            <a:solidFill>
+              <a:srgbClr val="7CA8D0"/>
+            </a:solidFill>
+          </a:ln>
+        </p:spPr>
+        <p:txBody>
+          <a:bodyPr wrap="square" rtlCol="0">
+            <a:spAutoFit/>
+          </a:bodyPr>
+          <a:lstStyle/>
+          <a:p>
+            <a:endParaRPr lang="en-PH" dirty="0"/>
           </a:p>
         </p:txBody>
       </p:sp>
@@ -3533,44 +3614,105 @@
           <a:chExt cx="0" cy="0"/>
         </a:xfrm>
       </p:grpSpPr>
-      <p:sp>
-        <p:nvSpPr>
-          <p:cNvPr id="2" name="Title 1"/>
-          <p:cNvSpPr>
-            <a:spLocks noGrp="1"/>
-          </p:cNvSpPr>
-          <p:nvPr>
-            <p:ph type="title"/>
-          </p:nvPr>
-        </p:nvSpPr>
-        <p:spPr/>
-        <p:txBody>
-          <a:bodyPr/>
-          <a:lstStyle/>
-          <a:p>
-            <a:endParaRPr lang="en-PH"/>
-          </a:p>
-        </p:txBody>
-      </p:sp>
-      <p:sp>
-        <p:nvSpPr>
-          <p:cNvPr id="3" name="Content Placeholder 2"/>
-          <p:cNvSpPr>
-            <a:spLocks noGrp="1"/>
-          </p:cNvSpPr>
-          <p:nvPr>
-            <p:ph idx="1"/>
-          </p:nvPr>
-        </p:nvSpPr>
-        <p:spPr/>
-        <p:txBody>
-          <a:bodyPr/>
-          <a:lstStyle/>
-          <a:p>
-            <a:endParaRPr lang="en-PH"/>
-          </a:p>
-        </p:txBody>
-      </p:sp>
+      <p:grpSp>
+        <p:nvGrpSpPr>
+          <p:cNvPr id="7" name="Group 6"/>
+          <p:cNvGrpSpPr/>
+          <p:nvPr/>
+        </p:nvGrpSpPr>
+        <p:grpSpPr>
+          <a:xfrm>
+            <a:off x="743484" y="2281728"/>
+            <a:ext cx="10477144" cy="905854"/>
+            <a:chOff x="743484" y="2281728"/>
+            <a:chExt cx="10477144" cy="905854"/>
+          </a:xfrm>
+        </p:grpSpPr>
+        <p:sp>
+          <p:nvSpPr>
+            <p:cNvPr id="6" name="TextBox 5"/>
+            <p:cNvSpPr txBox="1"/>
+            <p:nvPr/>
+          </p:nvSpPr>
+          <p:spPr>
+            <a:xfrm>
+              <a:off x="743484" y="2281728"/>
+              <a:ext cx="10477144" cy="905854"/>
+            </a:xfrm>
+            <a:prstGeom prst="rect">
+              <a:avLst/>
+            </a:prstGeom>
+            <a:solidFill>
+              <a:srgbClr val="7CA8D0"/>
+            </a:solidFill>
+            <a:ln>
+              <a:solidFill>
+                <a:srgbClr val="7CA8D0"/>
+              </a:solidFill>
+            </a:ln>
+          </p:spPr>
+          <p:txBody>
+            <a:bodyPr wrap="square" rtlCol="0">
+              <a:spAutoFit/>
+            </a:bodyPr>
+            <a:lstStyle/>
+            <a:p>
+              <a:endParaRPr lang="en-PH" dirty="0"/>
+            </a:p>
+          </p:txBody>
+        </p:sp>
+        <p:pic>
+          <p:nvPicPr>
+            <p:cNvPr id="1026" name="Picture 2" descr="https://img.freepik.com/free-photo/white-cloud-blue-sky_74190-2381.jpg?size=626&amp;ext=jpg&amp;ga=GA1.1.1546980028.1702944000&amp;semt=ais"/>
+            <p:cNvPicPr>
+              <a:picLocks noChangeAspect="1" noChangeArrowheads="1"/>
+            </p:cNvPicPr>
+            <p:nvPr/>
+          </p:nvPicPr>
+          <p:blipFill rotWithShape="1">
+            <a:blip r:embed="rId2">
+              <a:extLst>
+                <a:ext uri="{BEBA8EAE-BF5A-486C-A8C5-ECC9F3942E4B}">
+                  <a14:imgProps xmlns:a14="http://schemas.microsoft.com/office/drawing/2010/main">
+                    <a14:imgLayer r:embed="rId3">
+                      <a14:imgEffect>
+                        <a14:artisticBlur/>
+                      </a14:imgEffect>
+                    </a14:imgLayer>
+                  </a14:imgProps>
+                </a:ext>
+                <a:ext uri="{28A0092B-C50C-407E-A947-70E740481C1C}">
+                  <a14:useLocalDpi xmlns:a14="http://schemas.microsoft.com/office/drawing/2010/main" val="0"/>
+                </a:ext>
+              </a:extLst>
+            </a:blip>
+            <a:srcRect t="48083" b="41801"/>
+            <a:stretch/>
+          </p:blipFill>
+          <p:spPr bwMode="auto">
+            <a:xfrm>
+              <a:off x="743484" y="2281728"/>
+              <a:ext cx="10477144" cy="905854"/>
+            </a:xfrm>
+            <a:prstGeom prst="rect">
+              <a:avLst/>
+            </a:prstGeom>
+            <a:blipFill dpi="0" rotWithShape="1">
+              <a:blip r:embed="rId4">
+                <a:alphaModFix amt="46000"/>
+              </a:blip>
+              <a:srcRect/>
+              <a:tile tx="0" ty="0" sx="100000" sy="100000" flip="none" algn="tl"/>
+            </a:blipFill>
+            <a:ln>
+              <a:noFill/>
+            </a:ln>
+            <a:effectLst>
+              <a:softEdge rad="112500"/>
+            </a:effectLst>
+          </p:spPr>
+        </p:pic>
+      </p:grpSp>
     </p:spTree>
     <p:extLst>
       <p:ext uri="{BB962C8B-B14F-4D97-AF65-F5344CB8AC3E}">
@@ -3603,25 +3745,6 @@
       </p:grpSpPr>
       <p:sp>
         <p:nvSpPr>
-          <p:cNvPr id="2" name="Title 1"/>
-          <p:cNvSpPr>
-            <a:spLocks noGrp="1"/>
-          </p:cNvSpPr>
-          <p:nvPr>
-            <p:ph type="title"/>
-          </p:nvPr>
-        </p:nvSpPr>
-        <p:spPr/>
-        <p:txBody>
-          <a:bodyPr/>
-          <a:lstStyle/>
-          <a:p>
-            <a:endParaRPr lang="en-PH"/>
-          </a:p>
-        </p:txBody>
-      </p:sp>
-      <p:sp>
-        <p:nvSpPr>
           <p:cNvPr id="3" name="Content Placeholder 2"/>
           <p:cNvSpPr>
             <a:spLocks noGrp="1"/>
@@ -3630,12 +3753,49 @@
             <p:ph idx="1"/>
           </p:nvPr>
         </p:nvSpPr>
-        <p:spPr/>
-        <p:txBody>
-          <a:bodyPr/>
-          <a:lstStyle/>
-          <a:p>
-            <a:endParaRPr lang="en-PH"/>
+        <p:spPr>
+          <a:xfrm>
+            <a:off x="0" y="0"/>
+            <a:ext cx="12192000" cy="6858000"/>
+          </a:xfrm>
+        </p:spPr>
+        <p:txBody>
+          <a:bodyPr/>
+          <a:lstStyle/>
+          <a:p>
+            <a:r>
+              <a:rPr lang="en-US" dirty="0" smtClean="0"/>
+              <a:t>PET PROJECT using .NET Framework </a:t>
+            </a:r>
+            <a:r>
+              <a:rPr lang="en-US" dirty="0" smtClean="0"/>
+              <a:t>with Windows Forms</a:t>
+            </a:r>
+          </a:p>
+          <a:p>
+            <a:r>
+              <a:rPr lang="en-US" dirty="0" smtClean="0"/>
+              <a:t>SQL Server Management Studio as database</a:t>
+            </a:r>
+          </a:p>
+          <a:p>
+            <a:r>
+              <a:rPr lang="en-US" dirty="0" smtClean="0"/>
+              <a:t>ADO.NET to access and connect to data sources</a:t>
+            </a:r>
+          </a:p>
+          <a:p>
+            <a:r>
+              <a:rPr lang="en-US" dirty="0" smtClean="0"/>
+              <a:t>Entity Framework to store and access databases</a:t>
+            </a:r>
+          </a:p>
+          <a:p>
+            <a:r>
+              <a:rPr lang="en-US" dirty="0" smtClean="0"/>
+              <a:t>LINQ to query databases</a:t>
+            </a:r>
+            <a:endParaRPr lang="en-PH" dirty="0"/>
           </a:p>
         </p:txBody>
       </p:sp>
@@ -3671,25 +3831,6 @@
       </p:grpSpPr>
       <p:sp>
         <p:nvSpPr>
-          <p:cNvPr id="2" name="Title 1"/>
-          <p:cNvSpPr>
-            <a:spLocks noGrp="1"/>
-          </p:cNvSpPr>
-          <p:nvPr>
-            <p:ph type="title"/>
-          </p:nvPr>
-        </p:nvSpPr>
-        <p:spPr/>
-        <p:txBody>
-          <a:bodyPr/>
-          <a:lstStyle/>
-          <a:p>
-            <a:endParaRPr lang="en-PH"/>
-          </a:p>
-        </p:txBody>
-      </p:sp>
-      <p:sp>
-        <p:nvSpPr>
           <p:cNvPr id="3" name="Content Placeholder 2"/>
           <p:cNvSpPr>
             <a:spLocks noGrp="1"/>
@@ -3698,19 +3839,94 @@
             <p:ph idx="1"/>
           </p:nvPr>
         </p:nvSpPr>
-        <p:spPr/>
-        <p:txBody>
-          <a:bodyPr/>
-          <a:lstStyle/>
-          <a:p>
-            <a:endParaRPr lang="en-PH"/>
+        <p:spPr>
+          <a:xfrm>
+            <a:off x="0" y="0"/>
+            <a:ext cx="12192000" cy="6858000"/>
+          </a:xfrm>
+        </p:spPr>
+        <p:txBody>
+          <a:bodyPr/>
+          <a:lstStyle/>
+          <a:p>
+            <a:r>
+              <a:rPr lang="en-US" dirty="0" smtClean="0"/>
+              <a:t>Created Login Form to facilitate the access of users </a:t>
+            </a:r>
+          </a:p>
+          <a:p>
+            <a:r>
+              <a:rPr lang="en-US" dirty="0" smtClean="0"/>
+              <a:t>Only one user logged in the program per instance</a:t>
+            </a:r>
+            <a:endParaRPr lang="en-US" dirty="0" smtClean="0"/>
+          </a:p>
+          <a:p>
+            <a:r>
+              <a:rPr lang="en-US" dirty="0" smtClean="0"/>
+              <a:t>Implemented different restrictions like required fields, email verification</a:t>
+            </a:r>
+          </a:p>
+          <a:p>
+            <a:r>
+              <a:rPr lang="en-US" dirty="0" smtClean="0"/>
+              <a:t>Menu items for design purposes – from website</a:t>
+            </a:r>
+          </a:p>
+          <a:p>
+            <a:r>
+              <a:rPr lang="en-US" dirty="0" smtClean="0"/>
+              <a:t>Main Window with Home and Users </a:t>
+            </a:r>
+          </a:p>
+          <a:p>
+            <a:pPr marL="0" indent="0">
+              <a:buNone/>
+            </a:pPr>
+            <a:endParaRPr lang="en-US" dirty="0"/>
+          </a:p>
+          <a:p>
+            <a:r>
+              <a:rPr lang="en-US" dirty="0" smtClean="0"/>
+              <a:t>Created databases for users with three fields or columns</a:t>
+            </a:r>
+          </a:p>
+          <a:p>
+            <a:r>
+              <a:rPr lang="en-US" dirty="0" smtClean="0"/>
+              <a:t>Data Grid View showing email addresses</a:t>
+            </a:r>
+          </a:p>
+          <a:p>
+            <a:r>
+              <a:rPr lang="en-US" dirty="0" smtClean="0"/>
+              <a:t>Options to Add, Edit, and Delete</a:t>
+            </a:r>
+          </a:p>
+          <a:p>
+            <a:r>
+              <a:rPr lang="en-US" dirty="0" smtClean="0"/>
+              <a:t>Also implemented restrictions and error handling </a:t>
+            </a:r>
+          </a:p>
+          <a:p>
+            <a:r>
+              <a:rPr lang="en-US" dirty="0" smtClean="0"/>
+              <a:t>Logout button redirects to Login page</a:t>
+            </a:r>
+          </a:p>
+          <a:p>
+            <a:endParaRPr lang="en-US" dirty="0" smtClean="0"/>
+          </a:p>
+          <a:p>
+            <a:endParaRPr lang="en-PH" dirty="0"/>
           </a:p>
         </p:txBody>
       </p:sp>
     </p:spTree>
     <p:extLst>
       <p:ext uri="{BB962C8B-B14F-4D97-AF65-F5344CB8AC3E}">
-        <p14:creationId xmlns:p14="http://schemas.microsoft.com/office/powerpoint/2010/main" val="2144434806"/>
+        <p14:creationId xmlns:p14="http://schemas.microsoft.com/office/powerpoint/2010/main" val="1779613840"/>
       </p:ext>
     </p:extLst>
   </p:cSld>
@@ -3778,7 +3994,7 @@
     </p:spTree>
     <p:extLst>
       <p:ext uri="{BB962C8B-B14F-4D97-AF65-F5344CB8AC3E}">
-        <p14:creationId xmlns:p14="http://schemas.microsoft.com/office/powerpoint/2010/main" val="3220003544"/>
+        <p14:creationId xmlns:p14="http://schemas.microsoft.com/office/powerpoint/2010/main" val="2144434806"/>
       </p:ext>
     </p:extLst>
   </p:cSld>
@@ -3846,7 +4062,7 @@
     </p:spTree>
     <p:extLst>
       <p:ext uri="{BB962C8B-B14F-4D97-AF65-F5344CB8AC3E}">
-        <p14:creationId xmlns:p14="http://schemas.microsoft.com/office/powerpoint/2010/main" val="2910129002"/>
+        <p14:creationId xmlns:p14="http://schemas.microsoft.com/office/powerpoint/2010/main" val="3220003544"/>
       </p:ext>
     </p:extLst>
   </p:cSld>
@@ -4004,7 +4220,7 @@
     </p:spTree>
     <p:extLst>
       <p:ext uri="{BB962C8B-B14F-4D97-AF65-F5344CB8AC3E}">
-        <p14:creationId xmlns:p14="http://schemas.microsoft.com/office/powerpoint/2010/main" val="3742499737"/>
+        <p14:creationId xmlns:p14="http://schemas.microsoft.com/office/powerpoint/2010/main" val="2910129002"/>
       </p:ext>
     </p:extLst>
   </p:cSld>
@@ -4072,7 +4288,7 @@
     </p:spTree>
     <p:extLst>
       <p:ext uri="{BB962C8B-B14F-4D97-AF65-F5344CB8AC3E}">
-        <p14:creationId xmlns:p14="http://schemas.microsoft.com/office/powerpoint/2010/main" val="2831893525"/>
+        <p14:creationId xmlns:p14="http://schemas.microsoft.com/office/powerpoint/2010/main" val="3742499737"/>
       </p:ext>
     </p:extLst>
   </p:cSld>
@@ -4140,7 +4356,7 @@
     </p:spTree>
     <p:extLst>
       <p:ext uri="{BB962C8B-B14F-4D97-AF65-F5344CB8AC3E}">
-        <p14:creationId xmlns:p14="http://schemas.microsoft.com/office/powerpoint/2010/main" val="2194585876"/>
+        <p14:creationId xmlns:p14="http://schemas.microsoft.com/office/powerpoint/2010/main" val="2831893525"/>
       </p:ext>
     </p:extLst>
   </p:cSld>
@@ -4208,6 +4424,74 @@
     </p:spTree>
     <p:extLst>
       <p:ext uri="{BB962C8B-B14F-4D97-AF65-F5344CB8AC3E}">
+        <p14:creationId xmlns:p14="http://schemas.microsoft.com/office/powerpoint/2010/main" val="2194585876"/>
+      </p:ext>
+    </p:extLst>
+  </p:cSld>
+  <p:clrMapOvr>
+    <a:masterClrMapping/>
+  </p:clrMapOvr>
+</p:sld>
+</file>
+
+<file path=ppt/slides/slide24.xml><?xml version="1.0" encoding="utf-8"?>
+<p:sld xmlns:a="http://schemas.openxmlformats.org/drawingml/2006/main" xmlns:r="http://schemas.openxmlformats.org/officeDocument/2006/relationships" xmlns:p="http://schemas.openxmlformats.org/presentationml/2006/main">
+  <p:cSld>
+    <p:spTree>
+      <p:nvGrpSpPr>
+        <p:cNvPr id="1" name=""/>
+        <p:cNvGrpSpPr/>
+        <p:nvPr/>
+      </p:nvGrpSpPr>
+      <p:grpSpPr>
+        <a:xfrm>
+          <a:off x="0" y="0"/>
+          <a:ext cx="0" cy="0"/>
+          <a:chOff x="0" y="0"/>
+          <a:chExt cx="0" cy="0"/>
+        </a:xfrm>
+      </p:grpSpPr>
+      <p:sp>
+        <p:nvSpPr>
+          <p:cNvPr id="2" name="Title 1"/>
+          <p:cNvSpPr>
+            <a:spLocks noGrp="1"/>
+          </p:cNvSpPr>
+          <p:nvPr>
+            <p:ph type="title"/>
+          </p:nvPr>
+        </p:nvSpPr>
+        <p:spPr/>
+        <p:txBody>
+          <a:bodyPr/>
+          <a:lstStyle/>
+          <a:p>
+            <a:endParaRPr lang="en-PH"/>
+          </a:p>
+        </p:txBody>
+      </p:sp>
+      <p:sp>
+        <p:nvSpPr>
+          <p:cNvPr id="3" name="Content Placeholder 2"/>
+          <p:cNvSpPr>
+            <a:spLocks noGrp="1"/>
+          </p:cNvSpPr>
+          <p:nvPr>
+            <p:ph idx="1"/>
+          </p:nvPr>
+        </p:nvSpPr>
+        <p:spPr/>
+        <p:txBody>
+          <a:bodyPr/>
+          <a:lstStyle/>
+          <a:p>
+            <a:endParaRPr lang="en-PH"/>
+          </a:p>
+        </p:txBody>
+      </p:sp>
+    </p:spTree>
+    <p:extLst>
+      <p:ext uri="{BB962C8B-B14F-4D97-AF65-F5344CB8AC3E}">
         <p14:creationId xmlns:p14="http://schemas.microsoft.com/office/powerpoint/2010/main" val="1134798117"/>
       </p:ext>
     </p:extLst>
@@ -4218,7 +4502,7 @@
 </p:sld>
 </file>
 
-<file path=ppt/slides/slide24.xml><?xml version="1.0" encoding="utf-8"?>
+<file path=ppt/slides/slide25.xml><?xml version="1.0" encoding="utf-8"?>
 <p:sld xmlns:a="http://schemas.openxmlformats.org/drawingml/2006/main" xmlns:r="http://schemas.openxmlformats.org/officeDocument/2006/relationships" xmlns:p="http://schemas.openxmlformats.org/presentationml/2006/main">
   <p:cSld>
     <p:spTree>

</xml_diff>

<commit_message>
Started working on ASP.NET notes
</commit_message>
<xml_diff>
--- a/Serving Intel.pptx
+++ b/Serving Intel.pptx
@@ -267,7 +267,7 @@
           <a:p>
             <a:fld id="{DA5E98EB-58EC-4C22-931D-BA4A77B4A258}" type="datetimeFigureOut">
               <a:rPr lang="en-PH" smtClean="0"/>
-              <a:t>19/12/2023</a:t>
+              <a:t>20/12/2023</a:t>
             </a:fld>
             <a:endParaRPr lang="en-PH"/>
           </a:p>
@@ -437,7 +437,7 @@
           <a:p>
             <a:fld id="{DA5E98EB-58EC-4C22-931D-BA4A77B4A258}" type="datetimeFigureOut">
               <a:rPr lang="en-PH" smtClean="0"/>
-              <a:t>19/12/2023</a:t>
+              <a:t>20/12/2023</a:t>
             </a:fld>
             <a:endParaRPr lang="en-PH"/>
           </a:p>
@@ -617,7 +617,7 @@
           <a:p>
             <a:fld id="{DA5E98EB-58EC-4C22-931D-BA4A77B4A258}" type="datetimeFigureOut">
               <a:rPr lang="en-PH" smtClean="0"/>
-              <a:t>19/12/2023</a:t>
+              <a:t>20/12/2023</a:t>
             </a:fld>
             <a:endParaRPr lang="en-PH"/>
           </a:p>
@@ -787,7 +787,7 @@
           <a:p>
             <a:fld id="{DA5E98EB-58EC-4C22-931D-BA4A77B4A258}" type="datetimeFigureOut">
               <a:rPr lang="en-PH" smtClean="0"/>
-              <a:t>19/12/2023</a:t>
+              <a:t>20/12/2023</a:t>
             </a:fld>
             <a:endParaRPr lang="en-PH"/>
           </a:p>
@@ -1033,7 +1033,7 @@
           <a:p>
             <a:fld id="{DA5E98EB-58EC-4C22-931D-BA4A77B4A258}" type="datetimeFigureOut">
               <a:rPr lang="en-PH" smtClean="0"/>
-              <a:t>19/12/2023</a:t>
+              <a:t>20/12/2023</a:t>
             </a:fld>
             <a:endParaRPr lang="en-PH"/>
           </a:p>
@@ -1265,7 +1265,7 @@
           <a:p>
             <a:fld id="{DA5E98EB-58EC-4C22-931D-BA4A77B4A258}" type="datetimeFigureOut">
               <a:rPr lang="en-PH" smtClean="0"/>
-              <a:t>19/12/2023</a:t>
+              <a:t>20/12/2023</a:t>
             </a:fld>
             <a:endParaRPr lang="en-PH"/>
           </a:p>
@@ -1632,7 +1632,7 @@
           <a:p>
             <a:fld id="{DA5E98EB-58EC-4C22-931D-BA4A77B4A258}" type="datetimeFigureOut">
               <a:rPr lang="en-PH" smtClean="0"/>
-              <a:t>19/12/2023</a:t>
+              <a:t>20/12/2023</a:t>
             </a:fld>
             <a:endParaRPr lang="en-PH"/>
           </a:p>
@@ -1750,7 +1750,7 @@
           <a:p>
             <a:fld id="{DA5E98EB-58EC-4C22-931D-BA4A77B4A258}" type="datetimeFigureOut">
               <a:rPr lang="en-PH" smtClean="0"/>
-              <a:t>19/12/2023</a:t>
+              <a:t>20/12/2023</a:t>
             </a:fld>
             <a:endParaRPr lang="en-PH"/>
           </a:p>
@@ -1845,7 +1845,7 @@
           <a:p>
             <a:fld id="{DA5E98EB-58EC-4C22-931D-BA4A77B4A258}" type="datetimeFigureOut">
               <a:rPr lang="en-PH" smtClean="0"/>
-              <a:t>19/12/2023</a:t>
+              <a:t>20/12/2023</a:t>
             </a:fld>
             <a:endParaRPr lang="en-PH"/>
           </a:p>
@@ -2122,7 +2122,7 @@
           <a:p>
             <a:fld id="{DA5E98EB-58EC-4C22-931D-BA4A77B4A258}" type="datetimeFigureOut">
               <a:rPr lang="en-PH" smtClean="0"/>
-              <a:t>19/12/2023</a:t>
+              <a:t>20/12/2023</a:t>
             </a:fld>
             <a:endParaRPr lang="en-PH"/>
           </a:p>
@@ -2375,7 +2375,7 @@
           <a:p>
             <a:fld id="{DA5E98EB-58EC-4C22-931D-BA4A77B4A258}" type="datetimeFigureOut">
               <a:rPr lang="en-PH" smtClean="0"/>
-              <a:t>19/12/2023</a:t>
+              <a:t>20/12/2023</a:t>
             </a:fld>
             <a:endParaRPr lang="en-PH"/>
           </a:p>
@@ -2588,7 +2588,7 @@
           <a:p>
             <a:fld id="{DA5E98EB-58EC-4C22-931D-BA4A77B4A258}" type="datetimeFigureOut">
               <a:rPr lang="en-PH" smtClean="0"/>
-              <a:t>19/12/2023</a:t>
+              <a:t>20/12/2023</a:t>
             </a:fld>
             <a:endParaRPr lang="en-PH"/>
           </a:p>
@@ -3765,11 +3765,7 @@
           <a:p>
             <a:r>
               <a:rPr lang="en-US" dirty="0" smtClean="0"/>
-              <a:t>PET PROJECT using .NET Framework </a:t>
-            </a:r>
-            <a:r>
-              <a:rPr lang="en-US" dirty="0" smtClean="0"/>
-              <a:t>with Windows Forms</a:t>
+              <a:t>PET PROJECT using .NET Framework with Windows Forms</a:t>
             </a:r>
           </a:p>
           <a:p>
@@ -3859,7 +3855,6 @@
               <a:rPr lang="en-US" dirty="0" smtClean="0"/>
               <a:t>Only one user logged in the program per instance</a:t>
             </a:r>
-            <a:endParaRPr lang="en-US" dirty="0" smtClean="0"/>
           </a:p>
           <a:p>
             <a:r>
@@ -4036,7 +4031,11 @@
           <a:bodyPr/>
           <a:lstStyle/>
           <a:p>
-            <a:endParaRPr lang="en-PH"/>
+            <a:r>
+              <a:rPr lang="en-US" dirty="0" smtClean="0"/>
+              <a:t>ASP.NET</a:t>
+            </a:r>
+            <a:endParaRPr lang="en-PH" dirty="0"/>
           </a:p>
         </p:txBody>
       </p:sp>
@@ -4055,7 +4054,47 @@
           <a:bodyPr/>
           <a:lstStyle/>
           <a:p>
-            <a:endParaRPr lang="en-PH"/>
+            <a:r>
+              <a:rPr lang="en-US" dirty="0" err="1" smtClean="0"/>
+              <a:t>docker</a:t>
+            </a:r>
+            <a:r>
+              <a:rPr lang="en-US" dirty="0" smtClean="0"/>
+              <a:t> pull mcr.microsoft.com/</a:t>
+            </a:r>
+            <a:r>
+              <a:rPr lang="en-US" dirty="0" err="1" smtClean="0"/>
+              <a:t>mssql</a:t>
+            </a:r>
+            <a:r>
+              <a:rPr lang="en-US" dirty="0" smtClean="0"/>
+              <a:t>/server</a:t>
+            </a:r>
+          </a:p>
+          <a:p>
+            <a:r>
+              <a:rPr lang="en-US" dirty="0" err="1" smtClean="0"/>
+              <a:t>docker</a:t>
+            </a:r>
+            <a:r>
+              <a:rPr lang="en-US" dirty="0" smtClean="0"/>
+              <a:t> run –e ‘ACCEPT_EULA=Y’ –e ‘SA_PASSWORD=password’ –p 1400:1433 –d </a:t>
+            </a:r>
+            <a:r>
+              <a:rPr lang="en-US" dirty="0"/>
+              <a:t>mcr.microsoft.com/</a:t>
+            </a:r>
+            <a:r>
+              <a:rPr lang="en-US" dirty="0" err="1"/>
+              <a:t>mssql</a:t>
+            </a:r>
+            <a:r>
+              <a:rPr lang="en-US" dirty="0"/>
+              <a:t>/server</a:t>
+            </a:r>
+          </a:p>
+          <a:p>
+            <a:endParaRPr lang="en-PH" dirty="0"/>
           </a:p>
         </p:txBody>
       </p:sp>

</xml_diff>

<commit_message>
Added error handling cases to the login authentication process in the form
</commit_message>
<xml_diff>
--- a/Serving Intel.pptx
+++ b/Serving Intel.pptx
@@ -29,7 +29,14 @@
     <p:sldId id="278" r:id="rId23"/>
     <p:sldId id="279" r:id="rId24"/>
     <p:sldId id="262" r:id="rId25"/>
-    <p:sldId id="263" r:id="rId26"/>
+    <p:sldId id="281" r:id="rId26"/>
+    <p:sldId id="282" r:id="rId27"/>
+    <p:sldId id="283" r:id="rId28"/>
+    <p:sldId id="284" r:id="rId29"/>
+    <p:sldId id="285" r:id="rId30"/>
+    <p:sldId id="286" r:id="rId31"/>
+    <p:sldId id="287" r:id="rId32"/>
+    <p:sldId id="263" r:id="rId33"/>
   </p:sldIdLst>
   <p:sldSz cx="12192000" cy="6858000"/>
   <p:notesSz cx="6858000" cy="9144000"/>
@@ -267,7 +274,7 @@
           <a:p>
             <a:fld id="{DA5E98EB-58EC-4C22-931D-BA4A77B4A258}" type="datetimeFigureOut">
               <a:rPr lang="en-PH" smtClean="0"/>
-              <a:t>20/12/2023</a:t>
+              <a:t>02/01/2024</a:t>
             </a:fld>
             <a:endParaRPr lang="en-PH"/>
           </a:p>
@@ -437,7 +444,7 @@
           <a:p>
             <a:fld id="{DA5E98EB-58EC-4C22-931D-BA4A77B4A258}" type="datetimeFigureOut">
               <a:rPr lang="en-PH" smtClean="0"/>
-              <a:t>20/12/2023</a:t>
+              <a:t>02/01/2024</a:t>
             </a:fld>
             <a:endParaRPr lang="en-PH"/>
           </a:p>
@@ -617,7 +624,7 @@
           <a:p>
             <a:fld id="{DA5E98EB-58EC-4C22-931D-BA4A77B4A258}" type="datetimeFigureOut">
               <a:rPr lang="en-PH" smtClean="0"/>
-              <a:t>20/12/2023</a:t>
+              <a:t>02/01/2024</a:t>
             </a:fld>
             <a:endParaRPr lang="en-PH"/>
           </a:p>
@@ -787,7 +794,7 @@
           <a:p>
             <a:fld id="{DA5E98EB-58EC-4C22-931D-BA4A77B4A258}" type="datetimeFigureOut">
               <a:rPr lang="en-PH" smtClean="0"/>
-              <a:t>20/12/2023</a:t>
+              <a:t>02/01/2024</a:t>
             </a:fld>
             <a:endParaRPr lang="en-PH"/>
           </a:p>
@@ -1033,7 +1040,7 @@
           <a:p>
             <a:fld id="{DA5E98EB-58EC-4C22-931D-BA4A77B4A258}" type="datetimeFigureOut">
               <a:rPr lang="en-PH" smtClean="0"/>
-              <a:t>20/12/2023</a:t>
+              <a:t>02/01/2024</a:t>
             </a:fld>
             <a:endParaRPr lang="en-PH"/>
           </a:p>
@@ -1265,7 +1272,7 @@
           <a:p>
             <a:fld id="{DA5E98EB-58EC-4C22-931D-BA4A77B4A258}" type="datetimeFigureOut">
               <a:rPr lang="en-PH" smtClean="0"/>
-              <a:t>20/12/2023</a:t>
+              <a:t>02/01/2024</a:t>
             </a:fld>
             <a:endParaRPr lang="en-PH"/>
           </a:p>
@@ -1632,7 +1639,7 @@
           <a:p>
             <a:fld id="{DA5E98EB-58EC-4C22-931D-BA4A77B4A258}" type="datetimeFigureOut">
               <a:rPr lang="en-PH" smtClean="0"/>
-              <a:t>20/12/2023</a:t>
+              <a:t>02/01/2024</a:t>
             </a:fld>
             <a:endParaRPr lang="en-PH"/>
           </a:p>
@@ -1750,7 +1757,7 @@
           <a:p>
             <a:fld id="{DA5E98EB-58EC-4C22-931D-BA4A77B4A258}" type="datetimeFigureOut">
               <a:rPr lang="en-PH" smtClean="0"/>
-              <a:t>20/12/2023</a:t>
+              <a:t>02/01/2024</a:t>
             </a:fld>
             <a:endParaRPr lang="en-PH"/>
           </a:p>
@@ -1845,7 +1852,7 @@
           <a:p>
             <a:fld id="{DA5E98EB-58EC-4C22-931D-BA4A77B4A258}" type="datetimeFigureOut">
               <a:rPr lang="en-PH" smtClean="0"/>
-              <a:t>20/12/2023</a:t>
+              <a:t>02/01/2024</a:t>
             </a:fld>
             <a:endParaRPr lang="en-PH"/>
           </a:p>
@@ -2122,7 +2129,7 @@
           <a:p>
             <a:fld id="{DA5E98EB-58EC-4C22-931D-BA4A77B4A258}" type="datetimeFigureOut">
               <a:rPr lang="en-PH" smtClean="0"/>
-              <a:t>20/12/2023</a:t>
+              <a:t>02/01/2024</a:t>
             </a:fld>
             <a:endParaRPr lang="en-PH"/>
           </a:p>
@@ -2375,7 +2382,7 @@
           <a:p>
             <a:fld id="{DA5E98EB-58EC-4C22-931D-BA4A77B4A258}" type="datetimeFigureOut">
               <a:rPr lang="en-PH" smtClean="0"/>
-              <a:t>20/12/2023</a:t>
+              <a:t>02/01/2024</a:t>
             </a:fld>
             <a:endParaRPr lang="en-PH"/>
           </a:p>
@@ -2588,7 +2595,7 @@
           <a:p>
             <a:fld id="{DA5E98EB-58EC-4C22-931D-BA4A77B4A258}" type="datetimeFigureOut">
               <a:rPr lang="en-PH" smtClean="0"/>
-              <a:t>20/12/2023</a:t>
+              <a:t>02/01/2024</a:t>
             </a:fld>
             <a:endParaRPr lang="en-PH"/>
           </a:p>
@@ -3765,8 +3772,24 @@
           <a:p>
             <a:r>
               <a:rPr lang="en-US" dirty="0" smtClean="0"/>
-              <a:t>PET PROJECT using .NET Framework with Windows Forms</a:t>
-            </a:r>
+              <a:t>PET PROJECT using .NET Framework with Windows </a:t>
+            </a:r>
+            <a:r>
+              <a:rPr lang="en-US" dirty="0" smtClean="0"/>
+              <a:t>Forms</a:t>
+            </a:r>
+          </a:p>
+          <a:p>
+            <a:pPr lvl="1"/>
+            <a:r>
+              <a:rPr lang="en-US" dirty="0" err="1" smtClean="0"/>
+              <a:t>Winforms</a:t>
+            </a:r>
+            <a:r>
+              <a:rPr lang="en-US" dirty="0" smtClean="0"/>
+              <a:t> is a UI framework for building Windows desktop apps</a:t>
+            </a:r>
+            <a:endParaRPr lang="en-US" dirty="0" smtClean="0"/>
           </a:p>
           <a:p>
             <a:r>
@@ -3982,7 +4005,11 @@
           <a:bodyPr/>
           <a:lstStyle/>
           <a:p>
-            <a:endParaRPr lang="en-PH"/>
+            <a:r>
+              <a:rPr lang="en-US" dirty="0" smtClean="0"/>
+              <a:t>simmServi567]</a:t>
+            </a:r>
+            <a:endParaRPr lang="en-PH" dirty="0"/>
           </a:p>
         </p:txBody>
       </p:sp>
@@ -4078,20 +4105,53 @@
             </a:r>
             <a:r>
               <a:rPr lang="en-US" dirty="0" smtClean="0"/>
-              <a:t> run –e ‘ACCEPT_EULA=Y’ –e ‘SA_PASSWORD=password’ –p 1400:1433 –d </a:t>
-            </a:r>
-            <a:r>
-              <a:rPr lang="en-US" dirty="0"/>
-              <a:t>mcr.microsoft.com/</a:t>
-            </a:r>
-            <a:r>
-              <a:rPr lang="en-US" dirty="0" err="1"/>
+              <a:t> run –e ‘ACCEPT_EULA=Y’ –e ‘SA_PASSWORD=password’ –p 1400:1433 –d mcr.microsoft.com/</a:t>
+            </a:r>
+            <a:r>
+              <a:rPr lang="en-US" dirty="0" err="1" smtClean="0"/>
               <a:t>mssql</a:t>
             </a:r>
             <a:r>
-              <a:rPr lang="en-US" dirty="0"/>
+              <a:rPr lang="en-US" dirty="0" smtClean="0"/>
               <a:t>/server</a:t>
             </a:r>
+          </a:p>
+          <a:p>
+            <a:endParaRPr lang="en-US" dirty="0"/>
+          </a:p>
+          <a:p>
+            <a:r>
+              <a:rPr lang="en-US" dirty="0" err="1" smtClean="0"/>
+              <a:t>dotnet</a:t>
+            </a:r>
+            <a:r>
+              <a:rPr lang="en-US" dirty="0" smtClean="0"/>
+              <a:t> new </a:t>
+            </a:r>
+            <a:r>
+              <a:rPr lang="en-US" dirty="0" err="1" smtClean="0"/>
+              <a:t>mvc</a:t>
+            </a:r>
+            <a:r>
+              <a:rPr lang="en-US" dirty="0" smtClean="0"/>
+              <a:t> –o </a:t>
+            </a:r>
+            <a:r>
+              <a:rPr lang="en-US" dirty="0" err="1" smtClean="0"/>
+              <a:t>SchoolManagementApp.MVC</a:t>
+            </a:r>
+            <a:endParaRPr lang="en-US" dirty="0" smtClean="0"/>
+          </a:p>
+          <a:p>
+            <a:r>
+              <a:rPr lang="en-US" dirty="0" err="1" smtClean="0"/>
+              <a:t>dotnet</a:t>
+            </a:r>
+            <a:r>
+              <a:rPr lang="en-US" dirty="0" smtClean="0"/>
+              <a:t> run –launch-profile https</a:t>
+            </a:r>
+            <a:endParaRPr lang="en-US" dirty="0"/>
           </a:p>
           <a:p>
             <a:endParaRPr lang="en-PH" dirty="0"/>
@@ -4249,10 +4309,146 @@
         </p:nvSpPr>
         <p:spPr/>
         <p:txBody>
-          <a:bodyPr/>
-          <a:lstStyle/>
-          <a:p>
-            <a:endParaRPr lang="en-PH"/>
+          <a:bodyPr>
+            <a:normAutofit lnSpcReduction="10000"/>
+          </a:bodyPr>
+          <a:lstStyle/>
+          <a:p>
+            <a:r>
+              <a:rPr lang="en-US" dirty="0" smtClean="0"/>
+              <a:t>Understanding the layout file and Bootstrap</a:t>
+            </a:r>
+          </a:p>
+          <a:p>
+            <a:r>
+              <a:rPr lang="en-US" dirty="0" smtClean="0"/>
+              <a:t>Create database</a:t>
+            </a:r>
+          </a:p>
+          <a:p>
+            <a:r>
+              <a:rPr lang="en-US" dirty="0" err="1" smtClean="0"/>
+              <a:t>dotnet</a:t>
+            </a:r>
+            <a:r>
+              <a:rPr lang="en-US" dirty="0" smtClean="0"/>
+              <a:t> add package </a:t>
+            </a:r>
+            <a:r>
+              <a:rPr lang="en-US" dirty="0" err="1" smtClean="0"/>
+              <a:t>Microsoft.EntityFrameworkCore.SqlServer</a:t>
+            </a:r>
+            <a:endParaRPr lang="en-US" dirty="0" smtClean="0"/>
+          </a:p>
+          <a:p>
+            <a:r>
+              <a:rPr lang="en-US" dirty="0" err="1"/>
+              <a:t>dotnet</a:t>
+            </a:r>
+            <a:r>
+              <a:rPr lang="en-US" dirty="0"/>
+              <a:t> add package </a:t>
+            </a:r>
+            <a:r>
+              <a:rPr lang="en-US" dirty="0" err="1" smtClean="0"/>
+              <a:t>Microsoft.EntityFrameworkCore.Design</a:t>
+            </a:r>
+            <a:endParaRPr lang="en-US" dirty="0" smtClean="0"/>
+          </a:p>
+          <a:p>
+            <a:r>
+              <a:rPr lang="en-US" dirty="0" smtClean="0"/>
+              <a:t>Connection String</a:t>
+            </a:r>
+          </a:p>
+          <a:p>
+            <a:r>
+              <a:rPr lang="en-PH" dirty="0" err="1"/>
+              <a:t>dotnet</a:t>
+            </a:r>
+            <a:r>
+              <a:rPr lang="en-PH" dirty="0"/>
+              <a:t> tool install --global </a:t>
+            </a:r>
+            <a:r>
+              <a:rPr lang="en-PH" dirty="0" err="1" smtClean="0"/>
+              <a:t>dotnet-ef</a:t>
+            </a:r>
+            <a:endParaRPr lang="en-PH" dirty="0" smtClean="0"/>
+          </a:p>
+          <a:p>
+            <a:r>
+              <a:rPr lang="en-PH" dirty="0" err="1"/>
+              <a:t>dotnet</a:t>
+            </a:r>
+            <a:r>
+              <a:rPr lang="en-PH" dirty="0"/>
+              <a:t> </a:t>
+            </a:r>
+            <a:r>
+              <a:rPr lang="en-PH" dirty="0" err="1"/>
+              <a:t>ef</a:t>
+            </a:r>
+            <a:r>
+              <a:rPr lang="en-PH" dirty="0"/>
+              <a:t> </a:t>
+            </a:r>
+            <a:r>
+              <a:rPr lang="en-PH" dirty="0" err="1"/>
+              <a:t>dbcontext</a:t>
+            </a:r>
+            <a:r>
+              <a:rPr lang="en-PH" dirty="0"/>
+              <a:t> scaffold "Server=</a:t>
+            </a:r>
+            <a:r>
+              <a:rPr lang="en-PH" dirty="0" err="1"/>
+              <a:t>milytoni</a:t>
+            </a:r>
+            <a:r>
+              <a:rPr lang="en-PH" dirty="0"/>
+              <a:t>\</a:t>
+            </a:r>
+            <a:r>
+              <a:rPr lang="en-PH" dirty="0" err="1"/>
+              <a:t>sqlexpress</a:t>
+            </a:r>
+            <a:r>
+              <a:rPr lang="en-PH" dirty="0"/>
+              <a:t>; Database=</a:t>
+            </a:r>
+            <a:r>
+              <a:rPr lang="en-PH" dirty="0" err="1"/>
+              <a:t>SchoolManagement;Trusted_Connection</a:t>
+            </a:r>
+            <a:r>
+              <a:rPr lang="en-PH" dirty="0"/>
+              <a:t>=</a:t>
+            </a:r>
+            <a:r>
+              <a:rPr lang="en-PH" dirty="0" err="1"/>
+              <a:t>true;MultipleActiveResultSets</a:t>
+            </a:r>
+            <a:r>
+              <a:rPr lang="en-PH" dirty="0"/>
+              <a:t>=</a:t>
+            </a:r>
+            <a:r>
+              <a:rPr lang="en-PH" dirty="0" err="1"/>
+              <a:t>true;Encrypt</a:t>
+            </a:r>
+            <a:r>
+              <a:rPr lang="en-PH" dirty="0"/>
+              <a:t>=false" </a:t>
+            </a:r>
+            <a:r>
+              <a:rPr lang="en-PH" dirty="0" err="1"/>
+              <a:t>Microsoft.EntityFrameworkCore.SqlServer</a:t>
+            </a:r>
+            <a:r>
+              <a:rPr lang="en-PH" dirty="0"/>
+              <a:t> -o Data </a:t>
+            </a:r>
           </a:p>
         </p:txBody>
       </p:sp>
@@ -4317,10 +4513,173 @@
         </p:nvSpPr>
         <p:spPr/>
         <p:txBody>
-          <a:bodyPr/>
-          <a:lstStyle/>
-          <a:p>
-            <a:endParaRPr lang="en-PH"/>
+          <a:bodyPr>
+            <a:normAutofit fontScale="92500" lnSpcReduction="10000"/>
+          </a:bodyPr>
+          <a:lstStyle/>
+          <a:p>
+            <a:r>
+              <a:rPr lang="en-US" dirty="0" smtClean="0"/>
+              <a:t>Scaffold database with entity framework core</a:t>
+            </a:r>
+            <a:endParaRPr lang="en-PH" dirty="0" smtClean="0"/>
+          </a:p>
+          <a:p>
+            <a:r>
+              <a:rPr lang="en-PH" dirty="0" err="1" smtClean="0"/>
+              <a:t>dotnet</a:t>
+            </a:r>
+            <a:r>
+              <a:rPr lang="en-PH" dirty="0" smtClean="0"/>
+              <a:t> </a:t>
+            </a:r>
+            <a:r>
+              <a:rPr lang="en-PH" dirty="0" err="1"/>
+              <a:t>ef</a:t>
+            </a:r>
+            <a:r>
+              <a:rPr lang="en-PH" dirty="0"/>
+              <a:t> </a:t>
+            </a:r>
+            <a:r>
+              <a:rPr lang="en-PH" dirty="0" err="1"/>
+              <a:t>dbcontext</a:t>
+            </a:r>
+            <a:r>
+              <a:rPr lang="en-PH" dirty="0"/>
+              <a:t> scaffold "Server=</a:t>
+            </a:r>
+            <a:r>
+              <a:rPr lang="en-PH" dirty="0" err="1"/>
+              <a:t>milytoni</a:t>
+            </a:r>
+            <a:r>
+              <a:rPr lang="en-PH" dirty="0"/>
+              <a:t>\</a:t>
+            </a:r>
+            <a:r>
+              <a:rPr lang="en-PH" dirty="0" err="1"/>
+              <a:t>sqlexpress</a:t>
+            </a:r>
+            <a:r>
+              <a:rPr lang="en-PH" dirty="0"/>
+              <a:t>; Database=</a:t>
+            </a:r>
+            <a:r>
+              <a:rPr lang="en-PH" dirty="0" err="1"/>
+              <a:t>SchoolManagement;Trusted_Connection</a:t>
+            </a:r>
+            <a:r>
+              <a:rPr lang="en-PH" dirty="0"/>
+              <a:t>=</a:t>
+            </a:r>
+            <a:r>
+              <a:rPr lang="en-PH" dirty="0" err="1"/>
+              <a:t>true;MultipleActiveResultSets</a:t>
+            </a:r>
+            <a:r>
+              <a:rPr lang="en-PH" dirty="0"/>
+              <a:t>=</a:t>
+            </a:r>
+            <a:r>
+              <a:rPr lang="en-PH" dirty="0" err="1"/>
+              <a:t>true;Encrypt</a:t>
+            </a:r>
+            <a:r>
+              <a:rPr lang="en-PH" dirty="0"/>
+              <a:t>=false" </a:t>
+            </a:r>
+            <a:r>
+              <a:rPr lang="en-PH" dirty="0" err="1"/>
+              <a:t>Microsoft.EntityFrameworkCore.SqlServer</a:t>
+            </a:r>
+            <a:r>
+              <a:rPr lang="en-PH" dirty="0"/>
+              <a:t> -o Data -f --</a:t>
+            </a:r>
+            <a:r>
+              <a:rPr lang="en-PH" dirty="0" smtClean="0"/>
+              <a:t>no-</a:t>
+            </a:r>
+            <a:r>
+              <a:rPr lang="en-PH" dirty="0" err="1" smtClean="0"/>
+              <a:t>onconfiguring</a:t>
+            </a:r>
+            <a:endParaRPr lang="en-PH" dirty="0" smtClean="0"/>
+          </a:p>
+          <a:p>
+            <a:r>
+              <a:rPr lang="en-PH" i="1" dirty="0"/>
+              <a:t>// Add services to the container.</a:t>
+            </a:r>
+            <a:endParaRPr lang="en-PH" dirty="0"/>
+          </a:p>
+          <a:p>
+            <a:r>
+              <a:rPr lang="en-PH" dirty="0" err="1"/>
+              <a:t>var</a:t>
+            </a:r>
+            <a:r>
+              <a:rPr lang="en-PH" dirty="0"/>
+              <a:t> conn = </a:t>
+            </a:r>
+            <a:r>
+              <a:rPr lang="en-PH" dirty="0" err="1"/>
+              <a:t>builder.Configuration.GetConnectionString</a:t>
+            </a:r>
+            <a:r>
+              <a:rPr lang="en-PH" dirty="0"/>
+              <a:t>("</a:t>
+            </a:r>
+            <a:r>
+              <a:rPr lang="en-PH" dirty="0" err="1"/>
+              <a:t>SchoolManagementDbConnection</a:t>
+            </a:r>
+            <a:r>
+              <a:rPr lang="en-PH" dirty="0"/>
+              <a:t>");</a:t>
+            </a:r>
+          </a:p>
+          <a:p>
+            <a:r>
+              <a:rPr lang="en-PH" dirty="0" err="1"/>
+              <a:t>builder.Services.AddDbContext</a:t>
+            </a:r>
+            <a:r>
+              <a:rPr lang="en-PH" dirty="0"/>
+              <a:t>&lt;</a:t>
+            </a:r>
+            <a:r>
+              <a:rPr lang="en-PH" dirty="0" err="1"/>
+              <a:t>SchoolManagementContext</a:t>
+            </a:r>
+            <a:r>
+              <a:rPr lang="en-PH" dirty="0"/>
+              <a:t>&gt;(</a:t>
+            </a:r>
+            <a:r>
+              <a:rPr lang="en-PH" i="1" dirty="0"/>
+              <a:t>q</a:t>
+            </a:r>
+            <a:r>
+              <a:rPr lang="en-PH" dirty="0"/>
+              <a:t> =&gt; </a:t>
+            </a:r>
+            <a:r>
+              <a:rPr lang="en-PH" i="1" dirty="0" err="1"/>
+              <a:t>q</a:t>
+            </a:r>
+            <a:r>
+              <a:rPr lang="en-PH" dirty="0" err="1"/>
+              <a:t>.UseSqlServer</a:t>
+            </a:r>
+            <a:r>
+              <a:rPr lang="en-PH" dirty="0"/>
+              <a:t>(conn));</a:t>
+            </a:r>
+          </a:p>
+          <a:p>
+            <a:endParaRPr lang="en-PH" dirty="0"/>
           </a:p>
         </p:txBody>
       </p:sp>
@@ -4385,10 +4744,163 @@
         </p:nvSpPr>
         <p:spPr/>
         <p:txBody>
-          <a:bodyPr/>
-          <a:lstStyle/>
-          <a:p>
-            <a:endParaRPr lang="en-PH"/>
+          <a:bodyPr>
+            <a:normAutofit lnSpcReduction="10000"/>
+          </a:bodyPr>
+          <a:lstStyle/>
+          <a:p>
+            <a:r>
+              <a:rPr lang="en-PH" dirty="0" err="1"/>
+              <a:t>dotnet</a:t>
+            </a:r>
+            <a:r>
+              <a:rPr lang="en-PH" dirty="0"/>
+              <a:t> tool install -g </a:t>
+            </a:r>
+            <a:r>
+              <a:rPr lang="en-PH" dirty="0" err="1" smtClean="0"/>
+              <a:t>dotnet-aspnet-codegenerator</a:t>
+            </a:r>
+            <a:endParaRPr lang="en-PH" dirty="0" smtClean="0"/>
+          </a:p>
+          <a:p>
+            <a:r>
+              <a:rPr lang="en-PH" dirty="0" err="1"/>
+              <a:t>dotnet</a:t>
+            </a:r>
+            <a:r>
+              <a:rPr lang="en-PH" dirty="0"/>
+              <a:t> add package </a:t>
+            </a:r>
+            <a:r>
+              <a:rPr lang="en-PH" dirty="0" err="1" smtClean="0"/>
+              <a:t>Microsoft.VisualStudio.Web.CodeGeneration.Design</a:t>
+            </a:r>
+            <a:endParaRPr lang="en-PH" dirty="0" smtClean="0"/>
+          </a:p>
+          <a:p>
+            <a:r>
+              <a:rPr lang="en-PH" dirty="0" err="1"/>
+              <a:t>dotnet</a:t>
+            </a:r>
+            <a:r>
+              <a:rPr lang="en-PH" dirty="0"/>
+              <a:t> </a:t>
+            </a:r>
+            <a:r>
+              <a:rPr lang="en-PH" dirty="0" err="1"/>
+              <a:t>aspnet-codegeneration</a:t>
+            </a:r>
+            <a:r>
+              <a:rPr lang="en-PH" dirty="0"/>
+              <a:t> controller -name </a:t>
+            </a:r>
+            <a:r>
+              <a:rPr lang="en-PH" dirty="0" err="1"/>
+              <a:t>CoursesController</a:t>
+            </a:r>
+            <a:r>
+              <a:rPr lang="en-PH" dirty="0"/>
+              <a:t> -m Course -dc </a:t>
+            </a:r>
+            <a:r>
+              <a:rPr lang="en-PH" dirty="0" err="1"/>
+              <a:t>SchoolManagementContext</a:t>
+            </a:r>
+            <a:r>
+              <a:rPr lang="en-PH" dirty="0"/>
+              <a:t> --</a:t>
+            </a:r>
+            <a:r>
+              <a:rPr lang="en-PH" dirty="0" err="1"/>
+              <a:t>relativeFolderPath</a:t>
+            </a:r>
+            <a:r>
+              <a:rPr lang="en-PH" dirty="0"/>
+              <a:t> Controllers </a:t>
+            </a:r>
+            <a:r>
+              <a:rPr lang="en-PH" dirty="0" smtClean="0"/>
+              <a:t>--</a:t>
+            </a:r>
+            <a:r>
+              <a:rPr lang="en-PH" dirty="0" err="1" smtClean="0"/>
+              <a:t>useDefaultLayout</a:t>
+            </a:r>
+            <a:endParaRPr lang="en-PH" dirty="0" smtClean="0"/>
+          </a:p>
+          <a:p>
+            <a:r>
+              <a:rPr lang="en-PH" dirty="0" err="1"/>
+              <a:t>dotnet</a:t>
+            </a:r>
+            <a:r>
+              <a:rPr lang="en-PH" dirty="0"/>
+              <a:t> add package </a:t>
+            </a:r>
+            <a:r>
+              <a:rPr lang="en-PH" dirty="0" err="1"/>
+              <a:t>Microsoft.EntityFrameworkCore.Tools</a:t>
+            </a:r>
+            <a:endParaRPr lang="en-PH" dirty="0" smtClean="0"/>
+          </a:p>
+          <a:p>
+            <a:r>
+              <a:rPr lang="en-PH" dirty="0" err="1"/>
+              <a:t>dotnet</a:t>
+            </a:r>
+            <a:r>
+              <a:rPr lang="en-PH" dirty="0"/>
+              <a:t> </a:t>
+            </a:r>
+            <a:r>
+              <a:rPr lang="en-PH" dirty="0" err="1"/>
+              <a:t>aspnet-codegenerator</a:t>
+            </a:r>
+            <a:r>
+              <a:rPr lang="en-PH" dirty="0"/>
+              <a:t> controller -name </a:t>
+            </a:r>
+            <a:r>
+              <a:rPr lang="en-PH" dirty="0" err="1"/>
+              <a:t>CoursesController</a:t>
+            </a:r>
+            <a:r>
+              <a:rPr lang="en-PH" dirty="0"/>
+              <a:t> -m Course -dc </a:t>
+            </a:r>
+            <a:r>
+              <a:rPr lang="en-PH" dirty="0" err="1"/>
+              <a:t>SchoolManagementContext</a:t>
+            </a:r>
+            <a:r>
+              <a:rPr lang="en-PH" dirty="0"/>
+              <a:t> --</a:t>
+            </a:r>
+            <a:r>
+              <a:rPr lang="en-PH" dirty="0" err="1"/>
+              <a:t>relativeFolderPath</a:t>
+            </a:r>
+            <a:r>
+              <a:rPr lang="en-PH" dirty="0"/>
+              <a:t> Controllers --</a:t>
+            </a:r>
+            <a:r>
+              <a:rPr lang="en-PH" dirty="0" err="1"/>
+              <a:t>useDefaultLayout</a:t>
+            </a:r>
+            <a:r>
+              <a:rPr lang="en-PH" dirty="0"/>
+              <a:t> --</a:t>
+            </a:r>
+            <a:r>
+              <a:rPr lang="en-PH" dirty="0" err="1"/>
+              <a:t>referenceScriptLibraries</a:t>
+            </a:r>
+            <a:r>
+              <a:rPr lang="en-PH" dirty="0"/>
+              <a:t> -f</a:t>
+            </a:r>
           </a:p>
         </p:txBody>
       </p:sp>
@@ -4456,7 +4968,124 @@
           <a:bodyPr/>
           <a:lstStyle/>
           <a:p>
-            <a:endParaRPr lang="en-PH"/>
+            <a:r>
+              <a:rPr lang="en-PH" dirty="0" err="1"/>
+              <a:t>dotnet</a:t>
+            </a:r>
+            <a:r>
+              <a:rPr lang="en-PH" dirty="0"/>
+              <a:t> </a:t>
+            </a:r>
+            <a:r>
+              <a:rPr lang="en-PH" dirty="0" err="1"/>
+              <a:t>aspnet-codegenerator</a:t>
+            </a:r>
+            <a:r>
+              <a:rPr lang="en-PH" dirty="0"/>
+              <a:t> controller -name </a:t>
+            </a:r>
+            <a:r>
+              <a:rPr lang="en-PH" dirty="0" err="1"/>
+              <a:t>LecturersController</a:t>
+            </a:r>
+            <a:r>
+              <a:rPr lang="en-PH" dirty="0"/>
+              <a:t> -m Lecturer -dc </a:t>
+            </a:r>
+            <a:r>
+              <a:rPr lang="en-PH" dirty="0" err="1"/>
+              <a:t>SchoolManagementContext</a:t>
+            </a:r>
+            <a:r>
+              <a:rPr lang="en-PH" dirty="0"/>
+              <a:t> --</a:t>
+            </a:r>
+            <a:r>
+              <a:rPr lang="en-PH" dirty="0" err="1"/>
+              <a:t>relativeFolderPath</a:t>
+            </a:r>
+            <a:r>
+              <a:rPr lang="en-PH" dirty="0"/>
+              <a:t> Controllers --</a:t>
+            </a:r>
+            <a:r>
+              <a:rPr lang="en-PH" dirty="0" err="1"/>
+              <a:t>useDefaultLayout</a:t>
+            </a:r>
+            <a:r>
+              <a:rPr lang="en-PH" dirty="0"/>
+              <a:t> --</a:t>
+            </a:r>
+            <a:r>
+              <a:rPr lang="en-PH" dirty="0" err="1"/>
+              <a:t>referenceScriptLibraries</a:t>
+            </a:r>
+            <a:r>
+              <a:rPr lang="en-PH" dirty="0"/>
+              <a:t> </a:t>
+            </a:r>
+            <a:r>
+              <a:rPr lang="en-PH" dirty="0" smtClean="0"/>
+              <a:t>–f</a:t>
+            </a:r>
+          </a:p>
+          <a:p>
+            <a:r>
+              <a:rPr lang="en-PH" dirty="0" err="1"/>
+              <a:t>dotnet</a:t>
+            </a:r>
+            <a:r>
+              <a:rPr lang="en-PH" dirty="0"/>
+              <a:t> </a:t>
+            </a:r>
+            <a:r>
+              <a:rPr lang="en-PH" dirty="0" err="1"/>
+              <a:t>aspnet-codegenerator</a:t>
+            </a:r>
+            <a:r>
+              <a:rPr lang="en-PH" dirty="0"/>
+              <a:t> controller -name </a:t>
+            </a:r>
+            <a:r>
+              <a:rPr lang="en-PH" dirty="0" err="1"/>
+              <a:t>StudentsController</a:t>
+            </a:r>
+            <a:r>
+              <a:rPr lang="en-PH" dirty="0"/>
+              <a:t> -m Student -dc </a:t>
+            </a:r>
+            <a:r>
+              <a:rPr lang="en-PH" dirty="0" err="1"/>
+              <a:t>SchoolManagementContext</a:t>
+            </a:r>
+            <a:r>
+              <a:rPr lang="en-PH" dirty="0"/>
+              <a:t> --</a:t>
+            </a:r>
+            <a:r>
+              <a:rPr lang="en-PH" dirty="0" err="1"/>
+              <a:t>relativeFolderPath</a:t>
+            </a:r>
+            <a:r>
+              <a:rPr lang="en-PH" dirty="0"/>
+              <a:t> Controllers --</a:t>
+            </a:r>
+            <a:r>
+              <a:rPr lang="en-PH" dirty="0" err="1"/>
+              <a:t>useDefaultLayout</a:t>
+            </a:r>
+            <a:r>
+              <a:rPr lang="en-PH" dirty="0"/>
+              <a:t> --</a:t>
+            </a:r>
+            <a:r>
+              <a:rPr lang="en-PH" dirty="0" err="1"/>
+              <a:t>referenceScriptLibraries</a:t>
+            </a:r>
+            <a:r>
+              <a:rPr lang="en-PH" dirty="0"/>
+              <a:t> -f </a:t>
+            </a:r>
           </a:p>
         </p:txBody>
       </p:sp>
@@ -4524,7 +5153,147 @@
           <a:bodyPr/>
           <a:lstStyle/>
           <a:p>
-            <a:endParaRPr lang="en-PH"/>
+            <a:r>
+              <a:rPr lang="en-PH" dirty="0" err="1"/>
+              <a:t>dotnet</a:t>
+            </a:r>
+            <a:r>
+              <a:rPr lang="en-PH" dirty="0"/>
+              <a:t> </a:t>
+            </a:r>
+            <a:r>
+              <a:rPr lang="en-PH" dirty="0" err="1"/>
+              <a:t>aspnet-codegenerator</a:t>
+            </a:r>
+            <a:r>
+              <a:rPr lang="en-PH" dirty="0"/>
+              <a:t> controller -name </a:t>
+            </a:r>
+            <a:r>
+              <a:rPr lang="en-PH" dirty="0" err="1" smtClean="0"/>
+              <a:t>ClassesController</a:t>
+            </a:r>
+            <a:r>
+              <a:rPr lang="en-PH" dirty="0" smtClean="0"/>
+              <a:t> </a:t>
+            </a:r>
+            <a:r>
+              <a:rPr lang="en-PH" dirty="0"/>
+              <a:t>-m </a:t>
+            </a:r>
+            <a:r>
+              <a:rPr lang="en-PH" dirty="0" smtClean="0"/>
+              <a:t>Class </a:t>
+            </a:r>
+            <a:r>
+              <a:rPr lang="en-PH" dirty="0"/>
+              <a:t>-dc </a:t>
+            </a:r>
+            <a:r>
+              <a:rPr lang="en-PH" dirty="0" err="1"/>
+              <a:t>SchoolManagementContext</a:t>
+            </a:r>
+            <a:r>
+              <a:rPr lang="en-PH" dirty="0"/>
+              <a:t> --</a:t>
+            </a:r>
+            <a:r>
+              <a:rPr lang="en-PH" dirty="0" err="1"/>
+              <a:t>relativeFolderPath</a:t>
+            </a:r>
+            <a:r>
+              <a:rPr lang="en-PH" dirty="0"/>
+              <a:t> Controllers --</a:t>
+            </a:r>
+            <a:r>
+              <a:rPr lang="en-PH" dirty="0" err="1"/>
+              <a:t>useDefaultLayout</a:t>
+            </a:r>
+            <a:r>
+              <a:rPr lang="en-PH" dirty="0"/>
+              <a:t> --</a:t>
+            </a:r>
+            <a:r>
+              <a:rPr lang="en-PH" dirty="0" err="1"/>
+              <a:t>referenceScriptLibraries</a:t>
+            </a:r>
+            <a:r>
+              <a:rPr lang="en-PH" dirty="0"/>
+              <a:t> -f </a:t>
+            </a:r>
+          </a:p>
+          <a:p>
+            <a:r>
+              <a:rPr lang="en-PH" dirty="0" err="1"/>
+              <a:t>dotnet</a:t>
+            </a:r>
+            <a:r>
+              <a:rPr lang="en-PH" dirty="0"/>
+              <a:t> </a:t>
+            </a:r>
+            <a:r>
+              <a:rPr lang="en-PH" dirty="0" err="1"/>
+              <a:t>aspnet-codegenerator</a:t>
+            </a:r>
+            <a:r>
+              <a:rPr lang="en-PH" dirty="0"/>
+              <a:t> controller -name </a:t>
+            </a:r>
+            <a:r>
+              <a:rPr lang="en-PH" dirty="0" err="1" smtClean="0"/>
+              <a:t>EnrollmentsController</a:t>
+            </a:r>
+            <a:r>
+              <a:rPr lang="en-PH" dirty="0" smtClean="0"/>
+              <a:t> </a:t>
+            </a:r>
+            <a:r>
+              <a:rPr lang="en-PH" dirty="0"/>
+              <a:t>-m </a:t>
+            </a:r>
+            <a:r>
+              <a:rPr lang="en-PH" dirty="0" smtClean="0"/>
+              <a:t>Enrollment </a:t>
+            </a:r>
+            <a:r>
+              <a:rPr lang="en-PH" dirty="0"/>
+              <a:t>-dc </a:t>
+            </a:r>
+            <a:r>
+              <a:rPr lang="en-PH" dirty="0" err="1"/>
+              <a:t>SchoolManagementContext</a:t>
+            </a:r>
+            <a:r>
+              <a:rPr lang="en-PH" dirty="0"/>
+              <a:t> --</a:t>
+            </a:r>
+            <a:r>
+              <a:rPr lang="en-PH" dirty="0" err="1"/>
+              <a:t>relativeFolderPath</a:t>
+            </a:r>
+            <a:r>
+              <a:rPr lang="en-PH" dirty="0"/>
+              <a:t> Controllers --</a:t>
+            </a:r>
+            <a:r>
+              <a:rPr lang="en-PH" dirty="0" err="1"/>
+              <a:t>useDefaultLayout</a:t>
+            </a:r>
+            <a:r>
+              <a:rPr lang="en-PH" dirty="0"/>
+              <a:t> --</a:t>
+            </a:r>
+            <a:r>
+              <a:rPr lang="en-PH" dirty="0" err="1"/>
+              <a:t>referenceScriptLibraries</a:t>
+            </a:r>
+            <a:r>
+              <a:rPr lang="en-PH" dirty="0"/>
+              <a:t> -f </a:t>
+            </a:r>
+          </a:p>
+          <a:p>
+            <a:endParaRPr lang="en-PH" dirty="0"/>
           </a:p>
         </p:txBody>
       </p:sp>
@@ -4592,14 +5361,294 @@
           <a:bodyPr/>
           <a:lstStyle/>
           <a:p>
-            <a:endParaRPr lang="en-PH"/>
+            <a:r>
+              <a:rPr lang="en-US" dirty="0" err="1" smtClean="0"/>
+              <a:t>dotnet</a:t>
+            </a:r>
+            <a:r>
+              <a:rPr lang="en-US" dirty="0" smtClean="0"/>
+              <a:t> add package Auth0.AspNetCore.Authentication</a:t>
+            </a:r>
+            <a:endParaRPr lang="en-PH" dirty="0"/>
           </a:p>
         </p:txBody>
       </p:sp>
     </p:spTree>
     <p:extLst>
       <p:ext uri="{BB962C8B-B14F-4D97-AF65-F5344CB8AC3E}">
-        <p14:creationId xmlns:p14="http://schemas.microsoft.com/office/powerpoint/2010/main" val="2549147324"/>
+        <p14:creationId xmlns:p14="http://schemas.microsoft.com/office/powerpoint/2010/main" val="1877467845"/>
+      </p:ext>
+    </p:extLst>
+  </p:cSld>
+  <p:clrMapOvr>
+    <a:masterClrMapping/>
+  </p:clrMapOvr>
+</p:sld>
+</file>
+
+<file path=ppt/slides/slide26.xml><?xml version="1.0" encoding="utf-8"?>
+<p:sld xmlns:a="http://schemas.openxmlformats.org/drawingml/2006/main" xmlns:r="http://schemas.openxmlformats.org/officeDocument/2006/relationships" xmlns:p="http://schemas.openxmlformats.org/presentationml/2006/main">
+  <p:cSld>
+    <p:spTree>
+      <p:nvGrpSpPr>
+        <p:cNvPr id="1" name=""/>
+        <p:cNvGrpSpPr/>
+        <p:nvPr/>
+      </p:nvGrpSpPr>
+      <p:grpSpPr>
+        <a:xfrm>
+          <a:off x="0" y="0"/>
+          <a:ext cx="0" cy="0"/>
+          <a:chOff x="0" y="0"/>
+          <a:chExt cx="0" cy="0"/>
+        </a:xfrm>
+      </p:grpSpPr>
+      <p:sp>
+        <p:nvSpPr>
+          <p:cNvPr id="2" name="Title 1"/>
+          <p:cNvSpPr>
+            <a:spLocks noGrp="1"/>
+          </p:cNvSpPr>
+          <p:nvPr>
+            <p:ph type="title"/>
+          </p:nvPr>
+        </p:nvSpPr>
+        <p:spPr/>
+        <p:txBody>
+          <a:bodyPr/>
+          <a:lstStyle/>
+          <a:p>
+            <a:endParaRPr lang="en-PH"/>
+          </a:p>
+        </p:txBody>
+      </p:sp>
+      <p:sp>
+        <p:nvSpPr>
+          <p:cNvPr id="3" name="Content Placeholder 2"/>
+          <p:cNvSpPr>
+            <a:spLocks noGrp="1"/>
+          </p:cNvSpPr>
+          <p:nvPr>
+            <p:ph idx="1"/>
+          </p:nvPr>
+        </p:nvSpPr>
+        <p:spPr/>
+        <p:txBody>
+          <a:bodyPr/>
+          <a:lstStyle/>
+          <a:p>
+            <a:endParaRPr lang="en-PH"/>
+          </a:p>
+        </p:txBody>
+      </p:sp>
+    </p:spTree>
+    <p:extLst>
+      <p:ext uri="{BB962C8B-B14F-4D97-AF65-F5344CB8AC3E}">
+        <p14:creationId xmlns:p14="http://schemas.microsoft.com/office/powerpoint/2010/main" val="383183001"/>
+      </p:ext>
+    </p:extLst>
+  </p:cSld>
+  <p:clrMapOvr>
+    <a:masterClrMapping/>
+  </p:clrMapOvr>
+</p:sld>
+</file>
+
+<file path=ppt/slides/slide27.xml><?xml version="1.0" encoding="utf-8"?>
+<p:sld xmlns:a="http://schemas.openxmlformats.org/drawingml/2006/main" xmlns:r="http://schemas.openxmlformats.org/officeDocument/2006/relationships" xmlns:p="http://schemas.openxmlformats.org/presentationml/2006/main">
+  <p:cSld>
+    <p:spTree>
+      <p:nvGrpSpPr>
+        <p:cNvPr id="1" name=""/>
+        <p:cNvGrpSpPr/>
+        <p:nvPr/>
+      </p:nvGrpSpPr>
+      <p:grpSpPr>
+        <a:xfrm>
+          <a:off x="0" y="0"/>
+          <a:ext cx="0" cy="0"/>
+          <a:chOff x="0" y="0"/>
+          <a:chExt cx="0" cy="0"/>
+        </a:xfrm>
+      </p:grpSpPr>
+      <p:sp>
+        <p:nvSpPr>
+          <p:cNvPr id="2" name="Title 1"/>
+          <p:cNvSpPr>
+            <a:spLocks noGrp="1"/>
+          </p:cNvSpPr>
+          <p:nvPr>
+            <p:ph type="title"/>
+          </p:nvPr>
+        </p:nvSpPr>
+        <p:spPr/>
+        <p:txBody>
+          <a:bodyPr/>
+          <a:lstStyle/>
+          <a:p>
+            <a:endParaRPr lang="en-PH"/>
+          </a:p>
+        </p:txBody>
+      </p:sp>
+      <p:sp>
+        <p:nvSpPr>
+          <p:cNvPr id="3" name="Content Placeholder 2"/>
+          <p:cNvSpPr>
+            <a:spLocks noGrp="1"/>
+          </p:cNvSpPr>
+          <p:nvPr>
+            <p:ph idx="1"/>
+          </p:nvPr>
+        </p:nvSpPr>
+        <p:spPr/>
+        <p:txBody>
+          <a:bodyPr/>
+          <a:lstStyle/>
+          <a:p>
+            <a:endParaRPr lang="en-PH"/>
+          </a:p>
+        </p:txBody>
+      </p:sp>
+    </p:spTree>
+    <p:extLst>
+      <p:ext uri="{BB962C8B-B14F-4D97-AF65-F5344CB8AC3E}">
+        <p14:creationId xmlns:p14="http://schemas.microsoft.com/office/powerpoint/2010/main" val="87872746"/>
+      </p:ext>
+    </p:extLst>
+  </p:cSld>
+  <p:clrMapOvr>
+    <a:masterClrMapping/>
+  </p:clrMapOvr>
+</p:sld>
+</file>
+
+<file path=ppt/slides/slide28.xml><?xml version="1.0" encoding="utf-8"?>
+<p:sld xmlns:a="http://schemas.openxmlformats.org/drawingml/2006/main" xmlns:r="http://schemas.openxmlformats.org/officeDocument/2006/relationships" xmlns:p="http://schemas.openxmlformats.org/presentationml/2006/main">
+  <p:cSld>
+    <p:spTree>
+      <p:nvGrpSpPr>
+        <p:cNvPr id="1" name=""/>
+        <p:cNvGrpSpPr/>
+        <p:nvPr/>
+      </p:nvGrpSpPr>
+      <p:grpSpPr>
+        <a:xfrm>
+          <a:off x="0" y="0"/>
+          <a:ext cx="0" cy="0"/>
+          <a:chOff x="0" y="0"/>
+          <a:chExt cx="0" cy="0"/>
+        </a:xfrm>
+      </p:grpSpPr>
+      <p:sp>
+        <p:nvSpPr>
+          <p:cNvPr id="2" name="Title 1"/>
+          <p:cNvSpPr>
+            <a:spLocks noGrp="1"/>
+          </p:cNvSpPr>
+          <p:nvPr>
+            <p:ph type="title"/>
+          </p:nvPr>
+        </p:nvSpPr>
+        <p:spPr/>
+        <p:txBody>
+          <a:bodyPr/>
+          <a:lstStyle/>
+          <a:p>
+            <a:endParaRPr lang="en-PH"/>
+          </a:p>
+        </p:txBody>
+      </p:sp>
+      <p:sp>
+        <p:nvSpPr>
+          <p:cNvPr id="3" name="Content Placeholder 2"/>
+          <p:cNvSpPr>
+            <a:spLocks noGrp="1"/>
+          </p:cNvSpPr>
+          <p:nvPr>
+            <p:ph idx="1"/>
+          </p:nvPr>
+        </p:nvSpPr>
+        <p:spPr/>
+        <p:txBody>
+          <a:bodyPr/>
+          <a:lstStyle/>
+          <a:p>
+            <a:endParaRPr lang="en-PH"/>
+          </a:p>
+        </p:txBody>
+      </p:sp>
+    </p:spTree>
+    <p:extLst>
+      <p:ext uri="{BB962C8B-B14F-4D97-AF65-F5344CB8AC3E}">
+        <p14:creationId xmlns:p14="http://schemas.microsoft.com/office/powerpoint/2010/main" val="2807752842"/>
+      </p:ext>
+    </p:extLst>
+  </p:cSld>
+  <p:clrMapOvr>
+    <a:masterClrMapping/>
+  </p:clrMapOvr>
+</p:sld>
+</file>
+
+<file path=ppt/slides/slide29.xml><?xml version="1.0" encoding="utf-8"?>
+<p:sld xmlns:a="http://schemas.openxmlformats.org/drawingml/2006/main" xmlns:r="http://schemas.openxmlformats.org/officeDocument/2006/relationships" xmlns:p="http://schemas.openxmlformats.org/presentationml/2006/main">
+  <p:cSld>
+    <p:spTree>
+      <p:nvGrpSpPr>
+        <p:cNvPr id="1" name=""/>
+        <p:cNvGrpSpPr/>
+        <p:nvPr/>
+      </p:nvGrpSpPr>
+      <p:grpSpPr>
+        <a:xfrm>
+          <a:off x="0" y="0"/>
+          <a:ext cx="0" cy="0"/>
+          <a:chOff x="0" y="0"/>
+          <a:chExt cx="0" cy="0"/>
+        </a:xfrm>
+      </p:grpSpPr>
+      <p:sp>
+        <p:nvSpPr>
+          <p:cNvPr id="2" name="Title 1"/>
+          <p:cNvSpPr>
+            <a:spLocks noGrp="1"/>
+          </p:cNvSpPr>
+          <p:nvPr>
+            <p:ph type="title"/>
+          </p:nvPr>
+        </p:nvSpPr>
+        <p:spPr/>
+        <p:txBody>
+          <a:bodyPr/>
+          <a:lstStyle/>
+          <a:p>
+            <a:endParaRPr lang="en-PH"/>
+          </a:p>
+        </p:txBody>
+      </p:sp>
+      <p:sp>
+        <p:nvSpPr>
+          <p:cNvPr id="3" name="Content Placeholder 2"/>
+          <p:cNvSpPr>
+            <a:spLocks noGrp="1"/>
+          </p:cNvSpPr>
+          <p:nvPr>
+            <p:ph idx="1"/>
+          </p:nvPr>
+        </p:nvSpPr>
+        <p:spPr/>
+        <p:txBody>
+          <a:bodyPr/>
+          <a:lstStyle/>
+          <a:p>
+            <a:endParaRPr lang="en-PH"/>
+          </a:p>
+        </p:txBody>
+      </p:sp>
+    </p:spTree>
+    <p:extLst>
+      <p:ext uri="{BB962C8B-B14F-4D97-AF65-F5344CB8AC3E}">
+        <p14:creationId xmlns:p14="http://schemas.microsoft.com/office/powerpoint/2010/main" val="2186927883"/>
       </p:ext>
     </p:extLst>
   </p:cSld>
@@ -4716,6 +5765,224 @@
     <p:extLst>
       <p:ext uri="{BB962C8B-B14F-4D97-AF65-F5344CB8AC3E}">
         <p14:creationId xmlns:p14="http://schemas.microsoft.com/office/powerpoint/2010/main" val="3866616424"/>
+      </p:ext>
+    </p:extLst>
+  </p:cSld>
+  <p:clrMapOvr>
+    <a:masterClrMapping/>
+  </p:clrMapOvr>
+</p:sld>
+</file>
+
+<file path=ppt/slides/slide30.xml><?xml version="1.0" encoding="utf-8"?>
+<p:sld xmlns:a="http://schemas.openxmlformats.org/drawingml/2006/main" xmlns:r="http://schemas.openxmlformats.org/officeDocument/2006/relationships" xmlns:p="http://schemas.openxmlformats.org/presentationml/2006/main">
+  <p:cSld>
+    <p:spTree>
+      <p:nvGrpSpPr>
+        <p:cNvPr id="1" name=""/>
+        <p:cNvGrpSpPr/>
+        <p:nvPr/>
+      </p:nvGrpSpPr>
+      <p:grpSpPr>
+        <a:xfrm>
+          <a:off x="0" y="0"/>
+          <a:ext cx="0" cy="0"/>
+          <a:chOff x="0" y="0"/>
+          <a:chExt cx="0" cy="0"/>
+        </a:xfrm>
+      </p:grpSpPr>
+      <p:sp>
+        <p:nvSpPr>
+          <p:cNvPr id="2" name="Title 1"/>
+          <p:cNvSpPr>
+            <a:spLocks noGrp="1"/>
+          </p:cNvSpPr>
+          <p:nvPr>
+            <p:ph type="title"/>
+          </p:nvPr>
+        </p:nvSpPr>
+        <p:spPr/>
+        <p:txBody>
+          <a:bodyPr/>
+          <a:lstStyle/>
+          <a:p>
+            <a:r>
+              <a:rPr lang="en-US" smtClean="0"/>
+              <a:t>Program.cs</a:t>
+            </a:r>
+            <a:endParaRPr lang="en-PH"/>
+          </a:p>
+        </p:txBody>
+      </p:sp>
+      <p:sp>
+        <p:nvSpPr>
+          <p:cNvPr id="3" name="Content Placeholder 2"/>
+          <p:cNvSpPr>
+            <a:spLocks noGrp="1"/>
+          </p:cNvSpPr>
+          <p:nvPr>
+            <p:ph idx="1"/>
+          </p:nvPr>
+        </p:nvSpPr>
+        <p:spPr/>
+        <p:txBody>
+          <a:bodyPr/>
+          <a:lstStyle/>
+          <a:p>
+            <a:r>
+              <a:rPr lang="en-US" dirty="0" smtClean="0"/>
+              <a:t>Add services to container</a:t>
+            </a:r>
+          </a:p>
+          <a:p>
+            <a:r>
+              <a:rPr lang="en-US" dirty="0" smtClean="0"/>
+              <a:t>Configure request pipeline</a:t>
+            </a:r>
+            <a:endParaRPr lang="en-PH" dirty="0"/>
+          </a:p>
+        </p:txBody>
+      </p:sp>
+    </p:spTree>
+    <p:extLst>
+      <p:ext uri="{BB962C8B-B14F-4D97-AF65-F5344CB8AC3E}">
+        <p14:creationId xmlns:p14="http://schemas.microsoft.com/office/powerpoint/2010/main" val="2958150387"/>
+      </p:ext>
+    </p:extLst>
+  </p:cSld>
+  <p:clrMapOvr>
+    <a:masterClrMapping/>
+  </p:clrMapOvr>
+</p:sld>
+</file>
+
+<file path=ppt/slides/slide31.xml><?xml version="1.0" encoding="utf-8"?>
+<p:sld xmlns:a="http://schemas.openxmlformats.org/drawingml/2006/main" xmlns:r="http://schemas.openxmlformats.org/officeDocument/2006/relationships" xmlns:p="http://schemas.openxmlformats.org/presentationml/2006/main">
+  <p:cSld>
+    <p:spTree>
+      <p:nvGrpSpPr>
+        <p:cNvPr id="1" name=""/>
+        <p:cNvGrpSpPr/>
+        <p:nvPr/>
+      </p:nvGrpSpPr>
+      <p:grpSpPr>
+        <a:xfrm>
+          <a:off x="0" y="0"/>
+          <a:ext cx="0" cy="0"/>
+          <a:chOff x="0" y="0"/>
+          <a:chExt cx="0" cy="0"/>
+        </a:xfrm>
+      </p:grpSpPr>
+      <p:sp>
+        <p:nvSpPr>
+          <p:cNvPr id="2" name="Title 1"/>
+          <p:cNvSpPr>
+            <a:spLocks noGrp="1"/>
+          </p:cNvSpPr>
+          <p:nvPr>
+            <p:ph type="title"/>
+          </p:nvPr>
+        </p:nvSpPr>
+        <p:spPr/>
+        <p:txBody>
+          <a:bodyPr/>
+          <a:lstStyle/>
+          <a:p>
+            <a:endParaRPr lang="en-PH"/>
+          </a:p>
+        </p:txBody>
+      </p:sp>
+      <p:sp>
+        <p:nvSpPr>
+          <p:cNvPr id="3" name="Content Placeholder 2"/>
+          <p:cNvSpPr>
+            <a:spLocks noGrp="1"/>
+          </p:cNvSpPr>
+          <p:nvPr>
+            <p:ph idx="1"/>
+          </p:nvPr>
+        </p:nvSpPr>
+        <p:spPr/>
+        <p:txBody>
+          <a:bodyPr/>
+          <a:lstStyle/>
+          <a:p>
+            <a:endParaRPr lang="en-PH"/>
+          </a:p>
+        </p:txBody>
+      </p:sp>
+    </p:spTree>
+    <p:extLst>
+      <p:ext uri="{BB962C8B-B14F-4D97-AF65-F5344CB8AC3E}">
+        <p14:creationId xmlns:p14="http://schemas.microsoft.com/office/powerpoint/2010/main" val="3475450117"/>
+      </p:ext>
+    </p:extLst>
+  </p:cSld>
+  <p:clrMapOvr>
+    <a:masterClrMapping/>
+  </p:clrMapOvr>
+</p:sld>
+</file>
+
+<file path=ppt/slides/slide32.xml><?xml version="1.0" encoding="utf-8"?>
+<p:sld xmlns:a="http://schemas.openxmlformats.org/drawingml/2006/main" xmlns:r="http://schemas.openxmlformats.org/officeDocument/2006/relationships" xmlns:p="http://schemas.openxmlformats.org/presentationml/2006/main">
+  <p:cSld>
+    <p:spTree>
+      <p:nvGrpSpPr>
+        <p:cNvPr id="1" name=""/>
+        <p:cNvGrpSpPr/>
+        <p:nvPr/>
+      </p:nvGrpSpPr>
+      <p:grpSpPr>
+        <a:xfrm>
+          <a:off x="0" y="0"/>
+          <a:ext cx="0" cy="0"/>
+          <a:chOff x="0" y="0"/>
+          <a:chExt cx="0" cy="0"/>
+        </a:xfrm>
+      </p:grpSpPr>
+      <p:sp>
+        <p:nvSpPr>
+          <p:cNvPr id="2" name="Title 1"/>
+          <p:cNvSpPr>
+            <a:spLocks noGrp="1"/>
+          </p:cNvSpPr>
+          <p:nvPr>
+            <p:ph type="title"/>
+          </p:nvPr>
+        </p:nvSpPr>
+        <p:spPr/>
+        <p:txBody>
+          <a:bodyPr/>
+          <a:lstStyle/>
+          <a:p>
+            <a:endParaRPr lang="en-PH"/>
+          </a:p>
+        </p:txBody>
+      </p:sp>
+      <p:sp>
+        <p:nvSpPr>
+          <p:cNvPr id="3" name="Content Placeholder 2"/>
+          <p:cNvSpPr>
+            <a:spLocks noGrp="1"/>
+          </p:cNvSpPr>
+          <p:nvPr>
+            <p:ph idx="1"/>
+          </p:nvPr>
+        </p:nvSpPr>
+        <p:spPr/>
+        <p:txBody>
+          <a:bodyPr/>
+          <a:lstStyle/>
+          <a:p>
+            <a:endParaRPr lang="en-PH"/>
+          </a:p>
+        </p:txBody>
+      </p:sp>
+    </p:spTree>
+    <p:extLst>
+      <p:ext uri="{BB962C8B-B14F-4D97-AF65-F5344CB8AC3E}">
+        <p14:creationId xmlns:p14="http://schemas.microsoft.com/office/powerpoint/2010/main" val="2549147324"/>
       </p:ext>
     </p:extLst>
   </p:cSld>

</xml_diff>